<commit_message>
Added work on progenitors to background and results sections.
</commit_message>
<xml_diff>
--- a/Figures/Powerpoints/2 plots.pptx
+++ b/Figures/Powerpoints/2 plots.pptx
@@ -5,7 +5,7 @@
     <p:sldMasterId id="2147483660" r:id="rId1"/>
   </p:sldMasterIdLst>
   <p:notesMasterIdLst>
-    <p:notesMasterId r:id="rId11"/>
+    <p:notesMasterId r:id="rId12"/>
   </p:notesMasterIdLst>
   <p:sldIdLst>
     <p:sldId id="256" r:id="rId2"/>
@@ -17,6 +17,7 @@
     <p:sldId id="263" r:id="rId8"/>
     <p:sldId id="264" r:id="rId9"/>
     <p:sldId id="265" r:id="rId10"/>
+    <p:sldId id="266" r:id="rId11"/>
   </p:sldIdLst>
   <p:sldSz cx="7199313" cy="4319588"/>
   <p:notesSz cx="6858000" cy="9144000"/>
@@ -216,7 +217,7 @@
           <a:p>
             <a:fld id="{B0028AB1-267B-474E-BD8A-C704628DBB4D}" type="datetimeFigureOut">
               <a:rPr lang="en-GB" smtClean="0"/>
-              <a:t>07/08/2015</a:t>
+              <a:t>08/08/2015</a:t>
             </a:fld>
             <a:endParaRPr lang="en-GB"/>
           </a:p>
@@ -1195,7 +1196,7 @@
           <a:p>
             <a:fld id="{6A0A7C41-FC34-4E7A-8F1D-282D4830B78C}" type="datetimeFigureOut">
               <a:rPr lang="en-GB" smtClean="0"/>
-              <a:t>07/08/2015</a:t>
+              <a:t>08/08/2015</a:t>
             </a:fld>
             <a:endParaRPr lang="en-GB"/>
           </a:p>
@@ -1365,7 +1366,7 @@
           <a:p>
             <a:fld id="{6A0A7C41-FC34-4E7A-8F1D-282D4830B78C}" type="datetimeFigureOut">
               <a:rPr lang="en-GB" smtClean="0"/>
-              <a:t>07/08/2015</a:t>
+              <a:t>08/08/2015</a:t>
             </a:fld>
             <a:endParaRPr lang="en-GB"/>
           </a:p>
@@ -1545,7 +1546,7 @@
           <a:p>
             <a:fld id="{6A0A7C41-FC34-4E7A-8F1D-282D4830B78C}" type="datetimeFigureOut">
               <a:rPr lang="en-GB" smtClean="0"/>
-              <a:t>07/08/2015</a:t>
+              <a:t>08/08/2015</a:t>
             </a:fld>
             <a:endParaRPr lang="en-GB"/>
           </a:p>
@@ -1715,7 +1716,7 @@
           <a:p>
             <a:fld id="{6A0A7C41-FC34-4E7A-8F1D-282D4830B78C}" type="datetimeFigureOut">
               <a:rPr lang="en-GB" smtClean="0"/>
-              <a:t>07/08/2015</a:t>
+              <a:t>08/08/2015</a:t>
             </a:fld>
             <a:endParaRPr lang="en-GB"/>
           </a:p>
@@ -1961,7 +1962,7 @@
           <a:p>
             <a:fld id="{6A0A7C41-FC34-4E7A-8F1D-282D4830B78C}" type="datetimeFigureOut">
               <a:rPr lang="en-GB" smtClean="0"/>
-              <a:t>07/08/2015</a:t>
+              <a:t>08/08/2015</a:t>
             </a:fld>
             <a:endParaRPr lang="en-GB"/>
           </a:p>
@@ -2193,7 +2194,7 @@
           <a:p>
             <a:fld id="{6A0A7C41-FC34-4E7A-8F1D-282D4830B78C}" type="datetimeFigureOut">
               <a:rPr lang="en-GB" smtClean="0"/>
-              <a:t>07/08/2015</a:t>
+              <a:t>08/08/2015</a:t>
             </a:fld>
             <a:endParaRPr lang="en-GB"/>
           </a:p>
@@ -2560,7 +2561,7 @@
           <a:p>
             <a:fld id="{6A0A7C41-FC34-4E7A-8F1D-282D4830B78C}" type="datetimeFigureOut">
               <a:rPr lang="en-GB" smtClean="0"/>
-              <a:t>07/08/2015</a:t>
+              <a:t>08/08/2015</a:t>
             </a:fld>
             <a:endParaRPr lang="en-GB"/>
           </a:p>
@@ -2678,7 +2679,7 @@
           <a:p>
             <a:fld id="{6A0A7C41-FC34-4E7A-8F1D-282D4830B78C}" type="datetimeFigureOut">
               <a:rPr lang="en-GB" smtClean="0"/>
-              <a:t>07/08/2015</a:t>
+              <a:t>08/08/2015</a:t>
             </a:fld>
             <a:endParaRPr lang="en-GB"/>
           </a:p>
@@ -2773,7 +2774,7 @@
           <a:p>
             <a:fld id="{6A0A7C41-FC34-4E7A-8F1D-282D4830B78C}" type="datetimeFigureOut">
               <a:rPr lang="en-GB" smtClean="0"/>
-              <a:t>07/08/2015</a:t>
+              <a:t>08/08/2015</a:t>
             </a:fld>
             <a:endParaRPr lang="en-GB"/>
           </a:p>
@@ -3050,7 +3051,7 @@
           <a:p>
             <a:fld id="{6A0A7C41-FC34-4E7A-8F1D-282D4830B78C}" type="datetimeFigureOut">
               <a:rPr lang="en-GB" smtClean="0"/>
-              <a:t>07/08/2015</a:t>
+              <a:t>08/08/2015</a:t>
             </a:fld>
             <a:endParaRPr lang="en-GB"/>
           </a:p>
@@ -3307,7 +3308,7 @@
           <a:p>
             <a:fld id="{6A0A7C41-FC34-4E7A-8F1D-282D4830B78C}" type="datetimeFigureOut">
               <a:rPr lang="en-GB" smtClean="0"/>
-              <a:t>07/08/2015</a:t>
+              <a:t>08/08/2015</a:t>
             </a:fld>
             <a:endParaRPr lang="en-GB"/>
           </a:p>
@@ -3520,7 +3521,7 @@
           <a:p>
             <a:fld id="{6A0A7C41-FC34-4E7A-8F1D-282D4830B78C}" type="datetimeFigureOut">
               <a:rPr lang="en-GB" smtClean="0"/>
-              <a:t>07/08/2015</a:t>
+              <a:t>08/08/2015</a:t>
             </a:fld>
             <a:endParaRPr lang="en-GB"/>
           </a:p>
@@ -3967,6 +3968,36 @@
     <p:extLst>
       <p:ext uri="{BB962C8B-B14F-4D97-AF65-F5344CB8AC3E}">
         <p14:creationId xmlns:p14="http://schemas.microsoft.com/office/powerpoint/2010/main" val="1180660022"/>
+      </p:ext>
+    </p:extLst>
+  </p:cSld>
+  <p:clrMapOvr>
+    <a:masterClrMapping/>
+  </p:clrMapOvr>
+</p:sld>
+</file>
+
+<file path=ppt/slides/slide10.xml><?xml version="1.0" encoding="utf-8"?>
+<p:sld xmlns:a="http://schemas.openxmlformats.org/drawingml/2006/main" xmlns:r="http://schemas.openxmlformats.org/officeDocument/2006/relationships" xmlns:p="http://schemas.openxmlformats.org/presentationml/2006/main">
+  <p:cSld>
+    <p:spTree>
+      <p:nvGrpSpPr>
+        <p:cNvPr id="1" name=""/>
+        <p:cNvGrpSpPr/>
+        <p:nvPr/>
+      </p:nvGrpSpPr>
+      <p:grpSpPr>
+        <a:xfrm>
+          <a:off x="0" y="0"/>
+          <a:ext cx="0" cy="0"/>
+          <a:chOff x="0" y="0"/>
+          <a:chExt cx="0" cy="0"/>
+        </a:xfrm>
+      </p:grpSpPr>
+    </p:spTree>
+    <p:extLst>
+      <p:ext uri="{BB962C8B-B14F-4D97-AF65-F5344CB8AC3E}">
+        <p14:creationId xmlns:p14="http://schemas.microsoft.com/office/powerpoint/2010/main" val="3742157663"/>
       </p:ext>
     </p:extLst>
   </p:cSld>

</xml_diff>

<commit_message>
2 plot powerpoint update.
</commit_message>
<xml_diff>
--- a/Figures/Powerpoints/2 plots.pptx
+++ b/Figures/Powerpoints/2 plots.pptx
@@ -135,6 +135,986 @@
 </p:presentation>
 </file>
 
+<file path=ppt/charts/chart1.xml><?xml version="1.0" encoding="utf-8"?>
+<c:chartSpace xmlns:c="http://schemas.openxmlformats.org/drawingml/2006/chart" xmlns:a="http://schemas.openxmlformats.org/drawingml/2006/main" xmlns:r="http://schemas.openxmlformats.org/officeDocument/2006/relationships">
+  <c:date1904 val="0"/>
+  <c:lang val="en-US"/>
+  <c:roundedCorners val="0"/>
+  <mc:AlternateContent xmlns:mc="http://schemas.openxmlformats.org/markup-compatibility/2006">
+    <mc:Choice xmlns:c14="http://schemas.microsoft.com/office/drawing/2007/8/2/chart" Requires="c14">
+      <c14:style val="102"/>
+    </mc:Choice>
+    <mc:Fallback>
+      <c:style val="2"/>
+    </mc:Fallback>
+  </mc:AlternateContent>
+  <c:chart>
+    <c:title>
+      <c:layout/>
+      <c:overlay val="0"/>
+      <c:spPr>
+        <a:noFill/>
+        <a:ln>
+          <a:noFill/>
+        </a:ln>
+        <a:effectLst/>
+      </c:spPr>
+      <c:txPr>
+        <a:bodyPr rot="0" spcFirstLastPara="1" vertOverflow="ellipsis" vert="horz" wrap="square" anchor="ctr" anchorCtr="1"/>
+        <a:lstStyle/>
+        <a:p>
+          <a:pPr>
+            <a:defRPr sz="1862" b="0" i="0" u="none" strike="noStrike" kern="1200" spc="0" baseline="0">
+              <a:solidFill>
+                <a:schemeClr val="tx1">
+                  <a:lumMod val="65000"/>
+                  <a:lumOff val="35000"/>
+                </a:schemeClr>
+              </a:solidFill>
+              <a:latin typeface="+mn-lt"/>
+              <a:ea typeface="+mn-ea"/>
+              <a:cs typeface="+mn-cs"/>
+            </a:defRPr>
+          </a:pPr>
+          <a:endParaRPr lang="en-US"/>
+        </a:p>
+      </c:txPr>
+    </c:title>
+    <c:autoTitleDeleted val="0"/>
+    <c:plotArea>
+      <c:layout/>
+      <c:barChart>
+        <c:barDir val="col"/>
+        <c:grouping val="clustered"/>
+        <c:varyColors val="0"/>
+        <c:ser>
+          <c:idx val="0"/>
+          <c:order val="0"/>
+          <c:tx>
+            <c:strRef>
+              <c:f>Sheet1!$B$1</c:f>
+              <c:strCache>
+                <c:ptCount val="1"/>
+                <c:pt idx="0">
+                  <c:v>Series 1</c:v>
+                </c:pt>
+              </c:strCache>
+            </c:strRef>
+          </c:tx>
+          <c:spPr>
+            <a:solidFill>
+              <a:schemeClr val="accent1"/>
+            </a:solidFill>
+            <a:ln>
+              <a:noFill/>
+            </a:ln>
+            <a:effectLst/>
+          </c:spPr>
+          <c:invertIfNegative val="0"/>
+          <c:cat>
+            <c:strRef>
+              <c:f>Sheet1!$A$2:$A$5</c:f>
+              <c:strCache>
+                <c:ptCount val="4"/>
+                <c:pt idx="0">
+                  <c:v>Category 1</c:v>
+                </c:pt>
+                <c:pt idx="1">
+                  <c:v>Category 2</c:v>
+                </c:pt>
+                <c:pt idx="2">
+                  <c:v>Category 3</c:v>
+                </c:pt>
+                <c:pt idx="3">
+                  <c:v>Category 4</c:v>
+                </c:pt>
+              </c:strCache>
+            </c:strRef>
+          </c:cat>
+          <c:val>
+            <c:numRef>
+              <c:f>Sheet1!$B$2:$B$5</c:f>
+              <c:numCache>
+                <c:formatCode>General</c:formatCode>
+                <c:ptCount val="4"/>
+                <c:pt idx="0">
+                  <c:v>4.3</c:v>
+                </c:pt>
+                <c:pt idx="1">
+                  <c:v>2.5</c:v>
+                </c:pt>
+                <c:pt idx="2">
+                  <c:v>3.5</c:v>
+                </c:pt>
+                <c:pt idx="3">
+                  <c:v>4.5</c:v>
+                </c:pt>
+              </c:numCache>
+            </c:numRef>
+          </c:val>
+        </c:ser>
+        <c:ser>
+          <c:idx val="1"/>
+          <c:order val="1"/>
+          <c:tx>
+            <c:strRef>
+              <c:f>Sheet1!$C$1</c:f>
+              <c:strCache>
+                <c:ptCount val="1"/>
+                <c:pt idx="0">
+                  <c:v>Series 2</c:v>
+                </c:pt>
+              </c:strCache>
+            </c:strRef>
+          </c:tx>
+          <c:spPr>
+            <a:solidFill>
+              <a:schemeClr val="accent2"/>
+            </a:solidFill>
+            <a:ln>
+              <a:noFill/>
+            </a:ln>
+            <a:effectLst/>
+          </c:spPr>
+          <c:invertIfNegative val="0"/>
+          <c:cat>
+            <c:strRef>
+              <c:f>Sheet1!$A$2:$A$5</c:f>
+              <c:strCache>
+                <c:ptCount val="4"/>
+                <c:pt idx="0">
+                  <c:v>Category 1</c:v>
+                </c:pt>
+                <c:pt idx="1">
+                  <c:v>Category 2</c:v>
+                </c:pt>
+                <c:pt idx="2">
+                  <c:v>Category 3</c:v>
+                </c:pt>
+                <c:pt idx="3">
+                  <c:v>Category 4</c:v>
+                </c:pt>
+              </c:strCache>
+            </c:strRef>
+          </c:cat>
+          <c:val>
+            <c:numRef>
+              <c:f>Sheet1!$C$2:$C$5</c:f>
+              <c:numCache>
+                <c:formatCode>General</c:formatCode>
+                <c:ptCount val="4"/>
+                <c:pt idx="0">
+                  <c:v>2.4</c:v>
+                </c:pt>
+                <c:pt idx="1">
+                  <c:v>4.4000000000000004</c:v>
+                </c:pt>
+                <c:pt idx="2">
+                  <c:v>1.8</c:v>
+                </c:pt>
+                <c:pt idx="3">
+                  <c:v>2.8</c:v>
+                </c:pt>
+              </c:numCache>
+            </c:numRef>
+          </c:val>
+        </c:ser>
+        <c:ser>
+          <c:idx val="2"/>
+          <c:order val="2"/>
+          <c:tx>
+            <c:strRef>
+              <c:f>Sheet1!$D$1</c:f>
+              <c:strCache>
+                <c:ptCount val="1"/>
+                <c:pt idx="0">
+                  <c:v>Series 3</c:v>
+                </c:pt>
+              </c:strCache>
+            </c:strRef>
+          </c:tx>
+          <c:spPr>
+            <a:solidFill>
+              <a:schemeClr val="accent3"/>
+            </a:solidFill>
+            <a:ln>
+              <a:noFill/>
+            </a:ln>
+            <a:effectLst/>
+          </c:spPr>
+          <c:invertIfNegative val="0"/>
+          <c:cat>
+            <c:strRef>
+              <c:f>Sheet1!$A$2:$A$5</c:f>
+              <c:strCache>
+                <c:ptCount val="4"/>
+                <c:pt idx="0">
+                  <c:v>Category 1</c:v>
+                </c:pt>
+                <c:pt idx="1">
+                  <c:v>Category 2</c:v>
+                </c:pt>
+                <c:pt idx="2">
+                  <c:v>Category 3</c:v>
+                </c:pt>
+                <c:pt idx="3">
+                  <c:v>Category 4</c:v>
+                </c:pt>
+              </c:strCache>
+            </c:strRef>
+          </c:cat>
+          <c:val>
+            <c:numRef>
+              <c:f>Sheet1!$D$2:$D$5</c:f>
+              <c:numCache>
+                <c:formatCode>General</c:formatCode>
+                <c:ptCount val="4"/>
+                <c:pt idx="0">
+                  <c:v>2</c:v>
+                </c:pt>
+                <c:pt idx="1">
+                  <c:v>2</c:v>
+                </c:pt>
+                <c:pt idx="2">
+                  <c:v>3</c:v>
+                </c:pt>
+                <c:pt idx="3">
+                  <c:v>5</c:v>
+                </c:pt>
+              </c:numCache>
+            </c:numRef>
+          </c:val>
+        </c:ser>
+        <c:dLbls>
+          <c:showLegendKey val="0"/>
+          <c:showVal val="0"/>
+          <c:showCatName val="0"/>
+          <c:showSerName val="0"/>
+          <c:showPercent val="0"/>
+          <c:showBubbleSize val="0"/>
+        </c:dLbls>
+        <c:gapWidth val="219"/>
+        <c:overlap val="-27"/>
+        <c:axId val="-1825747136"/>
+        <c:axId val="-1825734080"/>
+      </c:barChart>
+      <c:catAx>
+        <c:axId val="-1825747136"/>
+        <c:scaling>
+          <c:orientation val="minMax"/>
+        </c:scaling>
+        <c:delete val="0"/>
+        <c:axPos val="b"/>
+        <c:numFmt formatCode="General" sourceLinked="1"/>
+        <c:majorTickMark val="none"/>
+        <c:minorTickMark val="none"/>
+        <c:tickLblPos val="nextTo"/>
+        <c:spPr>
+          <a:noFill/>
+          <a:ln w="9525" cap="flat" cmpd="sng" algn="ctr">
+            <a:solidFill>
+              <a:schemeClr val="tx1">
+                <a:lumMod val="15000"/>
+                <a:lumOff val="85000"/>
+              </a:schemeClr>
+            </a:solidFill>
+            <a:round/>
+          </a:ln>
+          <a:effectLst/>
+        </c:spPr>
+        <c:txPr>
+          <a:bodyPr rot="-60000000" spcFirstLastPara="1" vertOverflow="ellipsis" vert="horz" wrap="square" anchor="ctr" anchorCtr="1"/>
+          <a:lstStyle/>
+          <a:p>
+            <a:pPr>
+              <a:defRPr sz="1197" b="0" i="0" u="none" strike="noStrike" kern="1200" baseline="0">
+                <a:solidFill>
+                  <a:schemeClr val="tx1">
+                    <a:lumMod val="65000"/>
+                    <a:lumOff val="35000"/>
+                  </a:schemeClr>
+                </a:solidFill>
+                <a:latin typeface="+mn-lt"/>
+                <a:ea typeface="+mn-ea"/>
+                <a:cs typeface="+mn-cs"/>
+              </a:defRPr>
+            </a:pPr>
+            <a:endParaRPr lang="en-US"/>
+          </a:p>
+        </c:txPr>
+        <c:crossAx val="-1825734080"/>
+        <c:crosses val="autoZero"/>
+        <c:auto val="1"/>
+        <c:lblAlgn val="ctr"/>
+        <c:lblOffset val="100"/>
+        <c:noMultiLvlLbl val="0"/>
+      </c:catAx>
+      <c:valAx>
+        <c:axId val="-1825734080"/>
+        <c:scaling>
+          <c:orientation val="minMax"/>
+        </c:scaling>
+        <c:delete val="0"/>
+        <c:axPos val="l"/>
+        <c:majorGridlines>
+          <c:spPr>
+            <a:ln w="9525" cap="flat" cmpd="sng" algn="ctr">
+              <a:solidFill>
+                <a:schemeClr val="tx1">
+                  <a:lumMod val="15000"/>
+                  <a:lumOff val="85000"/>
+                </a:schemeClr>
+              </a:solidFill>
+              <a:round/>
+            </a:ln>
+            <a:effectLst/>
+          </c:spPr>
+        </c:majorGridlines>
+        <c:numFmt formatCode="General" sourceLinked="1"/>
+        <c:majorTickMark val="none"/>
+        <c:minorTickMark val="none"/>
+        <c:tickLblPos val="nextTo"/>
+        <c:spPr>
+          <a:noFill/>
+          <a:ln>
+            <a:noFill/>
+          </a:ln>
+          <a:effectLst/>
+        </c:spPr>
+        <c:txPr>
+          <a:bodyPr rot="-60000000" spcFirstLastPara="1" vertOverflow="ellipsis" vert="horz" wrap="square" anchor="ctr" anchorCtr="1"/>
+          <a:lstStyle/>
+          <a:p>
+            <a:pPr>
+              <a:defRPr sz="1197" b="0" i="0" u="none" strike="noStrike" kern="1200" baseline="0">
+                <a:solidFill>
+                  <a:schemeClr val="tx1">
+                    <a:lumMod val="65000"/>
+                    <a:lumOff val="35000"/>
+                  </a:schemeClr>
+                </a:solidFill>
+                <a:latin typeface="+mn-lt"/>
+                <a:ea typeface="+mn-ea"/>
+                <a:cs typeface="+mn-cs"/>
+              </a:defRPr>
+            </a:pPr>
+            <a:endParaRPr lang="en-US"/>
+          </a:p>
+        </c:txPr>
+        <c:crossAx val="-1825747136"/>
+        <c:crosses val="autoZero"/>
+        <c:crossBetween val="between"/>
+      </c:valAx>
+      <c:spPr>
+        <a:noFill/>
+        <a:ln>
+          <a:noFill/>
+        </a:ln>
+        <a:effectLst/>
+      </c:spPr>
+    </c:plotArea>
+    <c:legend>
+      <c:legendPos val="b"/>
+      <c:layout/>
+      <c:overlay val="0"/>
+      <c:spPr>
+        <a:noFill/>
+        <a:ln>
+          <a:noFill/>
+        </a:ln>
+        <a:effectLst/>
+      </c:spPr>
+      <c:txPr>
+        <a:bodyPr rot="0" spcFirstLastPara="1" vertOverflow="ellipsis" vert="horz" wrap="square" anchor="ctr" anchorCtr="1"/>
+        <a:lstStyle/>
+        <a:p>
+          <a:pPr>
+            <a:defRPr sz="1197" b="0" i="0" u="none" strike="noStrike" kern="1200" baseline="0">
+              <a:solidFill>
+                <a:schemeClr val="tx1">
+                  <a:lumMod val="65000"/>
+                  <a:lumOff val="35000"/>
+                </a:schemeClr>
+              </a:solidFill>
+              <a:latin typeface="+mn-lt"/>
+              <a:ea typeface="+mn-ea"/>
+              <a:cs typeface="+mn-cs"/>
+            </a:defRPr>
+          </a:pPr>
+          <a:endParaRPr lang="en-US"/>
+        </a:p>
+      </c:txPr>
+    </c:legend>
+    <c:plotVisOnly val="1"/>
+    <c:dispBlanksAs val="gap"/>
+    <c:showDLblsOverMax val="0"/>
+  </c:chart>
+  <c:spPr>
+    <a:noFill/>
+    <a:ln>
+      <a:noFill/>
+    </a:ln>
+    <a:effectLst/>
+  </c:spPr>
+  <c:txPr>
+    <a:bodyPr/>
+    <a:lstStyle/>
+    <a:p>
+      <a:pPr>
+        <a:defRPr/>
+      </a:pPr>
+      <a:endParaRPr lang="en-US"/>
+    </a:p>
+  </c:txPr>
+  <c:externalData r:id="rId3">
+    <c:autoUpdate val="0"/>
+  </c:externalData>
+</c:chartSpace>
+</file>
+
+<file path=ppt/charts/colors1.xml><?xml version="1.0" encoding="utf-8"?>
+<cs:colorStyle xmlns:cs="http://schemas.microsoft.com/office/drawing/2012/chartStyle" xmlns:a="http://schemas.openxmlformats.org/drawingml/2006/main" meth="cycle" id="10">
+  <a:schemeClr val="accent1"/>
+  <a:schemeClr val="accent2"/>
+  <a:schemeClr val="accent3"/>
+  <a:schemeClr val="accent4"/>
+  <a:schemeClr val="accent5"/>
+  <a:schemeClr val="accent6"/>
+  <cs:variation/>
+  <cs:variation>
+    <a:lumMod val="60000"/>
+  </cs:variation>
+  <cs:variation>
+    <a:lumMod val="80000"/>
+    <a:lumOff val="20000"/>
+  </cs:variation>
+  <cs:variation>
+    <a:lumMod val="80000"/>
+  </cs:variation>
+  <cs:variation>
+    <a:lumMod val="60000"/>
+    <a:lumOff val="40000"/>
+  </cs:variation>
+  <cs:variation>
+    <a:lumMod val="50000"/>
+  </cs:variation>
+  <cs:variation>
+    <a:lumMod val="70000"/>
+    <a:lumOff val="30000"/>
+  </cs:variation>
+  <cs:variation>
+    <a:lumMod val="70000"/>
+  </cs:variation>
+  <cs:variation>
+    <a:lumMod val="50000"/>
+    <a:lumOff val="50000"/>
+  </cs:variation>
+</cs:colorStyle>
+</file>
+
+<file path=ppt/charts/style1.xml><?xml version="1.0" encoding="utf-8"?>
+<cs:chartStyle xmlns:cs="http://schemas.microsoft.com/office/drawing/2012/chartStyle" xmlns:a="http://schemas.openxmlformats.org/drawingml/2006/main" id="201">
+  <cs:axisTitle>
+    <cs:lnRef idx="0"/>
+    <cs:fillRef idx="0"/>
+    <cs:effectRef idx="0"/>
+    <cs:fontRef idx="minor">
+      <a:schemeClr val="tx1">
+        <a:lumMod val="65000"/>
+        <a:lumOff val="35000"/>
+      </a:schemeClr>
+    </cs:fontRef>
+    <cs:defRPr sz="1330" kern="1200"/>
+  </cs:axisTitle>
+  <cs:categoryAxis>
+    <cs:lnRef idx="0"/>
+    <cs:fillRef idx="0"/>
+    <cs:effectRef idx="0"/>
+    <cs:fontRef idx="minor">
+      <a:schemeClr val="tx1">
+        <a:lumMod val="65000"/>
+        <a:lumOff val="35000"/>
+      </a:schemeClr>
+    </cs:fontRef>
+    <cs:spPr>
+      <a:ln w="9525" cap="flat" cmpd="sng" algn="ctr">
+        <a:solidFill>
+          <a:schemeClr val="tx1">
+            <a:lumMod val="15000"/>
+            <a:lumOff val="85000"/>
+          </a:schemeClr>
+        </a:solidFill>
+        <a:round/>
+      </a:ln>
+    </cs:spPr>
+    <cs:defRPr sz="1197" kern="1200"/>
+  </cs:categoryAxis>
+  <cs:chartArea mods="allowNoFillOverride allowNoLineOverride">
+    <cs:lnRef idx="0"/>
+    <cs:fillRef idx="0"/>
+    <cs:effectRef idx="0"/>
+    <cs:fontRef idx="minor">
+      <a:schemeClr val="tx1"/>
+    </cs:fontRef>
+    <cs:spPr>
+      <a:solidFill>
+        <a:schemeClr val="bg1"/>
+      </a:solidFill>
+      <a:ln w="9525" cap="flat" cmpd="sng" algn="ctr">
+        <a:solidFill>
+          <a:schemeClr val="tx1">
+            <a:lumMod val="15000"/>
+            <a:lumOff val="85000"/>
+          </a:schemeClr>
+        </a:solidFill>
+        <a:round/>
+      </a:ln>
+    </cs:spPr>
+    <cs:defRPr sz="1330" kern="1200"/>
+  </cs:chartArea>
+  <cs:dataLabel>
+    <cs:lnRef idx="0"/>
+    <cs:fillRef idx="0"/>
+    <cs:effectRef idx="0"/>
+    <cs:fontRef idx="minor">
+      <a:schemeClr val="tx1">
+        <a:lumMod val="75000"/>
+        <a:lumOff val="25000"/>
+      </a:schemeClr>
+    </cs:fontRef>
+    <cs:defRPr sz="1197" kern="1200"/>
+  </cs:dataLabel>
+  <cs:dataLabelCallout>
+    <cs:lnRef idx="0"/>
+    <cs:fillRef idx="0"/>
+    <cs:effectRef idx="0"/>
+    <cs:fontRef idx="minor">
+      <a:schemeClr val="dk1">
+        <a:lumMod val="65000"/>
+        <a:lumOff val="35000"/>
+      </a:schemeClr>
+    </cs:fontRef>
+    <cs:spPr>
+      <a:solidFill>
+        <a:schemeClr val="lt1"/>
+      </a:solidFill>
+      <a:ln>
+        <a:solidFill>
+          <a:schemeClr val="dk1">
+            <a:lumMod val="25000"/>
+            <a:lumOff val="75000"/>
+          </a:schemeClr>
+        </a:solidFill>
+      </a:ln>
+    </cs:spPr>
+    <cs:defRPr sz="1197" kern="1200"/>
+    <cs:bodyPr rot="0" spcFirstLastPara="1" vertOverflow="clip" horzOverflow="clip" vert="horz" wrap="square" lIns="36576" tIns="18288" rIns="36576" bIns="18288" anchor="ctr" anchorCtr="1">
+      <a:spAutoFit/>
+    </cs:bodyPr>
+  </cs:dataLabelCallout>
+  <cs:dataPoint>
+    <cs:lnRef idx="0"/>
+    <cs:fillRef idx="1">
+      <cs:styleClr val="auto"/>
+    </cs:fillRef>
+    <cs:effectRef idx="0"/>
+    <cs:fontRef idx="minor">
+      <a:schemeClr val="tx1"/>
+    </cs:fontRef>
+  </cs:dataPoint>
+  <cs:dataPoint3D>
+    <cs:lnRef idx="0"/>
+    <cs:fillRef idx="1">
+      <cs:styleClr val="auto"/>
+    </cs:fillRef>
+    <cs:effectRef idx="0"/>
+    <cs:fontRef idx="minor">
+      <a:schemeClr val="tx1"/>
+    </cs:fontRef>
+  </cs:dataPoint3D>
+  <cs:dataPointLine>
+    <cs:lnRef idx="0">
+      <cs:styleClr val="auto"/>
+    </cs:lnRef>
+    <cs:fillRef idx="1"/>
+    <cs:effectRef idx="0"/>
+    <cs:fontRef idx="minor">
+      <a:schemeClr val="tx1"/>
+    </cs:fontRef>
+    <cs:spPr>
+      <a:ln w="28575" cap="rnd">
+        <a:solidFill>
+          <a:schemeClr val="phClr"/>
+        </a:solidFill>
+        <a:round/>
+      </a:ln>
+    </cs:spPr>
+  </cs:dataPointLine>
+  <cs:dataPointMarker>
+    <cs:lnRef idx="0">
+      <cs:styleClr val="auto"/>
+    </cs:lnRef>
+    <cs:fillRef idx="1">
+      <cs:styleClr val="auto"/>
+    </cs:fillRef>
+    <cs:effectRef idx="0"/>
+    <cs:fontRef idx="minor">
+      <a:schemeClr val="tx1"/>
+    </cs:fontRef>
+    <cs:spPr>
+      <a:ln w="9525">
+        <a:solidFill>
+          <a:schemeClr val="phClr"/>
+        </a:solidFill>
+      </a:ln>
+    </cs:spPr>
+  </cs:dataPointMarker>
+  <cs:dataPointMarkerLayout symbol="circle" size="5"/>
+  <cs:dataPointWireframe>
+    <cs:lnRef idx="0">
+      <cs:styleClr val="auto"/>
+    </cs:lnRef>
+    <cs:fillRef idx="1"/>
+    <cs:effectRef idx="0"/>
+    <cs:fontRef idx="minor">
+      <a:schemeClr val="tx1"/>
+    </cs:fontRef>
+    <cs:spPr>
+      <a:ln w="9525" cap="rnd">
+        <a:solidFill>
+          <a:schemeClr val="phClr"/>
+        </a:solidFill>
+        <a:round/>
+      </a:ln>
+    </cs:spPr>
+  </cs:dataPointWireframe>
+  <cs:dataTable>
+    <cs:lnRef idx="0"/>
+    <cs:fillRef idx="0"/>
+    <cs:effectRef idx="0"/>
+    <cs:fontRef idx="minor">
+      <a:schemeClr val="tx1">
+        <a:lumMod val="65000"/>
+        <a:lumOff val="35000"/>
+      </a:schemeClr>
+    </cs:fontRef>
+    <cs:spPr>
+      <a:noFill/>
+      <a:ln w="9525" cap="flat" cmpd="sng" algn="ctr">
+        <a:solidFill>
+          <a:schemeClr val="tx1">
+            <a:lumMod val="15000"/>
+            <a:lumOff val="85000"/>
+          </a:schemeClr>
+        </a:solidFill>
+        <a:round/>
+      </a:ln>
+    </cs:spPr>
+    <cs:defRPr sz="1197" kern="1200"/>
+  </cs:dataTable>
+  <cs:downBar>
+    <cs:lnRef idx="0"/>
+    <cs:fillRef idx="0"/>
+    <cs:effectRef idx="0"/>
+    <cs:fontRef idx="minor">
+      <a:schemeClr val="dk1"/>
+    </cs:fontRef>
+    <cs:spPr>
+      <a:solidFill>
+        <a:schemeClr val="dk1">
+          <a:lumMod val="65000"/>
+          <a:lumOff val="35000"/>
+        </a:schemeClr>
+      </a:solidFill>
+      <a:ln w="9525">
+        <a:solidFill>
+          <a:schemeClr val="tx1">
+            <a:lumMod val="65000"/>
+            <a:lumOff val="35000"/>
+          </a:schemeClr>
+        </a:solidFill>
+      </a:ln>
+    </cs:spPr>
+  </cs:downBar>
+  <cs:dropLine>
+    <cs:lnRef idx="0"/>
+    <cs:fillRef idx="0"/>
+    <cs:effectRef idx="0"/>
+    <cs:fontRef idx="minor">
+      <a:schemeClr val="tx1"/>
+    </cs:fontRef>
+    <cs:spPr>
+      <a:ln w="9525" cap="flat" cmpd="sng" algn="ctr">
+        <a:solidFill>
+          <a:schemeClr val="tx1">
+            <a:lumMod val="35000"/>
+            <a:lumOff val="65000"/>
+          </a:schemeClr>
+        </a:solidFill>
+        <a:round/>
+      </a:ln>
+    </cs:spPr>
+  </cs:dropLine>
+  <cs:errorBar>
+    <cs:lnRef idx="0"/>
+    <cs:fillRef idx="0"/>
+    <cs:effectRef idx="0"/>
+    <cs:fontRef idx="minor">
+      <a:schemeClr val="tx1"/>
+    </cs:fontRef>
+    <cs:spPr>
+      <a:ln w="9525" cap="flat" cmpd="sng" algn="ctr">
+        <a:solidFill>
+          <a:schemeClr val="tx1">
+            <a:lumMod val="65000"/>
+            <a:lumOff val="35000"/>
+          </a:schemeClr>
+        </a:solidFill>
+        <a:round/>
+      </a:ln>
+    </cs:spPr>
+  </cs:errorBar>
+  <cs:floor>
+    <cs:lnRef idx="0"/>
+    <cs:fillRef idx="0"/>
+    <cs:effectRef idx="0"/>
+    <cs:fontRef idx="minor">
+      <a:schemeClr val="tx1"/>
+    </cs:fontRef>
+    <cs:spPr>
+      <a:noFill/>
+      <a:ln>
+        <a:noFill/>
+      </a:ln>
+    </cs:spPr>
+  </cs:floor>
+  <cs:gridlineMajor>
+    <cs:lnRef idx="0"/>
+    <cs:fillRef idx="0"/>
+    <cs:effectRef idx="0"/>
+    <cs:fontRef idx="minor">
+      <a:schemeClr val="tx1"/>
+    </cs:fontRef>
+    <cs:spPr>
+      <a:ln w="9525" cap="flat" cmpd="sng" algn="ctr">
+        <a:solidFill>
+          <a:schemeClr val="tx1">
+            <a:lumMod val="15000"/>
+            <a:lumOff val="85000"/>
+          </a:schemeClr>
+        </a:solidFill>
+        <a:round/>
+      </a:ln>
+    </cs:spPr>
+  </cs:gridlineMajor>
+  <cs:gridlineMinor>
+    <cs:lnRef idx="0"/>
+    <cs:fillRef idx="0"/>
+    <cs:effectRef idx="0"/>
+    <cs:fontRef idx="minor">
+      <a:schemeClr val="tx1"/>
+    </cs:fontRef>
+    <cs:spPr>
+      <a:ln w="9525" cap="flat" cmpd="sng" algn="ctr">
+        <a:solidFill>
+          <a:schemeClr val="tx1">
+            <a:lumMod val="5000"/>
+            <a:lumOff val="95000"/>
+          </a:schemeClr>
+        </a:solidFill>
+        <a:round/>
+      </a:ln>
+    </cs:spPr>
+  </cs:gridlineMinor>
+  <cs:hiLoLine>
+    <cs:lnRef idx="0"/>
+    <cs:fillRef idx="0"/>
+    <cs:effectRef idx="0"/>
+    <cs:fontRef idx="minor">
+      <a:schemeClr val="tx1"/>
+    </cs:fontRef>
+    <cs:spPr>
+      <a:ln w="9525" cap="flat" cmpd="sng" algn="ctr">
+        <a:solidFill>
+          <a:schemeClr val="tx1">
+            <a:lumMod val="75000"/>
+            <a:lumOff val="25000"/>
+          </a:schemeClr>
+        </a:solidFill>
+        <a:round/>
+      </a:ln>
+    </cs:spPr>
+  </cs:hiLoLine>
+  <cs:leaderLine>
+    <cs:lnRef idx="0"/>
+    <cs:fillRef idx="0"/>
+    <cs:effectRef idx="0"/>
+    <cs:fontRef idx="minor">
+      <a:schemeClr val="tx1"/>
+    </cs:fontRef>
+    <cs:spPr>
+      <a:ln w="9525" cap="flat" cmpd="sng" algn="ctr">
+        <a:solidFill>
+          <a:schemeClr val="tx1">
+            <a:lumMod val="35000"/>
+            <a:lumOff val="65000"/>
+          </a:schemeClr>
+        </a:solidFill>
+        <a:round/>
+      </a:ln>
+    </cs:spPr>
+  </cs:leaderLine>
+  <cs:legend>
+    <cs:lnRef idx="0"/>
+    <cs:fillRef idx="0"/>
+    <cs:effectRef idx="0"/>
+    <cs:fontRef idx="minor">
+      <a:schemeClr val="tx1">
+        <a:lumMod val="65000"/>
+        <a:lumOff val="35000"/>
+      </a:schemeClr>
+    </cs:fontRef>
+    <cs:defRPr sz="1197" kern="1200"/>
+  </cs:legend>
+  <cs:plotArea mods="allowNoFillOverride allowNoLineOverride">
+    <cs:lnRef idx="0"/>
+    <cs:fillRef idx="0"/>
+    <cs:effectRef idx="0"/>
+    <cs:fontRef idx="minor">
+      <a:schemeClr val="tx1"/>
+    </cs:fontRef>
+  </cs:plotArea>
+  <cs:plotArea3D mods="allowNoFillOverride allowNoLineOverride">
+    <cs:lnRef idx="0"/>
+    <cs:fillRef idx="0"/>
+    <cs:effectRef idx="0"/>
+    <cs:fontRef idx="minor">
+      <a:schemeClr val="tx1"/>
+    </cs:fontRef>
+  </cs:plotArea3D>
+  <cs:seriesAxis>
+    <cs:lnRef idx="0"/>
+    <cs:fillRef idx="0"/>
+    <cs:effectRef idx="0"/>
+    <cs:fontRef idx="minor">
+      <a:schemeClr val="tx1">
+        <a:lumMod val="65000"/>
+        <a:lumOff val="35000"/>
+      </a:schemeClr>
+    </cs:fontRef>
+    <cs:defRPr sz="1197" kern="1200"/>
+  </cs:seriesAxis>
+  <cs:seriesLine>
+    <cs:lnRef idx="0"/>
+    <cs:fillRef idx="0"/>
+    <cs:effectRef idx="0"/>
+    <cs:fontRef idx="minor">
+      <a:schemeClr val="tx1"/>
+    </cs:fontRef>
+    <cs:spPr>
+      <a:ln w="9525" cap="flat" cmpd="sng" algn="ctr">
+        <a:solidFill>
+          <a:schemeClr val="tx1">
+            <a:lumMod val="35000"/>
+            <a:lumOff val="65000"/>
+          </a:schemeClr>
+        </a:solidFill>
+        <a:round/>
+      </a:ln>
+    </cs:spPr>
+  </cs:seriesLine>
+  <cs:title>
+    <cs:lnRef idx="0"/>
+    <cs:fillRef idx="0"/>
+    <cs:effectRef idx="0"/>
+    <cs:fontRef idx="minor">
+      <a:schemeClr val="tx1">
+        <a:lumMod val="65000"/>
+        <a:lumOff val="35000"/>
+      </a:schemeClr>
+    </cs:fontRef>
+    <cs:defRPr sz="1862" b="0" kern="1200" spc="0" baseline="0"/>
+  </cs:title>
+  <cs:trendline>
+    <cs:lnRef idx="0">
+      <cs:styleClr val="auto"/>
+    </cs:lnRef>
+    <cs:fillRef idx="0"/>
+    <cs:effectRef idx="0"/>
+    <cs:fontRef idx="minor">
+      <a:schemeClr val="tx1"/>
+    </cs:fontRef>
+    <cs:spPr>
+      <a:ln w="19050" cap="rnd">
+        <a:solidFill>
+          <a:schemeClr val="phClr"/>
+        </a:solidFill>
+        <a:prstDash val="sysDot"/>
+      </a:ln>
+    </cs:spPr>
+  </cs:trendline>
+  <cs:trendlineLabel>
+    <cs:lnRef idx="0"/>
+    <cs:fillRef idx="0"/>
+    <cs:effectRef idx="0"/>
+    <cs:fontRef idx="minor">
+      <a:schemeClr val="tx1">
+        <a:lumMod val="65000"/>
+        <a:lumOff val="35000"/>
+      </a:schemeClr>
+    </cs:fontRef>
+    <cs:defRPr sz="1197" kern="1200"/>
+  </cs:trendlineLabel>
+  <cs:upBar>
+    <cs:lnRef idx="0"/>
+    <cs:fillRef idx="0"/>
+    <cs:effectRef idx="0"/>
+    <cs:fontRef idx="minor">
+      <a:schemeClr val="dk1"/>
+    </cs:fontRef>
+    <cs:spPr>
+      <a:solidFill>
+        <a:schemeClr val="lt1"/>
+      </a:solidFill>
+      <a:ln w="9525">
+        <a:solidFill>
+          <a:schemeClr val="tx1">
+            <a:lumMod val="15000"/>
+            <a:lumOff val="85000"/>
+          </a:schemeClr>
+        </a:solidFill>
+      </a:ln>
+    </cs:spPr>
+  </cs:upBar>
+  <cs:valueAxis>
+    <cs:lnRef idx="0"/>
+    <cs:fillRef idx="0"/>
+    <cs:effectRef idx="0"/>
+    <cs:fontRef idx="minor">
+      <a:schemeClr val="tx1">
+        <a:lumMod val="65000"/>
+        <a:lumOff val="35000"/>
+      </a:schemeClr>
+    </cs:fontRef>
+    <cs:defRPr sz="1197" kern="1200"/>
+  </cs:valueAxis>
+  <cs:wall>
+    <cs:lnRef idx="0"/>
+    <cs:fillRef idx="0"/>
+    <cs:effectRef idx="0"/>
+    <cs:fontRef idx="minor">
+      <a:schemeClr val="tx1"/>
+    </cs:fontRef>
+    <cs:spPr>
+      <a:noFill/>
+      <a:ln>
+        <a:noFill/>
+      </a:ln>
+    </cs:spPr>
+  </cs:wall>
+</cs:chartStyle>
+</file>
+
 <file path=ppt/notesMasters/notesMaster1.xml><?xml version="1.0" encoding="utf-8"?>
 <p:notesMaster xmlns:a="http://schemas.openxmlformats.org/drawingml/2006/main" xmlns:r="http://schemas.openxmlformats.org/officeDocument/2006/relationships" xmlns:p="http://schemas.openxmlformats.org/presentationml/2006/main">
   <p:cSld>
@@ -217,7 +1197,7 @@
           <a:p>
             <a:fld id="{B0028AB1-267B-474E-BD8A-C704628DBB4D}" type="datetimeFigureOut">
               <a:rPr lang="en-GB" smtClean="0"/>
-              <a:t>08/08/2015</a:t>
+              <a:t>11/08/2015</a:t>
             </a:fld>
             <a:endParaRPr lang="en-GB"/>
           </a:p>
@@ -1196,7 +2176,7 @@
           <a:p>
             <a:fld id="{6A0A7C41-FC34-4E7A-8F1D-282D4830B78C}" type="datetimeFigureOut">
               <a:rPr lang="en-GB" smtClean="0"/>
-              <a:t>08/08/2015</a:t>
+              <a:t>11/08/2015</a:t>
             </a:fld>
             <a:endParaRPr lang="en-GB"/>
           </a:p>
@@ -1366,7 +2346,7 @@
           <a:p>
             <a:fld id="{6A0A7C41-FC34-4E7A-8F1D-282D4830B78C}" type="datetimeFigureOut">
               <a:rPr lang="en-GB" smtClean="0"/>
-              <a:t>08/08/2015</a:t>
+              <a:t>11/08/2015</a:t>
             </a:fld>
             <a:endParaRPr lang="en-GB"/>
           </a:p>
@@ -1546,7 +2526,7 @@
           <a:p>
             <a:fld id="{6A0A7C41-FC34-4E7A-8F1D-282D4830B78C}" type="datetimeFigureOut">
               <a:rPr lang="en-GB" smtClean="0"/>
-              <a:t>08/08/2015</a:t>
+              <a:t>11/08/2015</a:t>
             </a:fld>
             <a:endParaRPr lang="en-GB"/>
           </a:p>
@@ -1716,7 +2696,7 @@
           <a:p>
             <a:fld id="{6A0A7C41-FC34-4E7A-8F1D-282D4830B78C}" type="datetimeFigureOut">
               <a:rPr lang="en-GB" smtClean="0"/>
-              <a:t>08/08/2015</a:t>
+              <a:t>11/08/2015</a:t>
             </a:fld>
             <a:endParaRPr lang="en-GB"/>
           </a:p>
@@ -1962,7 +2942,7 @@
           <a:p>
             <a:fld id="{6A0A7C41-FC34-4E7A-8F1D-282D4830B78C}" type="datetimeFigureOut">
               <a:rPr lang="en-GB" smtClean="0"/>
-              <a:t>08/08/2015</a:t>
+              <a:t>11/08/2015</a:t>
             </a:fld>
             <a:endParaRPr lang="en-GB"/>
           </a:p>
@@ -2194,7 +3174,7 @@
           <a:p>
             <a:fld id="{6A0A7C41-FC34-4E7A-8F1D-282D4830B78C}" type="datetimeFigureOut">
               <a:rPr lang="en-GB" smtClean="0"/>
-              <a:t>08/08/2015</a:t>
+              <a:t>11/08/2015</a:t>
             </a:fld>
             <a:endParaRPr lang="en-GB"/>
           </a:p>
@@ -2561,7 +3541,7 @@
           <a:p>
             <a:fld id="{6A0A7C41-FC34-4E7A-8F1D-282D4830B78C}" type="datetimeFigureOut">
               <a:rPr lang="en-GB" smtClean="0"/>
-              <a:t>08/08/2015</a:t>
+              <a:t>11/08/2015</a:t>
             </a:fld>
             <a:endParaRPr lang="en-GB"/>
           </a:p>
@@ -2679,7 +3659,7 @@
           <a:p>
             <a:fld id="{6A0A7C41-FC34-4E7A-8F1D-282D4830B78C}" type="datetimeFigureOut">
               <a:rPr lang="en-GB" smtClean="0"/>
-              <a:t>08/08/2015</a:t>
+              <a:t>11/08/2015</a:t>
             </a:fld>
             <a:endParaRPr lang="en-GB"/>
           </a:p>
@@ -2774,7 +3754,7 @@
           <a:p>
             <a:fld id="{6A0A7C41-FC34-4E7A-8F1D-282D4830B78C}" type="datetimeFigureOut">
               <a:rPr lang="en-GB" smtClean="0"/>
-              <a:t>08/08/2015</a:t>
+              <a:t>11/08/2015</a:t>
             </a:fld>
             <a:endParaRPr lang="en-GB"/>
           </a:p>
@@ -3051,7 +4031,7 @@
           <a:p>
             <a:fld id="{6A0A7C41-FC34-4E7A-8F1D-282D4830B78C}" type="datetimeFigureOut">
               <a:rPr lang="en-GB" smtClean="0"/>
-              <a:t>08/08/2015</a:t>
+              <a:t>11/08/2015</a:t>
             </a:fld>
             <a:endParaRPr lang="en-GB"/>
           </a:p>
@@ -3308,7 +4288,7 @@
           <a:p>
             <a:fld id="{6A0A7C41-FC34-4E7A-8F1D-282D4830B78C}" type="datetimeFigureOut">
               <a:rPr lang="en-GB" smtClean="0"/>
-              <a:t>08/08/2015</a:t>
+              <a:t>11/08/2015</a:t>
             </a:fld>
             <a:endParaRPr lang="en-GB"/>
           </a:p>
@@ -3521,7 +4501,7 @@
           <a:p>
             <a:fld id="{6A0A7C41-FC34-4E7A-8F1D-282D4830B78C}" type="datetimeFigureOut">
               <a:rPr lang="en-GB" smtClean="0"/>
-              <a:t>08/08/2015</a:t>
+              <a:t>11/08/2015</a:t>
             </a:fld>
             <a:endParaRPr lang="en-GB"/>
           </a:p>
@@ -3994,6 +4974,28 @@
           <a:chExt cx="0" cy="0"/>
         </a:xfrm>
       </p:grpSpPr>
+      <p:graphicFrame>
+        <p:nvGraphicFramePr>
+          <p:cNvPr id="4" name="Chart 3"/>
+          <p:cNvGraphicFramePr/>
+          <p:nvPr>
+            <p:extLst>
+              <p:ext uri="{D42A27DB-BD31-4B8C-83A1-F6EECF244321}">
+                <p14:modId xmlns:p14="http://schemas.microsoft.com/office/powerpoint/2010/main" val="1045958517"/>
+              </p:ext>
+            </p:extLst>
+          </p:nvPr>
+        </p:nvGraphicFramePr>
+        <p:xfrm>
+          <a:off x="1199885" y="559946"/>
+          <a:ext cx="4799542" cy="3199695"/>
+        </p:xfrm>
+        <a:graphic>
+          <a:graphicData uri="http://schemas.openxmlformats.org/drawingml/2006/chart">
+            <c:chart xmlns:c="http://schemas.openxmlformats.org/drawingml/2006/chart" xmlns:r="http://schemas.openxmlformats.org/officeDocument/2006/relationships" r:id="rId2"/>
+          </a:graphicData>
+        </a:graphic>
+      </p:graphicFrame>
     </p:spTree>
     <p:extLst>
       <p:ext uri="{BB962C8B-B14F-4D97-AF65-F5344CB8AC3E}">

</xml_diff>

<commit_message>
Carried on with results.
</commit_message>
<xml_diff>
--- a/Figures/Powerpoints/2 plots.pptx
+++ b/Figures/Powerpoints/2 plots.pptx
@@ -5,7 +5,7 @@
     <p:sldMasterId id="2147483660" r:id="rId1"/>
   </p:sldMasterIdLst>
   <p:notesMasterIdLst>
-    <p:notesMasterId r:id="rId15"/>
+    <p:notesMasterId r:id="rId17"/>
   </p:notesMasterIdLst>
   <p:sldIdLst>
     <p:sldId id="256" r:id="rId2"/>
@@ -21,6 +21,8 @@
     <p:sldId id="267" r:id="rId12"/>
     <p:sldId id="268" r:id="rId13"/>
     <p:sldId id="269" r:id="rId14"/>
+    <p:sldId id="270" r:id="rId15"/>
+    <p:sldId id="271" r:id="rId16"/>
   </p:sldIdLst>
   <p:sldSz cx="7199313" cy="4319588"/>
   <p:notesSz cx="6858000" cy="9144000"/>
@@ -397,11 +399,11 @@
         </c:dLbls>
         <c:gapWidth val="219"/>
         <c:overlap val="-27"/>
-        <c:axId val="-298450368"/>
-        <c:axId val="-298448192"/>
+        <c:axId val="331889808"/>
+        <c:axId val="331885456"/>
       </c:barChart>
       <c:catAx>
-        <c:axId val="-298450368"/>
+        <c:axId val="331889808"/>
         <c:scaling>
           <c:orientation val="minMax"/>
         </c:scaling>
@@ -444,7 +446,7 @@
             <a:endParaRPr lang="en-US"/>
           </a:p>
         </c:txPr>
-        <c:crossAx val="-298448192"/>
+        <c:crossAx val="331885456"/>
         <c:crosses val="autoZero"/>
         <c:auto val="1"/>
         <c:lblAlgn val="ctr"/>
@@ -452,7 +454,7 @@
         <c:noMultiLvlLbl val="0"/>
       </c:catAx>
       <c:valAx>
-        <c:axId val="-298448192"/>
+        <c:axId val="331885456"/>
         <c:scaling>
           <c:orientation val="minMax"/>
         </c:scaling>
@@ -503,7 +505,7 @@
             <a:endParaRPr lang="en-US"/>
           </a:p>
         </c:txPr>
-        <c:crossAx val="-298450368"/>
+        <c:crossAx val="331889808"/>
         <c:crosses val="autoZero"/>
         <c:crossBetween val="between"/>
       </c:valAx>
@@ -1198,7 +1200,7 @@
           <a:p>
             <a:fld id="{B0028AB1-267B-474E-BD8A-C704628DBB4D}" type="datetimeFigureOut">
               <a:rPr lang="en-GB" smtClean="0"/>
-              <a:t>20/08/2015</a:t>
+              <a:t>30/08/2015</a:t>
             </a:fld>
             <a:endParaRPr lang="en-GB"/>
           </a:p>
@@ -1560,6 +1562,94 @@
 </p:notes>
 </file>
 
+<file path=ppt/notesSlides/notesSlide10.xml><?xml version="1.0" encoding="utf-8"?>
+<p:notes xmlns:a="http://schemas.openxmlformats.org/drawingml/2006/main" xmlns:r="http://schemas.openxmlformats.org/officeDocument/2006/relationships" xmlns:p="http://schemas.openxmlformats.org/presentationml/2006/main">
+  <p:cSld>
+    <p:spTree>
+      <p:nvGrpSpPr>
+        <p:cNvPr id="1" name=""/>
+        <p:cNvGrpSpPr/>
+        <p:nvPr/>
+      </p:nvGrpSpPr>
+      <p:grpSpPr>
+        <a:xfrm>
+          <a:off x="0" y="0"/>
+          <a:ext cx="0" cy="0"/>
+          <a:chOff x="0" y="0"/>
+          <a:chExt cx="0" cy="0"/>
+        </a:xfrm>
+      </p:grpSpPr>
+      <p:sp>
+        <p:nvSpPr>
+          <p:cNvPr id="2" name="Slide Image Placeholder 1"/>
+          <p:cNvSpPr>
+            <a:spLocks noGrp="1" noRot="1" noChangeAspect="1"/>
+          </p:cNvSpPr>
+          <p:nvPr>
+            <p:ph type="sldImg"/>
+          </p:nvPr>
+        </p:nvSpPr>
+        <p:spPr/>
+      </p:sp>
+      <p:sp>
+        <p:nvSpPr>
+          <p:cNvPr id="3" name="Notes Placeholder 2"/>
+          <p:cNvSpPr>
+            <a:spLocks noGrp="1"/>
+          </p:cNvSpPr>
+          <p:nvPr>
+            <p:ph type="body" idx="1"/>
+          </p:nvPr>
+        </p:nvSpPr>
+        <p:spPr/>
+        <p:txBody>
+          <a:bodyPr/>
+          <a:lstStyle/>
+          <a:p>
+            <a:r>
+              <a:rPr lang="en-GB" dirty="0" smtClean="0"/>
+              <a:t>Bone Marrow</a:t>
+            </a:r>
+            <a:endParaRPr lang="en-GB" dirty="0"/>
+          </a:p>
+        </p:txBody>
+      </p:sp>
+      <p:sp>
+        <p:nvSpPr>
+          <p:cNvPr id="4" name="Slide Number Placeholder 3"/>
+          <p:cNvSpPr>
+            <a:spLocks noGrp="1"/>
+          </p:cNvSpPr>
+          <p:nvPr>
+            <p:ph type="sldNum" sz="quarter" idx="10"/>
+          </p:nvPr>
+        </p:nvSpPr>
+        <p:spPr/>
+        <p:txBody>
+          <a:bodyPr/>
+          <a:lstStyle/>
+          <a:p>
+            <a:fld id="{299D7968-2305-4D34-80DD-72B95C617568}" type="slidenum">
+              <a:rPr lang="en-GB" smtClean="0"/>
+              <a:t>15</a:t>
+            </a:fld>
+            <a:endParaRPr lang="en-GB"/>
+          </a:p>
+        </p:txBody>
+      </p:sp>
+    </p:spTree>
+    <p:extLst>
+      <p:ext uri="{BB962C8B-B14F-4D97-AF65-F5344CB8AC3E}">
+        <p14:creationId xmlns:p14="http://schemas.microsoft.com/office/powerpoint/2010/main" val="3342612766"/>
+      </p:ext>
+    </p:extLst>
+  </p:cSld>
+  <p:clrMapOvr>
+    <a:masterClrMapping/>
+  </p:clrMapOvr>
+</p:notes>
+</file>
+
 <file path=ppt/notesSlides/notesSlide2.xml><?xml version="1.0" encoding="utf-8"?>
 <p:notes xmlns:a="http://schemas.openxmlformats.org/drawingml/2006/main" xmlns:r="http://schemas.openxmlformats.org/officeDocument/2006/relationships" xmlns:p="http://schemas.openxmlformats.org/presentationml/2006/main">
   <p:cSld>
@@ -2229,6 +2319,94 @@
     <p:extLst>
       <p:ext uri="{BB962C8B-B14F-4D97-AF65-F5344CB8AC3E}">
         <p14:creationId xmlns:p14="http://schemas.microsoft.com/office/powerpoint/2010/main" val="1053137107"/>
+      </p:ext>
+    </p:extLst>
+  </p:cSld>
+  <p:clrMapOvr>
+    <a:masterClrMapping/>
+  </p:clrMapOvr>
+</p:notes>
+</file>
+
+<file path=ppt/notesSlides/notesSlide9.xml><?xml version="1.0" encoding="utf-8"?>
+<p:notes xmlns:a="http://schemas.openxmlformats.org/drawingml/2006/main" xmlns:r="http://schemas.openxmlformats.org/officeDocument/2006/relationships" xmlns:p="http://schemas.openxmlformats.org/presentationml/2006/main">
+  <p:cSld>
+    <p:spTree>
+      <p:nvGrpSpPr>
+        <p:cNvPr id="1" name=""/>
+        <p:cNvGrpSpPr/>
+        <p:nvPr/>
+      </p:nvGrpSpPr>
+      <p:grpSpPr>
+        <a:xfrm>
+          <a:off x="0" y="0"/>
+          <a:ext cx="0" cy="0"/>
+          <a:chOff x="0" y="0"/>
+          <a:chExt cx="0" cy="0"/>
+        </a:xfrm>
+      </p:grpSpPr>
+      <p:sp>
+        <p:nvSpPr>
+          <p:cNvPr id="2" name="Slide Image Placeholder 1"/>
+          <p:cNvSpPr>
+            <a:spLocks noGrp="1" noRot="1" noChangeAspect="1"/>
+          </p:cNvSpPr>
+          <p:nvPr>
+            <p:ph type="sldImg"/>
+          </p:nvPr>
+        </p:nvSpPr>
+        <p:spPr/>
+      </p:sp>
+      <p:sp>
+        <p:nvSpPr>
+          <p:cNvPr id="3" name="Notes Placeholder 2"/>
+          <p:cNvSpPr>
+            <a:spLocks noGrp="1"/>
+          </p:cNvSpPr>
+          <p:nvPr>
+            <p:ph type="body" idx="1"/>
+          </p:nvPr>
+        </p:nvSpPr>
+        <p:spPr/>
+        <p:txBody>
+          <a:bodyPr/>
+          <a:lstStyle/>
+          <a:p>
+            <a:r>
+              <a:rPr lang="en-GB" dirty="0" smtClean="0"/>
+              <a:t>Thymus</a:t>
+            </a:r>
+            <a:endParaRPr lang="en-GB" dirty="0"/>
+          </a:p>
+        </p:txBody>
+      </p:sp>
+      <p:sp>
+        <p:nvSpPr>
+          <p:cNvPr id="4" name="Slide Number Placeholder 3"/>
+          <p:cNvSpPr>
+            <a:spLocks noGrp="1"/>
+          </p:cNvSpPr>
+          <p:nvPr>
+            <p:ph type="sldNum" sz="quarter" idx="10"/>
+          </p:nvPr>
+        </p:nvSpPr>
+        <p:spPr/>
+        <p:txBody>
+          <a:bodyPr/>
+          <a:lstStyle/>
+          <a:p>
+            <a:fld id="{299D7968-2305-4D34-80DD-72B95C617568}" type="slidenum">
+              <a:rPr lang="en-GB" smtClean="0"/>
+              <a:t>14</a:t>
+            </a:fld>
+            <a:endParaRPr lang="en-GB"/>
+          </a:p>
+        </p:txBody>
+      </p:sp>
+    </p:spTree>
+    <p:extLst>
+      <p:ext uri="{BB962C8B-B14F-4D97-AF65-F5344CB8AC3E}">
+        <p14:creationId xmlns:p14="http://schemas.microsoft.com/office/powerpoint/2010/main" val="1499668877"/>
       </p:ext>
     </p:extLst>
   </p:cSld>
@@ -2369,7 +2547,7 @@
           <a:p>
             <a:fld id="{6A0A7C41-FC34-4E7A-8F1D-282D4830B78C}" type="datetimeFigureOut">
               <a:rPr lang="en-GB" smtClean="0"/>
-              <a:t>20/08/2015</a:t>
+              <a:t>30/08/2015</a:t>
             </a:fld>
             <a:endParaRPr lang="en-GB"/>
           </a:p>
@@ -2539,7 +2717,7 @@
           <a:p>
             <a:fld id="{6A0A7C41-FC34-4E7A-8F1D-282D4830B78C}" type="datetimeFigureOut">
               <a:rPr lang="en-GB" smtClean="0"/>
-              <a:t>20/08/2015</a:t>
+              <a:t>30/08/2015</a:t>
             </a:fld>
             <a:endParaRPr lang="en-GB"/>
           </a:p>
@@ -2719,7 +2897,7 @@
           <a:p>
             <a:fld id="{6A0A7C41-FC34-4E7A-8F1D-282D4830B78C}" type="datetimeFigureOut">
               <a:rPr lang="en-GB" smtClean="0"/>
-              <a:t>20/08/2015</a:t>
+              <a:t>30/08/2015</a:t>
             </a:fld>
             <a:endParaRPr lang="en-GB"/>
           </a:p>
@@ -2889,7 +3067,7 @@
           <a:p>
             <a:fld id="{6A0A7C41-FC34-4E7A-8F1D-282D4830B78C}" type="datetimeFigureOut">
               <a:rPr lang="en-GB" smtClean="0"/>
-              <a:t>20/08/2015</a:t>
+              <a:t>30/08/2015</a:t>
             </a:fld>
             <a:endParaRPr lang="en-GB"/>
           </a:p>
@@ -3135,7 +3313,7 @@
           <a:p>
             <a:fld id="{6A0A7C41-FC34-4E7A-8F1D-282D4830B78C}" type="datetimeFigureOut">
               <a:rPr lang="en-GB" smtClean="0"/>
-              <a:t>20/08/2015</a:t>
+              <a:t>30/08/2015</a:t>
             </a:fld>
             <a:endParaRPr lang="en-GB"/>
           </a:p>
@@ -3367,7 +3545,7 @@
           <a:p>
             <a:fld id="{6A0A7C41-FC34-4E7A-8F1D-282D4830B78C}" type="datetimeFigureOut">
               <a:rPr lang="en-GB" smtClean="0"/>
-              <a:t>20/08/2015</a:t>
+              <a:t>30/08/2015</a:t>
             </a:fld>
             <a:endParaRPr lang="en-GB"/>
           </a:p>
@@ -3734,7 +3912,7 @@
           <a:p>
             <a:fld id="{6A0A7C41-FC34-4E7A-8F1D-282D4830B78C}" type="datetimeFigureOut">
               <a:rPr lang="en-GB" smtClean="0"/>
-              <a:t>20/08/2015</a:t>
+              <a:t>30/08/2015</a:t>
             </a:fld>
             <a:endParaRPr lang="en-GB"/>
           </a:p>
@@ -3852,7 +4030,7 @@
           <a:p>
             <a:fld id="{6A0A7C41-FC34-4E7A-8F1D-282D4830B78C}" type="datetimeFigureOut">
               <a:rPr lang="en-GB" smtClean="0"/>
-              <a:t>20/08/2015</a:t>
+              <a:t>30/08/2015</a:t>
             </a:fld>
             <a:endParaRPr lang="en-GB"/>
           </a:p>
@@ -3947,7 +4125,7 @@
           <a:p>
             <a:fld id="{6A0A7C41-FC34-4E7A-8F1D-282D4830B78C}" type="datetimeFigureOut">
               <a:rPr lang="en-GB" smtClean="0"/>
-              <a:t>20/08/2015</a:t>
+              <a:t>30/08/2015</a:t>
             </a:fld>
             <a:endParaRPr lang="en-GB"/>
           </a:p>
@@ -4224,7 +4402,7 @@
           <a:p>
             <a:fld id="{6A0A7C41-FC34-4E7A-8F1D-282D4830B78C}" type="datetimeFigureOut">
               <a:rPr lang="en-GB" smtClean="0"/>
-              <a:t>20/08/2015</a:t>
+              <a:t>30/08/2015</a:t>
             </a:fld>
             <a:endParaRPr lang="en-GB"/>
           </a:p>
@@ -4481,7 +4659,7 @@
           <a:p>
             <a:fld id="{6A0A7C41-FC34-4E7A-8F1D-282D4830B78C}" type="datetimeFigureOut">
               <a:rPr lang="en-GB" smtClean="0"/>
-              <a:t>20/08/2015</a:t>
+              <a:t>30/08/2015</a:t>
             </a:fld>
             <a:endParaRPr lang="en-GB"/>
           </a:p>
@@ -4694,7 +4872,7 @@
           <a:p>
             <a:fld id="{6A0A7C41-FC34-4E7A-8F1D-282D4830B78C}" type="datetimeFigureOut">
               <a:rPr lang="en-GB" smtClean="0"/>
-              <a:t>20/08/2015</a:t>
+              <a:t>30/08/2015</a:t>
             </a:fld>
             <a:endParaRPr lang="en-GB"/>
           </a:p>
@@ -5800,6 +5978,794 @@
       </p:par>
     </p:tnLst>
   </p:timing>
+</p:sld>
+</file>
+
+<file path=ppt/slides/slide14.xml><?xml version="1.0" encoding="utf-8"?>
+<p:sld xmlns:a="http://schemas.openxmlformats.org/drawingml/2006/main" xmlns:r="http://schemas.openxmlformats.org/officeDocument/2006/relationships" xmlns:p="http://schemas.openxmlformats.org/presentationml/2006/main">
+  <p:cSld>
+    <p:spTree>
+      <p:nvGrpSpPr>
+        <p:cNvPr id="1" name=""/>
+        <p:cNvGrpSpPr/>
+        <p:nvPr/>
+      </p:nvGrpSpPr>
+      <p:grpSpPr>
+        <a:xfrm>
+          <a:off x="0" y="0"/>
+          <a:ext cx="0" cy="0"/>
+          <a:chOff x="0" y="0"/>
+          <a:chExt cx="0" cy="0"/>
+        </a:xfrm>
+      </p:grpSpPr>
+      <p:pic>
+        <p:nvPicPr>
+          <p:cNvPr id="3" name="Picture 2"/>
+          <p:cNvPicPr>
+            <a:picLocks noChangeAspect="1"/>
+          </p:cNvPicPr>
+          <p:nvPr/>
+        </p:nvPicPr>
+        <p:blipFill>
+          <a:blip r:embed="rId3"/>
+          <a:stretch>
+            <a:fillRect/>
+          </a:stretch>
+        </p:blipFill>
+        <p:spPr>
+          <a:xfrm>
+            <a:off x="93663" y="339725"/>
+            <a:ext cx="3505200" cy="3638550"/>
+          </a:xfrm>
+          <a:prstGeom prst="rect">
+            <a:avLst/>
+          </a:prstGeom>
+        </p:spPr>
+      </p:pic>
+      <p:pic>
+        <p:nvPicPr>
+          <p:cNvPr id="4" name="Picture 3"/>
+          <p:cNvPicPr>
+            <a:picLocks noChangeAspect="1"/>
+          </p:cNvPicPr>
+          <p:nvPr/>
+        </p:nvPicPr>
+        <p:blipFill>
+          <a:blip r:embed="rId4"/>
+          <a:stretch>
+            <a:fillRect/>
+          </a:stretch>
+        </p:blipFill>
+        <p:spPr>
+          <a:xfrm>
+            <a:off x="3606814" y="339725"/>
+            <a:ext cx="3505200" cy="3638550"/>
+          </a:xfrm>
+          <a:prstGeom prst="rect">
+            <a:avLst/>
+          </a:prstGeom>
+        </p:spPr>
+      </p:pic>
+      <p:sp>
+        <p:nvSpPr>
+          <p:cNvPr id="5" name="TextBox 4"/>
+          <p:cNvSpPr txBox="1"/>
+          <p:nvPr/>
+        </p:nvSpPr>
+        <p:spPr>
+          <a:xfrm rot="16200000">
+            <a:off x="-727963" y="1897175"/>
+            <a:ext cx="2176216" cy="461665"/>
+          </a:xfrm>
+          <a:prstGeom prst="rect">
+            <a:avLst/>
+          </a:prstGeom>
+          <a:solidFill>
+            <a:schemeClr val="bg1"/>
+          </a:solidFill>
+        </p:spPr>
+        <p:txBody>
+          <a:bodyPr wrap="square" rtlCol="0">
+            <a:spAutoFit/>
+          </a:bodyPr>
+          <a:lstStyle/>
+          <a:p>
+            <a:r>
+              <a:rPr lang="en-GB" sz="2400" dirty="0" smtClean="0"/>
+              <a:t>Side Scatter</a:t>
+            </a:r>
+            <a:endParaRPr lang="en-GB" sz="2400" dirty="0"/>
+          </a:p>
+        </p:txBody>
+      </p:sp>
+      <p:sp>
+        <p:nvSpPr>
+          <p:cNvPr id="6" name="TextBox 5"/>
+          <p:cNvSpPr txBox="1"/>
+          <p:nvPr/>
+        </p:nvSpPr>
+        <p:spPr>
+          <a:xfrm>
+            <a:off x="907169" y="3468937"/>
+            <a:ext cx="2402382" cy="461665"/>
+          </a:xfrm>
+          <a:prstGeom prst="rect">
+            <a:avLst/>
+          </a:prstGeom>
+          <a:solidFill>
+            <a:schemeClr val="bg1"/>
+          </a:solidFill>
+        </p:spPr>
+        <p:txBody>
+          <a:bodyPr wrap="square" rtlCol="0">
+            <a:spAutoFit/>
+          </a:bodyPr>
+          <a:lstStyle/>
+          <a:p>
+            <a:r>
+              <a:rPr lang="en-GB" sz="2400" dirty="0" smtClean="0"/>
+              <a:t>CD43</a:t>
+            </a:r>
+            <a:endParaRPr lang="en-GB" sz="2400" dirty="0"/>
+          </a:p>
+        </p:txBody>
+      </p:sp>
+      <p:sp>
+        <p:nvSpPr>
+          <p:cNvPr id="7" name="TextBox 6"/>
+          <p:cNvSpPr txBox="1"/>
+          <p:nvPr/>
+        </p:nvSpPr>
+        <p:spPr>
+          <a:xfrm rot="16200000">
+            <a:off x="2794469" y="1897175"/>
+            <a:ext cx="2176216" cy="461665"/>
+          </a:xfrm>
+          <a:prstGeom prst="rect">
+            <a:avLst/>
+          </a:prstGeom>
+          <a:solidFill>
+            <a:schemeClr val="bg1"/>
+          </a:solidFill>
+        </p:spPr>
+        <p:txBody>
+          <a:bodyPr wrap="square" rtlCol="0">
+            <a:spAutoFit/>
+          </a:bodyPr>
+          <a:lstStyle/>
+          <a:p>
+            <a:r>
+              <a:rPr lang="en-GB" sz="2400" dirty="0" smtClean="0"/>
+              <a:t>Side Scatter</a:t>
+            </a:r>
+            <a:endParaRPr lang="en-GB" sz="2400" dirty="0"/>
+          </a:p>
+        </p:txBody>
+      </p:sp>
+      <p:sp>
+        <p:nvSpPr>
+          <p:cNvPr id="8" name="TextBox 7"/>
+          <p:cNvSpPr txBox="1"/>
+          <p:nvPr/>
+        </p:nvSpPr>
+        <p:spPr>
+          <a:xfrm>
+            <a:off x="4429601" y="3468937"/>
+            <a:ext cx="2402382" cy="461665"/>
+          </a:xfrm>
+          <a:prstGeom prst="rect">
+            <a:avLst/>
+          </a:prstGeom>
+          <a:solidFill>
+            <a:schemeClr val="bg1"/>
+          </a:solidFill>
+        </p:spPr>
+        <p:txBody>
+          <a:bodyPr wrap="square" rtlCol="0">
+            <a:spAutoFit/>
+          </a:bodyPr>
+          <a:lstStyle/>
+          <a:p>
+            <a:r>
+              <a:rPr lang="en-GB" sz="2400" dirty="0" smtClean="0"/>
+              <a:t>CD43</a:t>
+            </a:r>
+            <a:endParaRPr lang="en-GB" sz="2400" dirty="0"/>
+          </a:p>
+        </p:txBody>
+      </p:sp>
+      <p:sp>
+        <p:nvSpPr>
+          <p:cNvPr id="9" name="TextBox 8"/>
+          <p:cNvSpPr txBox="1"/>
+          <p:nvPr/>
+        </p:nvSpPr>
+        <p:spPr>
+          <a:xfrm>
+            <a:off x="1592828" y="108891"/>
+            <a:ext cx="506870" cy="461665"/>
+          </a:xfrm>
+          <a:prstGeom prst="rect">
+            <a:avLst/>
+          </a:prstGeom>
+          <a:noFill/>
+        </p:spPr>
+        <p:txBody>
+          <a:bodyPr wrap="none" rtlCol="0">
+            <a:spAutoFit/>
+          </a:bodyPr>
+          <a:lstStyle/>
+          <a:p>
+            <a:r>
+              <a:rPr lang="en-GB" sz="2400" dirty="0" smtClean="0"/>
+              <a:t>B6</a:t>
+            </a:r>
+            <a:endParaRPr lang="en-GB" sz="2400" dirty="0"/>
+          </a:p>
+        </p:txBody>
+      </p:sp>
+      <p:sp>
+        <p:nvSpPr>
+          <p:cNvPr id="10" name="TextBox 9"/>
+          <p:cNvSpPr txBox="1"/>
+          <p:nvPr/>
+        </p:nvSpPr>
+        <p:spPr>
+          <a:xfrm>
+            <a:off x="4971326" y="108890"/>
+            <a:ext cx="776175" cy="461665"/>
+          </a:xfrm>
+          <a:prstGeom prst="rect">
+            <a:avLst/>
+          </a:prstGeom>
+          <a:noFill/>
+        </p:spPr>
+        <p:txBody>
+          <a:bodyPr wrap="none" rtlCol="0">
+            <a:spAutoFit/>
+          </a:bodyPr>
+          <a:lstStyle/>
+          <a:p>
+            <a:r>
+              <a:rPr lang="en-GB" sz="2400" dirty="0" smtClean="0"/>
+              <a:t>NOD</a:t>
+            </a:r>
+            <a:endParaRPr lang="en-GB" sz="2400" dirty="0"/>
+          </a:p>
+        </p:txBody>
+      </p:sp>
+      <p:sp>
+        <p:nvSpPr>
+          <p:cNvPr id="11" name="TextBox 10"/>
+          <p:cNvSpPr txBox="1"/>
+          <p:nvPr/>
+        </p:nvSpPr>
+        <p:spPr>
+          <a:xfrm>
+            <a:off x="1820852" y="1121528"/>
+            <a:ext cx="679481" cy="369332"/>
+          </a:xfrm>
+          <a:prstGeom prst="rect">
+            <a:avLst/>
+          </a:prstGeom>
+          <a:solidFill>
+            <a:schemeClr val="bg1"/>
+          </a:solidFill>
+        </p:spPr>
+        <p:txBody>
+          <a:bodyPr wrap="none" rtlCol="0">
+            <a:spAutoFit/>
+          </a:bodyPr>
+          <a:lstStyle/>
+          <a:p>
+            <a:r>
+              <a:rPr lang="en-GB" sz="1800" dirty="0" smtClean="0"/>
+              <a:t>Pro B</a:t>
+            </a:r>
+            <a:endParaRPr lang="en-GB" sz="1800" dirty="0"/>
+          </a:p>
+        </p:txBody>
+      </p:sp>
+      <p:sp>
+        <p:nvSpPr>
+          <p:cNvPr id="12" name="TextBox 11"/>
+          <p:cNvSpPr txBox="1"/>
+          <p:nvPr/>
+        </p:nvSpPr>
+        <p:spPr>
+          <a:xfrm>
+            <a:off x="5306953" y="1121528"/>
+            <a:ext cx="679481" cy="369332"/>
+          </a:xfrm>
+          <a:prstGeom prst="rect">
+            <a:avLst/>
+          </a:prstGeom>
+          <a:solidFill>
+            <a:schemeClr val="bg1"/>
+          </a:solidFill>
+        </p:spPr>
+        <p:txBody>
+          <a:bodyPr wrap="none" rtlCol="0">
+            <a:spAutoFit/>
+          </a:bodyPr>
+          <a:lstStyle/>
+          <a:p>
+            <a:r>
+              <a:rPr lang="en-GB" sz="1800" dirty="0" smtClean="0"/>
+              <a:t>Pro B</a:t>
+            </a:r>
+            <a:endParaRPr lang="en-GB" sz="1800" dirty="0"/>
+          </a:p>
+        </p:txBody>
+      </p:sp>
+      <p:sp>
+        <p:nvSpPr>
+          <p:cNvPr id="13" name="TextBox 12"/>
+          <p:cNvSpPr txBox="1"/>
+          <p:nvPr/>
+        </p:nvSpPr>
+        <p:spPr>
+          <a:xfrm>
+            <a:off x="1159385" y="1121528"/>
+            <a:ext cx="673774" cy="369332"/>
+          </a:xfrm>
+          <a:prstGeom prst="rect">
+            <a:avLst/>
+          </a:prstGeom>
+          <a:solidFill>
+            <a:schemeClr val="bg1"/>
+          </a:solidFill>
+        </p:spPr>
+        <p:txBody>
+          <a:bodyPr wrap="none" rtlCol="0">
+            <a:spAutoFit/>
+          </a:bodyPr>
+          <a:lstStyle/>
+          <a:p>
+            <a:r>
+              <a:rPr lang="en-GB" sz="1800" dirty="0" smtClean="0"/>
+              <a:t>Pre B</a:t>
+            </a:r>
+            <a:endParaRPr lang="en-GB" sz="1800" dirty="0"/>
+          </a:p>
+        </p:txBody>
+      </p:sp>
+      <p:sp>
+        <p:nvSpPr>
+          <p:cNvPr id="14" name="TextBox 13"/>
+          <p:cNvSpPr txBox="1"/>
+          <p:nvPr/>
+        </p:nvSpPr>
+        <p:spPr>
+          <a:xfrm>
+            <a:off x="4655924" y="1121528"/>
+            <a:ext cx="673774" cy="369332"/>
+          </a:xfrm>
+          <a:prstGeom prst="rect">
+            <a:avLst/>
+          </a:prstGeom>
+          <a:solidFill>
+            <a:schemeClr val="bg1"/>
+          </a:solidFill>
+        </p:spPr>
+        <p:txBody>
+          <a:bodyPr wrap="none" rtlCol="0">
+            <a:spAutoFit/>
+          </a:bodyPr>
+          <a:lstStyle/>
+          <a:p>
+            <a:r>
+              <a:rPr lang="en-GB" sz="1800" dirty="0" smtClean="0"/>
+              <a:t>Pre B</a:t>
+            </a:r>
+            <a:endParaRPr lang="en-GB" sz="1800" dirty="0"/>
+          </a:p>
+        </p:txBody>
+      </p:sp>
+    </p:spTree>
+    <p:extLst>
+      <p:ext uri="{BB962C8B-B14F-4D97-AF65-F5344CB8AC3E}">
+        <p14:creationId xmlns:p14="http://schemas.microsoft.com/office/powerpoint/2010/main" val="3845103055"/>
+      </p:ext>
+    </p:extLst>
+  </p:cSld>
+  <p:clrMapOvr>
+    <a:masterClrMapping/>
+  </p:clrMapOvr>
+</p:sld>
+</file>
+
+<file path=ppt/slides/slide15.xml><?xml version="1.0" encoding="utf-8"?>
+<p:sld xmlns:a="http://schemas.openxmlformats.org/drawingml/2006/main" xmlns:r="http://schemas.openxmlformats.org/officeDocument/2006/relationships" xmlns:p="http://schemas.openxmlformats.org/presentationml/2006/main">
+  <p:cSld>
+    <p:spTree>
+      <p:nvGrpSpPr>
+        <p:cNvPr id="1" name=""/>
+        <p:cNvGrpSpPr/>
+        <p:nvPr/>
+      </p:nvGrpSpPr>
+      <p:grpSpPr>
+        <a:xfrm>
+          <a:off x="0" y="0"/>
+          <a:ext cx="0" cy="0"/>
+          <a:chOff x="0" y="0"/>
+          <a:chExt cx="0" cy="0"/>
+        </a:xfrm>
+      </p:grpSpPr>
+      <p:pic>
+        <p:nvPicPr>
+          <p:cNvPr id="9" name="Picture 8"/>
+          <p:cNvPicPr>
+            <a:picLocks noChangeAspect="1"/>
+          </p:cNvPicPr>
+          <p:nvPr/>
+        </p:nvPicPr>
+        <p:blipFill>
+          <a:blip r:embed="rId3"/>
+          <a:stretch>
+            <a:fillRect/>
+          </a:stretch>
+        </p:blipFill>
+        <p:spPr>
+          <a:xfrm>
+            <a:off x="97691" y="339725"/>
+            <a:ext cx="3505200" cy="3638550"/>
+          </a:xfrm>
+          <a:prstGeom prst="rect">
+            <a:avLst/>
+          </a:prstGeom>
+        </p:spPr>
+      </p:pic>
+      <p:pic>
+        <p:nvPicPr>
+          <p:cNvPr id="8" name="Picture 7"/>
+          <p:cNvPicPr>
+            <a:picLocks noChangeAspect="1"/>
+          </p:cNvPicPr>
+          <p:nvPr/>
+        </p:nvPicPr>
+        <p:blipFill>
+          <a:blip r:embed="rId3"/>
+          <a:stretch>
+            <a:fillRect/>
+          </a:stretch>
+        </p:blipFill>
+        <p:spPr>
+          <a:xfrm>
+            <a:off x="3608574" y="339725"/>
+            <a:ext cx="3505200" cy="3638550"/>
+          </a:xfrm>
+          <a:prstGeom prst="rect">
+            <a:avLst/>
+          </a:prstGeom>
+        </p:spPr>
+      </p:pic>
+      <p:sp>
+        <p:nvSpPr>
+          <p:cNvPr id="2" name="TextBox 1"/>
+          <p:cNvSpPr txBox="1"/>
+          <p:nvPr/>
+        </p:nvSpPr>
+        <p:spPr>
+          <a:xfrm rot="16200000">
+            <a:off x="-727963" y="1897175"/>
+            <a:ext cx="2176216" cy="461665"/>
+          </a:xfrm>
+          <a:prstGeom prst="rect">
+            <a:avLst/>
+          </a:prstGeom>
+          <a:solidFill>
+            <a:schemeClr val="bg1"/>
+          </a:solidFill>
+        </p:spPr>
+        <p:txBody>
+          <a:bodyPr wrap="square" rtlCol="0">
+            <a:spAutoFit/>
+          </a:bodyPr>
+          <a:lstStyle/>
+          <a:p>
+            <a:r>
+              <a:rPr lang="en-GB" sz="2400" dirty="0" smtClean="0"/>
+              <a:t>Side Scatter</a:t>
+            </a:r>
+            <a:endParaRPr lang="en-GB" sz="2400" dirty="0"/>
+          </a:p>
+        </p:txBody>
+      </p:sp>
+      <p:sp>
+        <p:nvSpPr>
+          <p:cNvPr id="3" name="TextBox 2"/>
+          <p:cNvSpPr txBox="1"/>
+          <p:nvPr/>
+        </p:nvSpPr>
+        <p:spPr>
+          <a:xfrm>
+            <a:off x="907169" y="3468937"/>
+            <a:ext cx="2402382" cy="461665"/>
+          </a:xfrm>
+          <a:prstGeom prst="rect">
+            <a:avLst/>
+          </a:prstGeom>
+          <a:solidFill>
+            <a:schemeClr val="bg1"/>
+          </a:solidFill>
+        </p:spPr>
+        <p:txBody>
+          <a:bodyPr wrap="square" rtlCol="0">
+            <a:spAutoFit/>
+          </a:bodyPr>
+          <a:lstStyle/>
+          <a:p>
+            <a:r>
+              <a:rPr lang="en-GB" sz="2400" dirty="0" smtClean="0"/>
+              <a:t>CD43</a:t>
+            </a:r>
+            <a:endParaRPr lang="en-GB" sz="2400" dirty="0"/>
+          </a:p>
+        </p:txBody>
+      </p:sp>
+      <p:sp>
+        <p:nvSpPr>
+          <p:cNvPr id="4" name="TextBox 3"/>
+          <p:cNvSpPr txBox="1"/>
+          <p:nvPr/>
+        </p:nvSpPr>
+        <p:spPr>
+          <a:xfrm rot="16200000">
+            <a:off x="2794469" y="1897175"/>
+            <a:ext cx="2176216" cy="461665"/>
+          </a:xfrm>
+          <a:prstGeom prst="rect">
+            <a:avLst/>
+          </a:prstGeom>
+          <a:solidFill>
+            <a:schemeClr val="bg1"/>
+          </a:solidFill>
+        </p:spPr>
+        <p:txBody>
+          <a:bodyPr wrap="square" rtlCol="0">
+            <a:spAutoFit/>
+          </a:bodyPr>
+          <a:lstStyle/>
+          <a:p>
+            <a:r>
+              <a:rPr lang="en-GB" sz="2400" dirty="0" smtClean="0"/>
+              <a:t>Side Scatter</a:t>
+            </a:r>
+            <a:endParaRPr lang="en-GB" sz="2400" dirty="0"/>
+          </a:p>
+        </p:txBody>
+      </p:sp>
+      <p:sp>
+        <p:nvSpPr>
+          <p:cNvPr id="5" name="TextBox 4"/>
+          <p:cNvSpPr txBox="1"/>
+          <p:nvPr/>
+        </p:nvSpPr>
+        <p:spPr>
+          <a:xfrm>
+            <a:off x="4429601" y="3468937"/>
+            <a:ext cx="2402382" cy="461665"/>
+          </a:xfrm>
+          <a:prstGeom prst="rect">
+            <a:avLst/>
+          </a:prstGeom>
+          <a:solidFill>
+            <a:schemeClr val="bg1"/>
+          </a:solidFill>
+        </p:spPr>
+        <p:txBody>
+          <a:bodyPr wrap="square" rtlCol="0">
+            <a:spAutoFit/>
+          </a:bodyPr>
+          <a:lstStyle/>
+          <a:p>
+            <a:r>
+              <a:rPr lang="en-GB" sz="2400" dirty="0" smtClean="0"/>
+              <a:t>CD43</a:t>
+            </a:r>
+            <a:endParaRPr lang="en-GB" sz="2400" dirty="0"/>
+          </a:p>
+        </p:txBody>
+      </p:sp>
+      <p:sp>
+        <p:nvSpPr>
+          <p:cNvPr id="6" name="TextBox 5"/>
+          <p:cNvSpPr txBox="1"/>
+          <p:nvPr/>
+        </p:nvSpPr>
+        <p:spPr>
+          <a:xfrm>
+            <a:off x="1592828" y="108891"/>
+            <a:ext cx="506870" cy="461665"/>
+          </a:xfrm>
+          <a:prstGeom prst="rect">
+            <a:avLst/>
+          </a:prstGeom>
+          <a:noFill/>
+        </p:spPr>
+        <p:txBody>
+          <a:bodyPr wrap="none" rtlCol="0">
+            <a:spAutoFit/>
+          </a:bodyPr>
+          <a:lstStyle/>
+          <a:p>
+            <a:r>
+              <a:rPr lang="en-GB" sz="2400" dirty="0" smtClean="0"/>
+              <a:t>B6</a:t>
+            </a:r>
+            <a:endParaRPr lang="en-GB" sz="2400" dirty="0"/>
+          </a:p>
+        </p:txBody>
+      </p:sp>
+      <p:sp>
+        <p:nvSpPr>
+          <p:cNvPr id="7" name="TextBox 6"/>
+          <p:cNvSpPr txBox="1"/>
+          <p:nvPr/>
+        </p:nvSpPr>
+        <p:spPr>
+          <a:xfrm>
+            <a:off x="4971326" y="108890"/>
+            <a:ext cx="776175" cy="461665"/>
+          </a:xfrm>
+          <a:prstGeom prst="rect">
+            <a:avLst/>
+          </a:prstGeom>
+          <a:noFill/>
+        </p:spPr>
+        <p:txBody>
+          <a:bodyPr wrap="none" rtlCol="0">
+            <a:spAutoFit/>
+          </a:bodyPr>
+          <a:lstStyle/>
+          <a:p>
+            <a:r>
+              <a:rPr lang="en-GB" sz="2400" dirty="0" smtClean="0"/>
+              <a:t>NOD</a:t>
+            </a:r>
+            <a:endParaRPr lang="en-GB" sz="2400" dirty="0"/>
+          </a:p>
+        </p:txBody>
+      </p:sp>
+      <p:sp>
+        <p:nvSpPr>
+          <p:cNvPr id="11" name="TextBox 10"/>
+          <p:cNvSpPr txBox="1"/>
+          <p:nvPr/>
+        </p:nvSpPr>
+        <p:spPr>
+          <a:xfrm>
+            <a:off x="1836754" y="1606558"/>
+            <a:ext cx="679481" cy="369332"/>
+          </a:xfrm>
+          <a:prstGeom prst="rect">
+            <a:avLst/>
+          </a:prstGeom>
+          <a:solidFill>
+            <a:schemeClr val="bg1"/>
+          </a:solidFill>
+        </p:spPr>
+        <p:txBody>
+          <a:bodyPr wrap="none" rtlCol="0">
+            <a:spAutoFit/>
+          </a:bodyPr>
+          <a:lstStyle/>
+          <a:p>
+            <a:r>
+              <a:rPr lang="en-GB" sz="1800" dirty="0" smtClean="0"/>
+              <a:t>Pro B</a:t>
+            </a:r>
+            <a:endParaRPr lang="en-GB" sz="1800" dirty="0"/>
+          </a:p>
+        </p:txBody>
+      </p:sp>
+      <p:sp>
+        <p:nvSpPr>
+          <p:cNvPr id="12" name="TextBox 11"/>
+          <p:cNvSpPr txBox="1"/>
+          <p:nvPr/>
+        </p:nvSpPr>
+        <p:spPr>
+          <a:xfrm>
+            <a:off x="5322855" y="1606558"/>
+            <a:ext cx="679481" cy="369332"/>
+          </a:xfrm>
+          <a:prstGeom prst="rect">
+            <a:avLst/>
+          </a:prstGeom>
+          <a:solidFill>
+            <a:schemeClr val="bg1"/>
+          </a:solidFill>
+        </p:spPr>
+        <p:txBody>
+          <a:bodyPr wrap="none" rtlCol="0">
+            <a:spAutoFit/>
+          </a:bodyPr>
+          <a:lstStyle/>
+          <a:p>
+            <a:r>
+              <a:rPr lang="en-GB" sz="1800" dirty="0" smtClean="0"/>
+              <a:t>Pro B</a:t>
+            </a:r>
+            <a:endParaRPr lang="en-GB" sz="1800" dirty="0"/>
+          </a:p>
+        </p:txBody>
+      </p:sp>
+      <p:sp>
+        <p:nvSpPr>
+          <p:cNvPr id="13" name="TextBox 12"/>
+          <p:cNvSpPr txBox="1"/>
+          <p:nvPr/>
+        </p:nvSpPr>
+        <p:spPr>
+          <a:xfrm>
+            <a:off x="1175287" y="1606558"/>
+            <a:ext cx="673774" cy="369332"/>
+          </a:xfrm>
+          <a:prstGeom prst="rect">
+            <a:avLst/>
+          </a:prstGeom>
+          <a:solidFill>
+            <a:schemeClr val="bg1"/>
+          </a:solidFill>
+        </p:spPr>
+        <p:txBody>
+          <a:bodyPr wrap="none" rtlCol="0">
+            <a:spAutoFit/>
+          </a:bodyPr>
+          <a:lstStyle/>
+          <a:p>
+            <a:r>
+              <a:rPr lang="en-GB" sz="1800" dirty="0" smtClean="0"/>
+              <a:t>Pre B</a:t>
+            </a:r>
+            <a:endParaRPr lang="en-GB" sz="1800" dirty="0"/>
+          </a:p>
+        </p:txBody>
+      </p:sp>
+      <p:sp>
+        <p:nvSpPr>
+          <p:cNvPr id="14" name="TextBox 13"/>
+          <p:cNvSpPr txBox="1"/>
+          <p:nvPr/>
+        </p:nvSpPr>
+        <p:spPr>
+          <a:xfrm>
+            <a:off x="4671826" y="1606558"/>
+            <a:ext cx="673774" cy="369332"/>
+          </a:xfrm>
+          <a:prstGeom prst="rect">
+            <a:avLst/>
+          </a:prstGeom>
+          <a:solidFill>
+            <a:schemeClr val="bg1"/>
+          </a:solidFill>
+        </p:spPr>
+        <p:txBody>
+          <a:bodyPr wrap="none" rtlCol="0">
+            <a:spAutoFit/>
+          </a:bodyPr>
+          <a:lstStyle/>
+          <a:p>
+            <a:r>
+              <a:rPr lang="en-GB" sz="1800" dirty="0" smtClean="0"/>
+              <a:t>Pre B</a:t>
+            </a:r>
+            <a:endParaRPr lang="en-GB" sz="1800" dirty="0"/>
+          </a:p>
+        </p:txBody>
+      </p:sp>
+    </p:spTree>
+    <p:extLst>
+      <p:ext uri="{BB962C8B-B14F-4D97-AF65-F5344CB8AC3E}">
+        <p14:creationId xmlns:p14="http://schemas.microsoft.com/office/powerpoint/2010/main" val="3444880531"/>
+      </p:ext>
+    </p:extLst>
+  </p:cSld>
+  <p:clrMapOvr>
+    <a:masterClrMapping/>
+  </p:clrMapOvr>
 </p:sld>
 </file>
 

</xml_diff>

<commit_message>
Continued with EAG comments on results.
</commit_message>
<xml_diff>
--- a/Figures/Powerpoints/2 plots.pptx
+++ b/Figures/Powerpoints/2 plots.pptx
@@ -403,11 +403,11 @@
         </c:dLbls>
         <c:gapWidth val="219"/>
         <c:overlap val="-27"/>
-        <c:axId val="-539486928"/>
-        <c:axId val="-539492912"/>
+        <c:axId val="1108683904"/>
+        <c:axId val="1108675200"/>
       </c:barChart>
       <c:catAx>
-        <c:axId val="-539486928"/>
+        <c:axId val="1108683904"/>
         <c:scaling>
           <c:orientation val="minMax"/>
         </c:scaling>
@@ -450,7 +450,7 @@
             <a:endParaRPr lang="en-US"/>
           </a:p>
         </c:txPr>
-        <c:crossAx val="-539492912"/>
+        <c:crossAx val="1108675200"/>
         <c:crosses val="autoZero"/>
         <c:auto val="1"/>
         <c:lblAlgn val="ctr"/>
@@ -458,7 +458,7 @@
         <c:noMultiLvlLbl val="0"/>
       </c:catAx>
       <c:valAx>
-        <c:axId val="-539492912"/>
+        <c:axId val="1108675200"/>
         <c:scaling>
           <c:orientation val="minMax"/>
         </c:scaling>
@@ -509,7 +509,7 @@
             <a:endParaRPr lang="en-US"/>
           </a:p>
         </c:txPr>
-        <c:crossAx val="-539486928"/>
+        <c:crossAx val="1108683904"/>
         <c:crosses val="autoZero"/>
         <c:crossBetween val="between"/>
       </c:valAx>
@@ -1204,7 +1204,7 @@
           <a:p>
             <a:fld id="{B0028AB1-267B-474E-BD8A-C704628DBB4D}" type="datetimeFigureOut">
               <a:rPr lang="en-GB" smtClean="0"/>
-              <a:t>05/09/2015</a:t>
+              <a:t>06/09/2015</a:t>
             </a:fld>
             <a:endParaRPr lang="en-GB"/>
           </a:p>
@@ -2843,7 +2843,7 @@
           <a:p>
             <a:fld id="{6A0A7C41-FC34-4E7A-8F1D-282D4830B78C}" type="datetimeFigureOut">
               <a:rPr lang="en-GB" smtClean="0"/>
-              <a:t>05/09/2015</a:t>
+              <a:t>06/09/2015</a:t>
             </a:fld>
             <a:endParaRPr lang="en-GB"/>
           </a:p>
@@ -3013,7 +3013,7 @@
           <a:p>
             <a:fld id="{6A0A7C41-FC34-4E7A-8F1D-282D4830B78C}" type="datetimeFigureOut">
               <a:rPr lang="en-GB" smtClean="0"/>
-              <a:t>05/09/2015</a:t>
+              <a:t>06/09/2015</a:t>
             </a:fld>
             <a:endParaRPr lang="en-GB"/>
           </a:p>
@@ -3193,7 +3193,7 @@
           <a:p>
             <a:fld id="{6A0A7C41-FC34-4E7A-8F1D-282D4830B78C}" type="datetimeFigureOut">
               <a:rPr lang="en-GB" smtClean="0"/>
-              <a:t>05/09/2015</a:t>
+              <a:t>06/09/2015</a:t>
             </a:fld>
             <a:endParaRPr lang="en-GB"/>
           </a:p>
@@ -3363,7 +3363,7 @@
           <a:p>
             <a:fld id="{6A0A7C41-FC34-4E7A-8F1D-282D4830B78C}" type="datetimeFigureOut">
               <a:rPr lang="en-GB" smtClean="0"/>
-              <a:t>05/09/2015</a:t>
+              <a:t>06/09/2015</a:t>
             </a:fld>
             <a:endParaRPr lang="en-GB"/>
           </a:p>
@@ -3609,7 +3609,7 @@
           <a:p>
             <a:fld id="{6A0A7C41-FC34-4E7A-8F1D-282D4830B78C}" type="datetimeFigureOut">
               <a:rPr lang="en-GB" smtClean="0"/>
-              <a:t>05/09/2015</a:t>
+              <a:t>06/09/2015</a:t>
             </a:fld>
             <a:endParaRPr lang="en-GB"/>
           </a:p>
@@ -3841,7 +3841,7 @@
           <a:p>
             <a:fld id="{6A0A7C41-FC34-4E7A-8F1D-282D4830B78C}" type="datetimeFigureOut">
               <a:rPr lang="en-GB" smtClean="0"/>
-              <a:t>05/09/2015</a:t>
+              <a:t>06/09/2015</a:t>
             </a:fld>
             <a:endParaRPr lang="en-GB"/>
           </a:p>
@@ -4208,7 +4208,7 @@
           <a:p>
             <a:fld id="{6A0A7C41-FC34-4E7A-8F1D-282D4830B78C}" type="datetimeFigureOut">
               <a:rPr lang="en-GB" smtClean="0"/>
-              <a:t>05/09/2015</a:t>
+              <a:t>06/09/2015</a:t>
             </a:fld>
             <a:endParaRPr lang="en-GB"/>
           </a:p>
@@ -4326,7 +4326,7 @@
           <a:p>
             <a:fld id="{6A0A7C41-FC34-4E7A-8F1D-282D4830B78C}" type="datetimeFigureOut">
               <a:rPr lang="en-GB" smtClean="0"/>
-              <a:t>05/09/2015</a:t>
+              <a:t>06/09/2015</a:t>
             </a:fld>
             <a:endParaRPr lang="en-GB"/>
           </a:p>
@@ -4421,7 +4421,7 @@
           <a:p>
             <a:fld id="{6A0A7C41-FC34-4E7A-8F1D-282D4830B78C}" type="datetimeFigureOut">
               <a:rPr lang="en-GB" smtClean="0"/>
-              <a:t>05/09/2015</a:t>
+              <a:t>06/09/2015</a:t>
             </a:fld>
             <a:endParaRPr lang="en-GB"/>
           </a:p>
@@ -4698,7 +4698,7 @@
           <a:p>
             <a:fld id="{6A0A7C41-FC34-4E7A-8F1D-282D4830B78C}" type="datetimeFigureOut">
               <a:rPr lang="en-GB" smtClean="0"/>
-              <a:t>05/09/2015</a:t>
+              <a:t>06/09/2015</a:t>
             </a:fld>
             <a:endParaRPr lang="en-GB"/>
           </a:p>
@@ -4955,7 +4955,7 @@
           <a:p>
             <a:fld id="{6A0A7C41-FC34-4E7A-8F1D-282D4830B78C}" type="datetimeFigureOut">
               <a:rPr lang="en-GB" smtClean="0"/>
-              <a:t>05/09/2015</a:t>
+              <a:t>06/09/2015</a:t>
             </a:fld>
             <a:endParaRPr lang="en-GB"/>
           </a:p>
@@ -5168,7 +5168,7 @@
           <a:p>
             <a:fld id="{6A0A7C41-FC34-4E7A-8F1D-282D4830B78C}" type="datetimeFigureOut">
               <a:rPr lang="en-GB" smtClean="0"/>
-              <a:t>05/09/2015</a:t>
+              <a:t>06/09/2015</a:t>
             </a:fld>
             <a:endParaRPr lang="en-GB"/>
           </a:p>

</xml_diff>

<commit_message>
Continued with results corrections.
</commit_message>
<xml_diff>
--- a/Figures/Powerpoints/2 plots.pptx
+++ b/Figures/Powerpoints/2 plots.pptx
@@ -404,11 +404,11 @@
         </c:dLbls>
         <c:gapWidth val="219"/>
         <c:overlap val="-27"/>
-        <c:axId val="-832516464"/>
-        <c:axId val="-832519184"/>
+        <c:axId val="703606048"/>
+        <c:axId val="703600608"/>
       </c:barChart>
       <c:catAx>
-        <c:axId val="-832516464"/>
+        <c:axId val="703606048"/>
         <c:scaling>
           <c:orientation val="minMax"/>
         </c:scaling>
@@ -451,7 +451,7 @@
             <a:endParaRPr lang="en-US"/>
           </a:p>
         </c:txPr>
-        <c:crossAx val="-832519184"/>
+        <c:crossAx val="703600608"/>
         <c:crosses val="autoZero"/>
         <c:auto val="1"/>
         <c:lblAlgn val="ctr"/>
@@ -459,7 +459,7 @@
         <c:noMultiLvlLbl val="0"/>
       </c:catAx>
       <c:valAx>
-        <c:axId val="-832519184"/>
+        <c:axId val="703600608"/>
         <c:scaling>
           <c:orientation val="minMax"/>
         </c:scaling>
@@ -510,7 +510,7 @@
             <a:endParaRPr lang="en-US"/>
           </a:p>
         </c:txPr>
-        <c:crossAx val="-832516464"/>
+        <c:crossAx val="703606048"/>
         <c:crosses val="autoZero"/>
         <c:crossBetween val="between"/>
       </c:valAx>
@@ -1205,7 +1205,7 @@
           <a:p>
             <a:fld id="{B0028AB1-267B-474E-BD8A-C704628DBB4D}" type="datetimeFigureOut">
               <a:rPr lang="en-GB" smtClean="0"/>
-              <a:t>07/09/2015</a:t>
+              <a:t>08/09/2015</a:t>
             </a:fld>
             <a:endParaRPr lang="en-GB"/>
           </a:p>
@@ -2844,7 +2844,7 @@
           <a:p>
             <a:fld id="{6A0A7C41-FC34-4E7A-8F1D-282D4830B78C}" type="datetimeFigureOut">
               <a:rPr lang="en-GB" smtClean="0"/>
-              <a:t>07/09/2015</a:t>
+              <a:t>08/09/2015</a:t>
             </a:fld>
             <a:endParaRPr lang="en-GB"/>
           </a:p>
@@ -3014,7 +3014,7 @@
           <a:p>
             <a:fld id="{6A0A7C41-FC34-4E7A-8F1D-282D4830B78C}" type="datetimeFigureOut">
               <a:rPr lang="en-GB" smtClean="0"/>
-              <a:t>07/09/2015</a:t>
+              <a:t>08/09/2015</a:t>
             </a:fld>
             <a:endParaRPr lang="en-GB"/>
           </a:p>
@@ -3194,7 +3194,7 @@
           <a:p>
             <a:fld id="{6A0A7C41-FC34-4E7A-8F1D-282D4830B78C}" type="datetimeFigureOut">
               <a:rPr lang="en-GB" smtClean="0"/>
-              <a:t>07/09/2015</a:t>
+              <a:t>08/09/2015</a:t>
             </a:fld>
             <a:endParaRPr lang="en-GB"/>
           </a:p>
@@ -3364,7 +3364,7 @@
           <a:p>
             <a:fld id="{6A0A7C41-FC34-4E7A-8F1D-282D4830B78C}" type="datetimeFigureOut">
               <a:rPr lang="en-GB" smtClean="0"/>
-              <a:t>07/09/2015</a:t>
+              <a:t>08/09/2015</a:t>
             </a:fld>
             <a:endParaRPr lang="en-GB"/>
           </a:p>
@@ -3610,7 +3610,7 @@
           <a:p>
             <a:fld id="{6A0A7C41-FC34-4E7A-8F1D-282D4830B78C}" type="datetimeFigureOut">
               <a:rPr lang="en-GB" smtClean="0"/>
-              <a:t>07/09/2015</a:t>
+              <a:t>08/09/2015</a:t>
             </a:fld>
             <a:endParaRPr lang="en-GB"/>
           </a:p>
@@ -3842,7 +3842,7 @@
           <a:p>
             <a:fld id="{6A0A7C41-FC34-4E7A-8F1D-282D4830B78C}" type="datetimeFigureOut">
               <a:rPr lang="en-GB" smtClean="0"/>
-              <a:t>07/09/2015</a:t>
+              <a:t>08/09/2015</a:t>
             </a:fld>
             <a:endParaRPr lang="en-GB"/>
           </a:p>
@@ -4209,7 +4209,7 @@
           <a:p>
             <a:fld id="{6A0A7C41-FC34-4E7A-8F1D-282D4830B78C}" type="datetimeFigureOut">
               <a:rPr lang="en-GB" smtClean="0"/>
-              <a:t>07/09/2015</a:t>
+              <a:t>08/09/2015</a:t>
             </a:fld>
             <a:endParaRPr lang="en-GB"/>
           </a:p>
@@ -4327,7 +4327,7 @@
           <a:p>
             <a:fld id="{6A0A7C41-FC34-4E7A-8F1D-282D4830B78C}" type="datetimeFigureOut">
               <a:rPr lang="en-GB" smtClean="0"/>
-              <a:t>07/09/2015</a:t>
+              <a:t>08/09/2015</a:t>
             </a:fld>
             <a:endParaRPr lang="en-GB"/>
           </a:p>
@@ -4422,7 +4422,7 @@
           <a:p>
             <a:fld id="{6A0A7C41-FC34-4E7A-8F1D-282D4830B78C}" type="datetimeFigureOut">
               <a:rPr lang="en-GB" smtClean="0"/>
-              <a:t>07/09/2015</a:t>
+              <a:t>08/09/2015</a:t>
             </a:fld>
             <a:endParaRPr lang="en-GB"/>
           </a:p>
@@ -4699,7 +4699,7 @@
           <a:p>
             <a:fld id="{6A0A7C41-FC34-4E7A-8F1D-282D4830B78C}" type="datetimeFigureOut">
               <a:rPr lang="en-GB" smtClean="0"/>
-              <a:t>07/09/2015</a:t>
+              <a:t>08/09/2015</a:t>
             </a:fld>
             <a:endParaRPr lang="en-GB"/>
           </a:p>
@@ -4956,7 +4956,7 @@
           <a:p>
             <a:fld id="{6A0A7C41-FC34-4E7A-8F1D-282D4830B78C}" type="datetimeFigureOut">
               <a:rPr lang="en-GB" smtClean="0"/>
-              <a:t>07/09/2015</a:t>
+              <a:t>08/09/2015</a:t>
             </a:fld>
             <a:endParaRPr lang="en-GB"/>
           </a:p>
@@ -5169,7 +5169,7 @@
           <a:p>
             <a:fld id="{6A0A7C41-FC34-4E7A-8F1D-282D4830B78C}" type="datetimeFigureOut">
               <a:rPr lang="en-GB" smtClean="0"/>
-              <a:t>07/09/2015</a:t>
+              <a:t>08/09/2015</a:t>
             </a:fld>
             <a:endParaRPr lang="en-GB"/>
           </a:p>
@@ -10861,6 +10861,42 @@
           </a:p>
         </p:txBody>
       </p:sp>
+      <p:cxnSp>
+        <p:nvCxnSpPr>
+          <p:cNvPr id="15" name="Straight Arrow Connector 14"/>
+          <p:cNvCxnSpPr/>
+          <p:nvPr/>
+        </p:nvCxnSpPr>
+        <p:spPr>
+          <a:xfrm>
+            <a:off x="1905059" y="2135873"/>
+            <a:ext cx="2052000" cy="0"/>
+          </a:xfrm>
+          <a:prstGeom prst="straightConnector1">
+            <a:avLst/>
+          </a:prstGeom>
+          <a:ln w="19050">
+            <a:solidFill>
+              <a:schemeClr val="tx1"/>
+            </a:solidFill>
+            <a:tailEnd type="triangle"/>
+          </a:ln>
+        </p:spPr>
+        <p:style>
+          <a:lnRef idx="1">
+            <a:schemeClr val="accent1"/>
+          </a:lnRef>
+          <a:fillRef idx="0">
+            <a:schemeClr val="accent1"/>
+          </a:fillRef>
+          <a:effectRef idx="0">
+            <a:schemeClr val="accent1"/>
+          </a:effectRef>
+          <a:fontRef idx="minor">
+            <a:schemeClr val="tx1"/>
+          </a:fontRef>
+        </p:style>
+      </p:cxnSp>
     </p:spTree>
     <p:extLst>
       <p:ext uri="{BB962C8B-B14F-4D97-AF65-F5344CB8AC3E}">

</xml_diff>

<commit_message>
Continued faffing with results.
</commit_message>
<xml_diff>
--- a/Figures/Powerpoints/2 plots.pptx
+++ b/Figures/Powerpoints/2 plots.pptx
@@ -5,7 +5,7 @@
     <p:sldMasterId id="2147483660" r:id="rId1"/>
   </p:sldMasterIdLst>
   <p:notesMasterIdLst>
-    <p:notesMasterId r:id="rId22"/>
+    <p:notesMasterId r:id="rId23"/>
   </p:notesMasterIdLst>
   <p:sldIdLst>
     <p:sldId id="256" r:id="rId2"/>
@@ -28,6 +28,7 @@
     <p:sldId id="274" r:id="rId19"/>
     <p:sldId id="275" r:id="rId20"/>
     <p:sldId id="276" r:id="rId21"/>
+    <p:sldId id="277" r:id="rId22"/>
   </p:sldIdLst>
   <p:sldSz cx="7199313" cy="4319588"/>
   <p:notesSz cx="6858000" cy="9144000"/>
@@ -404,11 +405,11 @@
         </c:dLbls>
         <c:gapWidth val="219"/>
         <c:overlap val="-27"/>
-        <c:axId val="703606048"/>
-        <c:axId val="703600608"/>
+        <c:axId val="-473665472"/>
+        <c:axId val="-473664384"/>
       </c:barChart>
       <c:catAx>
-        <c:axId val="703606048"/>
+        <c:axId val="-473665472"/>
         <c:scaling>
           <c:orientation val="minMax"/>
         </c:scaling>
@@ -451,7 +452,7 @@
             <a:endParaRPr lang="en-US"/>
           </a:p>
         </c:txPr>
-        <c:crossAx val="703600608"/>
+        <c:crossAx val="-473664384"/>
         <c:crosses val="autoZero"/>
         <c:auto val="1"/>
         <c:lblAlgn val="ctr"/>
@@ -459,7 +460,7 @@
         <c:noMultiLvlLbl val="0"/>
       </c:catAx>
       <c:valAx>
-        <c:axId val="703600608"/>
+        <c:axId val="-473664384"/>
         <c:scaling>
           <c:orientation val="minMax"/>
         </c:scaling>
@@ -510,7 +511,7 @@
             <a:endParaRPr lang="en-US"/>
           </a:p>
         </c:txPr>
-        <c:crossAx val="703606048"/>
+        <c:crossAx val="-473665472"/>
         <c:crosses val="autoZero"/>
         <c:crossBetween val="between"/>
       </c:valAx>
@@ -1205,7 +1206,7 @@
           <a:p>
             <a:fld id="{B0028AB1-267B-474E-BD8A-C704628DBB4D}" type="datetimeFigureOut">
               <a:rPr lang="en-GB" smtClean="0"/>
-              <a:t>08/09/2015</a:t>
+              <a:t>09/09/2015</a:t>
             </a:fld>
             <a:endParaRPr lang="en-GB"/>
           </a:p>
@@ -2844,7 +2845,7 @@
           <a:p>
             <a:fld id="{6A0A7C41-FC34-4E7A-8F1D-282D4830B78C}" type="datetimeFigureOut">
               <a:rPr lang="en-GB" smtClean="0"/>
-              <a:t>08/09/2015</a:t>
+              <a:t>09/09/2015</a:t>
             </a:fld>
             <a:endParaRPr lang="en-GB"/>
           </a:p>
@@ -3014,7 +3015,7 @@
           <a:p>
             <a:fld id="{6A0A7C41-FC34-4E7A-8F1D-282D4830B78C}" type="datetimeFigureOut">
               <a:rPr lang="en-GB" smtClean="0"/>
-              <a:t>08/09/2015</a:t>
+              <a:t>09/09/2015</a:t>
             </a:fld>
             <a:endParaRPr lang="en-GB"/>
           </a:p>
@@ -3194,7 +3195,7 @@
           <a:p>
             <a:fld id="{6A0A7C41-FC34-4E7A-8F1D-282D4830B78C}" type="datetimeFigureOut">
               <a:rPr lang="en-GB" smtClean="0"/>
-              <a:t>08/09/2015</a:t>
+              <a:t>09/09/2015</a:t>
             </a:fld>
             <a:endParaRPr lang="en-GB"/>
           </a:p>
@@ -3364,7 +3365,7 @@
           <a:p>
             <a:fld id="{6A0A7C41-FC34-4E7A-8F1D-282D4830B78C}" type="datetimeFigureOut">
               <a:rPr lang="en-GB" smtClean="0"/>
-              <a:t>08/09/2015</a:t>
+              <a:t>09/09/2015</a:t>
             </a:fld>
             <a:endParaRPr lang="en-GB"/>
           </a:p>
@@ -3610,7 +3611,7 @@
           <a:p>
             <a:fld id="{6A0A7C41-FC34-4E7A-8F1D-282D4830B78C}" type="datetimeFigureOut">
               <a:rPr lang="en-GB" smtClean="0"/>
-              <a:t>08/09/2015</a:t>
+              <a:t>09/09/2015</a:t>
             </a:fld>
             <a:endParaRPr lang="en-GB"/>
           </a:p>
@@ -3842,7 +3843,7 @@
           <a:p>
             <a:fld id="{6A0A7C41-FC34-4E7A-8F1D-282D4830B78C}" type="datetimeFigureOut">
               <a:rPr lang="en-GB" smtClean="0"/>
-              <a:t>08/09/2015</a:t>
+              <a:t>09/09/2015</a:t>
             </a:fld>
             <a:endParaRPr lang="en-GB"/>
           </a:p>
@@ -4209,7 +4210,7 @@
           <a:p>
             <a:fld id="{6A0A7C41-FC34-4E7A-8F1D-282D4830B78C}" type="datetimeFigureOut">
               <a:rPr lang="en-GB" smtClean="0"/>
-              <a:t>08/09/2015</a:t>
+              <a:t>09/09/2015</a:t>
             </a:fld>
             <a:endParaRPr lang="en-GB"/>
           </a:p>
@@ -4327,7 +4328,7 @@
           <a:p>
             <a:fld id="{6A0A7C41-FC34-4E7A-8F1D-282D4830B78C}" type="datetimeFigureOut">
               <a:rPr lang="en-GB" smtClean="0"/>
-              <a:t>08/09/2015</a:t>
+              <a:t>09/09/2015</a:t>
             </a:fld>
             <a:endParaRPr lang="en-GB"/>
           </a:p>
@@ -4422,7 +4423,7 @@
           <a:p>
             <a:fld id="{6A0A7C41-FC34-4E7A-8F1D-282D4830B78C}" type="datetimeFigureOut">
               <a:rPr lang="en-GB" smtClean="0"/>
-              <a:t>08/09/2015</a:t>
+              <a:t>09/09/2015</a:t>
             </a:fld>
             <a:endParaRPr lang="en-GB"/>
           </a:p>
@@ -4699,7 +4700,7 @@
           <a:p>
             <a:fld id="{6A0A7C41-FC34-4E7A-8F1D-282D4830B78C}" type="datetimeFigureOut">
               <a:rPr lang="en-GB" smtClean="0"/>
-              <a:t>08/09/2015</a:t>
+              <a:t>09/09/2015</a:t>
             </a:fld>
             <a:endParaRPr lang="en-GB"/>
           </a:p>
@@ -4956,7 +4957,7 @@
           <a:p>
             <a:fld id="{6A0A7C41-FC34-4E7A-8F1D-282D4830B78C}" type="datetimeFigureOut">
               <a:rPr lang="en-GB" smtClean="0"/>
-              <a:t>08/09/2015</a:t>
+              <a:t>09/09/2015</a:t>
             </a:fld>
             <a:endParaRPr lang="en-GB"/>
           </a:p>
@@ -5169,7 +5170,7 @@
           <a:p>
             <a:fld id="{6A0A7C41-FC34-4E7A-8F1D-282D4830B78C}" type="datetimeFigureOut">
               <a:rPr lang="en-GB" smtClean="0"/>
-              <a:t>08/09/2015</a:t>
+              <a:t>09/09/2015</a:t>
             </a:fld>
             <a:endParaRPr lang="en-GB"/>
           </a:p>
@@ -8609,6 +8610,786 @@
     <p:extLst>
       <p:ext uri="{BB962C8B-B14F-4D97-AF65-F5344CB8AC3E}">
         <p14:creationId xmlns:p14="http://schemas.microsoft.com/office/powerpoint/2010/main" val="1792757575"/>
+      </p:ext>
+    </p:extLst>
+  </p:cSld>
+  <p:clrMapOvr>
+    <a:masterClrMapping/>
+  </p:clrMapOvr>
+</p:sld>
+</file>
+
+<file path=ppt/slides/slide21.xml><?xml version="1.0" encoding="utf-8"?>
+<p:sld xmlns:a="http://schemas.openxmlformats.org/drawingml/2006/main" xmlns:r="http://schemas.openxmlformats.org/officeDocument/2006/relationships" xmlns:p="http://schemas.openxmlformats.org/presentationml/2006/main">
+  <p:cSld>
+    <p:spTree>
+      <p:nvGrpSpPr>
+        <p:cNvPr id="1" name=""/>
+        <p:cNvGrpSpPr/>
+        <p:nvPr/>
+      </p:nvGrpSpPr>
+      <p:grpSpPr>
+        <a:xfrm>
+          <a:off x="0" y="0"/>
+          <a:ext cx="0" cy="0"/>
+          <a:chOff x="0" y="0"/>
+          <a:chExt cx="0" cy="0"/>
+        </a:xfrm>
+      </p:grpSpPr>
+      <p:pic>
+        <p:nvPicPr>
+          <p:cNvPr id="2" name="Picture 1"/>
+          <p:cNvPicPr>
+            <a:picLocks noChangeAspect="1"/>
+          </p:cNvPicPr>
+          <p:nvPr/>
+        </p:nvPicPr>
+        <p:blipFill>
+          <a:blip r:embed="rId2"/>
+          <a:stretch>
+            <a:fillRect/>
+          </a:stretch>
+        </p:blipFill>
+        <p:spPr>
+          <a:xfrm>
+            <a:off x="3598863" y="339725"/>
+            <a:ext cx="3505200" cy="3638550"/>
+          </a:xfrm>
+          <a:prstGeom prst="rect">
+            <a:avLst/>
+          </a:prstGeom>
+        </p:spPr>
+      </p:pic>
+      <p:pic>
+        <p:nvPicPr>
+          <p:cNvPr id="3" name="Picture 2"/>
+          <p:cNvPicPr>
+            <a:picLocks noChangeAspect="1"/>
+          </p:cNvPicPr>
+          <p:nvPr/>
+        </p:nvPicPr>
+        <p:blipFill>
+          <a:blip r:embed="rId3"/>
+          <a:stretch>
+            <a:fillRect/>
+          </a:stretch>
+        </p:blipFill>
+        <p:spPr>
+          <a:xfrm>
+            <a:off x="95412" y="339725"/>
+            <a:ext cx="3505200" cy="3638550"/>
+          </a:xfrm>
+          <a:prstGeom prst="rect">
+            <a:avLst/>
+          </a:prstGeom>
+        </p:spPr>
+      </p:pic>
+      <p:sp>
+        <p:nvSpPr>
+          <p:cNvPr id="5" name="TextBox 4"/>
+          <p:cNvSpPr txBox="1"/>
+          <p:nvPr/>
+        </p:nvSpPr>
+        <p:spPr>
+          <a:xfrm>
+            <a:off x="978010" y="1168842"/>
+            <a:ext cx="477033" cy="341906"/>
+          </a:xfrm>
+          <a:prstGeom prst="rect">
+            <a:avLst/>
+          </a:prstGeom>
+          <a:solidFill>
+            <a:schemeClr val="bg1"/>
+          </a:solidFill>
+        </p:spPr>
+        <p:txBody>
+          <a:bodyPr wrap="square" rtlCol="0">
+            <a:spAutoFit/>
+          </a:bodyPr>
+          <a:lstStyle/>
+          <a:p>
+            <a:endParaRPr lang="en-GB" dirty="0"/>
+          </a:p>
+        </p:txBody>
+      </p:sp>
+      <p:sp>
+        <p:nvSpPr>
+          <p:cNvPr id="4" name="TextBox 3"/>
+          <p:cNvSpPr txBox="1"/>
+          <p:nvPr/>
+        </p:nvSpPr>
+        <p:spPr>
+          <a:xfrm>
+            <a:off x="848284" y="1032018"/>
+            <a:ext cx="784189" cy="615553"/>
+          </a:xfrm>
+          <a:prstGeom prst="rect">
+            <a:avLst/>
+          </a:prstGeom>
+          <a:noFill/>
+        </p:spPr>
+        <p:txBody>
+          <a:bodyPr wrap="none" rtlCol="0">
+            <a:spAutoFit/>
+          </a:bodyPr>
+          <a:lstStyle/>
+          <a:p>
+            <a:pPr algn="ctr"/>
+            <a:r>
+              <a:rPr lang="en-GB" sz="1700" dirty="0" err="1" smtClean="0"/>
+              <a:t>IgM</a:t>
+            </a:r>
+            <a:r>
+              <a:rPr lang="en-GB" sz="1700" baseline="30000" dirty="0" err="1" smtClean="0"/>
+              <a:t>high</a:t>
+            </a:r>
+            <a:endParaRPr lang="en-GB" sz="1700" dirty="0" smtClean="0"/>
+          </a:p>
+          <a:p>
+            <a:pPr algn="ctr"/>
+            <a:r>
+              <a:rPr lang="en-GB" sz="1700" dirty="0" smtClean="0"/>
+              <a:t>40.2%</a:t>
+            </a:r>
+            <a:endParaRPr lang="en-GB" sz="1700" dirty="0"/>
+          </a:p>
+        </p:txBody>
+      </p:sp>
+      <p:sp>
+        <p:nvSpPr>
+          <p:cNvPr id="7" name="Rectangle 6"/>
+          <p:cNvSpPr/>
+          <p:nvPr/>
+        </p:nvSpPr>
+        <p:spPr>
+          <a:xfrm>
+            <a:off x="4492487" y="1168842"/>
+            <a:ext cx="467756" cy="341906"/>
+          </a:xfrm>
+          <a:prstGeom prst="rect">
+            <a:avLst/>
+          </a:prstGeom>
+          <a:solidFill>
+            <a:schemeClr val="bg1"/>
+          </a:solidFill>
+          <a:ln>
+            <a:solidFill>
+              <a:schemeClr val="bg1"/>
+            </a:solidFill>
+          </a:ln>
+        </p:spPr>
+        <p:style>
+          <a:lnRef idx="2">
+            <a:schemeClr val="accent1">
+              <a:shade val="50000"/>
+            </a:schemeClr>
+          </a:lnRef>
+          <a:fillRef idx="1">
+            <a:schemeClr val="accent1"/>
+          </a:fillRef>
+          <a:effectRef idx="0">
+            <a:schemeClr val="accent1"/>
+          </a:effectRef>
+          <a:fontRef idx="minor">
+            <a:schemeClr val="lt1"/>
+          </a:fontRef>
+        </p:style>
+        <p:txBody>
+          <a:bodyPr rtlCol="0" anchor="ctr"/>
+          <a:lstStyle/>
+          <a:p>
+            <a:pPr algn="ctr"/>
+            <a:endParaRPr lang="en-GB"/>
+          </a:p>
+        </p:txBody>
+      </p:sp>
+      <p:sp>
+        <p:nvSpPr>
+          <p:cNvPr id="6" name="TextBox 5"/>
+          <p:cNvSpPr txBox="1"/>
+          <p:nvPr/>
+        </p:nvSpPr>
+        <p:spPr>
+          <a:xfrm>
+            <a:off x="4353484" y="1005983"/>
+            <a:ext cx="784189" cy="615553"/>
+          </a:xfrm>
+          <a:prstGeom prst="rect">
+            <a:avLst/>
+          </a:prstGeom>
+          <a:noFill/>
+        </p:spPr>
+        <p:txBody>
+          <a:bodyPr wrap="none" rtlCol="0">
+            <a:spAutoFit/>
+          </a:bodyPr>
+          <a:lstStyle/>
+          <a:p>
+            <a:r>
+              <a:rPr lang="en-GB" sz="1700" dirty="0" err="1" smtClean="0"/>
+              <a:t>IgM</a:t>
+            </a:r>
+            <a:r>
+              <a:rPr lang="en-GB" sz="1700" baseline="30000" dirty="0" err="1" smtClean="0"/>
+              <a:t>high</a:t>
+            </a:r>
+            <a:endParaRPr lang="en-GB" sz="1700" dirty="0" smtClean="0"/>
+          </a:p>
+          <a:p>
+            <a:r>
+              <a:rPr lang="en-GB" sz="1700" dirty="0" smtClean="0"/>
+              <a:t>17.2%</a:t>
+            </a:r>
+            <a:endParaRPr lang="en-GB" sz="1700" dirty="0"/>
+          </a:p>
+        </p:txBody>
+      </p:sp>
+      <p:sp>
+        <p:nvSpPr>
+          <p:cNvPr id="8" name="Rectangle 7"/>
+          <p:cNvSpPr/>
+          <p:nvPr/>
+        </p:nvSpPr>
+        <p:spPr>
+          <a:xfrm>
+            <a:off x="1053353" y="1952371"/>
+            <a:ext cx="477033" cy="302150"/>
+          </a:xfrm>
+          <a:prstGeom prst="rect">
+            <a:avLst/>
+          </a:prstGeom>
+          <a:solidFill>
+            <a:schemeClr val="bg1"/>
+          </a:solidFill>
+          <a:ln>
+            <a:solidFill>
+              <a:schemeClr val="bg1"/>
+            </a:solidFill>
+          </a:ln>
+        </p:spPr>
+        <p:style>
+          <a:lnRef idx="2">
+            <a:schemeClr val="accent1">
+              <a:shade val="50000"/>
+            </a:schemeClr>
+          </a:lnRef>
+          <a:fillRef idx="1">
+            <a:schemeClr val="accent1"/>
+          </a:fillRef>
+          <a:effectRef idx="0">
+            <a:schemeClr val="accent1"/>
+          </a:effectRef>
+          <a:fontRef idx="minor">
+            <a:schemeClr val="lt1"/>
+          </a:fontRef>
+        </p:style>
+        <p:txBody>
+          <a:bodyPr rtlCol="0" anchor="ctr"/>
+          <a:lstStyle/>
+          <a:p>
+            <a:pPr algn="ctr"/>
+            <a:endParaRPr lang="en-GB"/>
+          </a:p>
+        </p:txBody>
+      </p:sp>
+      <p:sp>
+        <p:nvSpPr>
+          <p:cNvPr id="9" name="Rectangle 8"/>
+          <p:cNvSpPr/>
+          <p:nvPr/>
+        </p:nvSpPr>
+        <p:spPr>
+          <a:xfrm>
+            <a:off x="4540775" y="1924762"/>
+            <a:ext cx="477033" cy="302150"/>
+          </a:xfrm>
+          <a:prstGeom prst="rect">
+            <a:avLst/>
+          </a:prstGeom>
+          <a:solidFill>
+            <a:schemeClr val="bg1"/>
+          </a:solidFill>
+          <a:ln>
+            <a:solidFill>
+              <a:schemeClr val="bg1"/>
+            </a:solidFill>
+          </a:ln>
+        </p:spPr>
+        <p:style>
+          <a:lnRef idx="2">
+            <a:schemeClr val="accent1">
+              <a:shade val="50000"/>
+            </a:schemeClr>
+          </a:lnRef>
+          <a:fillRef idx="1">
+            <a:schemeClr val="accent1"/>
+          </a:fillRef>
+          <a:effectRef idx="0">
+            <a:schemeClr val="accent1"/>
+          </a:effectRef>
+          <a:fontRef idx="minor">
+            <a:schemeClr val="lt1"/>
+          </a:fontRef>
+        </p:style>
+        <p:txBody>
+          <a:bodyPr rtlCol="0" anchor="ctr"/>
+          <a:lstStyle/>
+          <a:p>
+            <a:pPr algn="ctr"/>
+            <a:endParaRPr lang="en-GB"/>
+          </a:p>
+        </p:txBody>
+      </p:sp>
+      <p:sp>
+        <p:nvSpPr>
+          <p:cNvPr id="10" name="TextBox 9"/>
+          <p:cNvSpPr txBox="1"/>
+          <p:nvPr/>
+        </p:nvSpPr>
+        <p:spPr>
+          <a:xfrm>
+            <a:off x="848284" y="1764066"/>
+            <a:ext cx="741934" cy="615553"/>
+          </a:xfrm>
+          <a:prstGeom prst="rect">
+            <a:avLst/>
+          </a:prstGeom>
+          <a:noFill/>
+        </p:spPr>
+        <p:txBody>
+          <a:bodyPr wrap="none" rtlCol="0">
+            <a:spAutoFit/>
+          </a:bodyPr>
+          <a:lstStyle/>
+          <a:p>
+            <a:pPr algn="ctr"/>
+            <a:r>
+              <a:rPr lang="en-GB" sz="1700" dirty="0" err="1" smtClean="0"/>
+              <a:t>IgM</a:t>
+            </a:r>
+            <a:r>
+              <a:rPr lang="en-GB" sz="1700" baseline="30000" dirty="0" err="1" smtClean="0"/>
+              <a:t>low</a:t>
+            </a:r>
+            <a:endParaRPr lang="en-GB" sz="1700" dirty="0" smtClean="0"/>
+          </a:p>
+          <a:p>
+            <a:pPr algn="ctr"/>
+            <a:r>
+              <a:rPr lang="en-GB" sz="1700" dirty="0" smtClean="0"/>
+              <a:t>23.9%</a:t>
+            </a:r>
+            <a:endParaRPr lang="en-GB" sz="1700" dirty="0"/>
+          </a:p>
+        </p:txBody>
+      </p:sp>
+      <p:sp>
+        <p:nvSpPr>
+          <p:cNvPr id="11" name="TextBox 10"/>
+          <p:cNvSpPr txBox="1"/>
+          <p:nvPr/>
+        </p:nvSpPr>
+        <p:spPr>
+          <a:xfrm>
+            <a:off x="4353484" y="1764065"/>
+            <a:ext cx="741934" cy="615553"/>
+          </a:xfrm>
+          <a:prstGeom prst="rect">
+            <a:avLst/>
+          </a:prstGeom>
+          <a:noFill/>
+        </p:spPr>
+        <p:txBody>
+          <a:bodyPr wrap="none" rtlCol="0">
+            <a:spAutoFit/>
+          </a:bodyPr>
+          <a:lstStyle/>
+          <a:p>
+            <a:pPr algn="ctr"/>
+            <a:r>
+              <a:rPr lang="en-GB" sz="1700" dirty="0" err="1" smtClean="0"/>
+              <a:t>IgM</a:t>
+            </a:r>
+            <a:r>
+              <a:rPr lang="en-GB" sz="1700" baseline="30000" dirty="0" err="1" smtClean="0"/>
+              <a:t>low</a:t>
+            </a:r>
+            <a:endParaRPr lang="en-GB" sz="1700" dirty="0" smtClean="0"/>
+          </a:p>
+          <a:p>
+            <a:pPr algn="ctr"/>
+            <a:r>
+              <a:rPr lang="en-GB" sz="1700" dirty="0" smtClean="0"/>
+              <a:t>74.1%</a:t>
+            </a:r>
+            <a:endParaRPr lang="en-GB" sz="1700" dirty="0"/>
+          </a:p>
+        </p:txBody>
+      </p:sp>
+      <p:sp>
+        <p:nvSpPr>
+          <p:cNvPr id="14" name="Rectangle 13"/>
+          <p:cNvSpPr/>
+          <p:nvPr/>
+        </p:nvSpPr>
+        <p:spPr>
+          <a:xfrm>
+            <a:off x="4492487" y="2639833"/>
+            <a:ext cx="389614" cy="318254"/>
+          </a:xfrm>
+          <a:prstGeom prst="rect">
+            <a:avLst/>
+          </a:prstGeom>
+          <a:solidFill>
+            <a:schemeClr val="bg1"/>
+          </a:solidFill>
+          <a:ln>
+            <a:solidFill>
+              <a:schemeClr val="bg1"/>
+            </a:solidFill>
+          </a:ln>
+        </p:spPr>
+        <p:style>
+          <a:lnRef idx="2">
+            <a:schemeClr val="accent1">
+              <a:shade val="50000"/>
+            </a:schemeClr>
+          </a:lnRef>
+          <a:fillRef idx="1">
+            <a:schemeClr val="accent1"/>
+          </a:fillRef>
+          <a:effectRef idx="0">
+            <a:schemeClr val="accent1"/>
+          </a:effectRef>
+          <a:fontRef idx="minor">
+            <a:schemeClr val="lt1"/>
+          </a:fontRef>
+        </p:style>
+        <p:txBody>
+          <a:bodyPr rtlCol="0" anchor="ctr"/>
+          <a:lstStyle/>
+          <a:p>
+            <a:pPr algn="ctr"/>
+            <a:endParaRPr lang="en-GB"/>
+          </a:p>
+        </p:txBody>
+      </p:sp>
+      <p:sp>
+        <p:nvSpPr>
+          <p:cNvPr id="15" name="Rectangle 14"/>
+          <p:cNvSpPr/>
+          <p:nvPr/>
+        </p:nvSpPr>
+        <p:spPr>
+          <a:xfrm>
+            <a:off x="1021719" y="2639833"/>
+            <a:ext cx="389614" cy="318254"/>
+          </a:xfrm>
+          <a:prstGeom prst="rect">
+            <a:avLst/>
+          </a:prstGeom>
+          <a:solidFill>
+            <a:schemeClr val="bg1"/>
+          </a:solidFill>
+          <a:ln>
+            <a:solidFill>
+              <a:schemeClr val="bg1"/>
+            </a:solidFill>
+          </a:ln>
+        </p:spPr>
+        <p:style>
+          <a:lnRef idx="2">
+            <a:schemeClr val="accent1">
+              <a:shade val="50000"/>
+            </a:schemeClr>
+          </a:lnRef>
+          <a:fillRef idx="1">
+            <a:schemeClr val="accent1"/>
+          </a:fillRef>
+          <a:effectRef idx="0">
+            <a:schemeClr val="accent1"/>
+          </a:effectRef>
+          <a:fontRef idx="minor">
+            <a:schemeClr val="lt1"/>
+          </a:fontRef>
+        </p:style>
+        <p:txBody>
+          <a:bodyPr rtlCol="0" anchor="ctr"/>
+          <a:lstStyle/>
+          <a:p>
+            <a:pPr algn="ctr"/>
+            <a:endParaRPr lang="en-GB"/>
+          </a:p>
+        </p:txBody>
+      </p:sp>
+      <p:sp>
+        <p:nvSpPr>
+          <p:cNvPr id="12" name="TextBox 11"/>
+          <p:cNvSpPr txBox="1"/>
+          <p:nvPr/>
+        </p:nvSpPr>
+        <p:spPr>
+          <a:xfrm>
+            <a:off x="853285" y="2442826"/>
+            <a:ext cx="726482" cy="615553"/>
+          </a:xfrm>
+          <a:prstGeom prst="rect">
+            <a:avLst/>
+          </a:prstGeom>
+          <a:noFill/>
+        </p:spPr>
+        <p:txBody>
+          <a:bodyPr wrap="none" rtlCol="0">
+            <a:spAutoFit/>
+          </a:bodyPr>
+          <a:lstStyle/>
+          <a:p>
+            <a:pPr algn="ctr"/>
+            <a:r>
+              <a:rPr lang="en-GB" sz="1700" dirty="0" smtClean="0"/>
+              <a:t>IgM-</a:t>
+            </a:r>
+          </a:p>
+          <a:p>
+            <a:pPr algn="ctr"/>
+            <a:r>
+              <a:rPr lang="en-GB" sz="1700" dirty="0" smtClean="0"/>
+              <a:t>21.7%</a:t>
+            </a:r>
+            <a:endParaRPr lang="en-GB" sz="1700" dirty="0"/>
+          </a:p>
+        </p:txBody>
+      </p:sp>
+      <p:sp>
+        <p:nvSpPr>
+          <p:cNvPr id="13" name="TextBox 12"/>
+          <p:cNvSpPr txBox="1"/>
+          <p:nvPr/>
+        </p:nvSpPr>
+        <p:spPr>
+          <a:xfrm>
+            <a:off x="4353484" y="2442826"/>
+            <a:ext cx="726482" cy="615553"/>
+          </a:xfrm>
+          <a:prstGeom prst="rect">
+            <a:avLst/>
+          </a:prstGeom>
+          <a:noFill/>
+        </p:spPr>
+        <p:txBody>
+          <a:bodyPr wrap="none" rtlCol="0">
+            <a:spAutoFit/>
+          </a:bodyPr>
+          <a:lstStyle/>
+          <a:p>
+            <a:pPr algn="ctr"/>
+            <a:r>
+              <a:rPr lang="en-GB" sz="1700" dirty="0" smtClean="0"/>
+              <a:t>IgM-</a:t>
+            </a:r>
+          </a:p>
+          <a:p>
+            <a:pPr algn="ctr"/>
+            <a:r>
+              <a:rPr lang="en-GB" sz="1700" dirty="0" smtClean="0"/>
+              <a:t>4.01%</a:t>
+            </a:r>
+            <a:endParaRPr lang="en-GB" sz="1700" dirty="0"/>
+          </a:p>
+        </p:txBody>
+      </p:sp>
+      <p:sp>
+        <p:nvSpPr>
+          <p:cNvPr id="16" name="TextBox 15"/>
+          <p:cNvSpPr txBox="1"/>
+          <p:nvPr/>
+        </p:nvSpPr>
+        <p:spPr>
+          <a:xfrm rot="16200000">
+            <a:off x="-727963" y="1897175"/>
+            <a:ext cx="2176216" cy="461665"/>
+          </a:xfrm>
+          <a:prstGeom prst="rect">
+            <a:avLst/>
+          </a:prstGeom>
+          <a:solidFill>
+            <a:schemeClr val="bg1"/>
+          </a:solidFill>
+        </p:spPr>
+        <p:txBody>
+          <a:bodyPr wrap="square" rtlCol="0">
+            <a:spAutoFit/>
+          </a:bodyPr>
+          <a:lstStyle/>
+          <a:p>
+            <a:r>
+              <a:rPr lang="en-GB" sz="2400" dirty="0" smtClean="0"/>
+              <a:t>IgM</a:t>
+            </a:r>
+            <a:endParaRPr lang="en-GB" sz="2400" dirty="0"/>
+          </a:p>
+        </p:txBody>
+      </p:sp>
+      <p:sp>
+        <p:nvSpPr>
+          <p:cNvPr id="17" name="TextBox 16"/>
+          <p:cNvSpPr txBox="1"/>
+          <p:nvPr/>
+        </p:nvSpPr>
+        <p:spPr>
+          <a:xfrm>
+            <a:off x="907169" y="3468937"/>
+            <a:ext cx="2402382" cy="461665"/>
+          </a:xfrm>
+          <a:prstGeom prst="rect">
+            <a:avLst/>
+          </a:prstGeom>
+          <a:solidFill>
+            <a:schemeClr val="bg1"/>
+          </a:solidFill>
+        </p:spPr>
+        <p:txBody>
+          <a:bodyPr wrap="square" rtlCol="0">
+            <a:spAutoFit/>
+          </a:bodyPr>
+          <a:lstStyle/>
+          <a:p>
+            <a:r>
+              <a:rPr lang="en-GB" sz="2400" dirty="0" smtClean="0"/>
+              <a:t>Side Scatter</a:t>
+            </a:r>
+            <a:endParaRPr lang="en-GB" sz="2400" dirty="0"/>
+          </a:p>
+        </p:txBody>
+      </p:sp>
+      <p:sp>
+        <p:nvSpPr>
+          <p:cNvPr id="18" name="TextBox 17"/>
+          <p:cNvSpPr txBox="1"/>
+          <p:nvPr/>
+        </p:nvSpPr>
+        <p:spPr>
+          <a:xfrm rot="16200000">
+            <a:off x="2794469" y="1897175"/>
+            <a:ext cx="2176216" cy="461665"/>
+          </a:xfrm>
+          <a:prstGeom prst="rect">
+            <a:avLst/>
+          </a:prstGeom>
+          <a:solidFill>
+            <a:schemeClr val="bg1"/>
+          </a:solidFill>
+        </p:spPr>
+        <p:txBody>
+          <a:bodyPr wrap="square" rtlCol="0">
+            <a:spAutoFit/>
+          </a:bodyPr>
+          <a:lstStyle/>
+          <a:p>
+            <a:r>
+              <a:rPr lang="en-GB" sz="2400" dirty="0" smtClean="0"/>
+              <a:t>IgM</a:t>
+            </a:r>
+            <a:endParaRPr lang="en-GB" sz="2400" dirty="0"/>
+          </a:p>
+        </p:txBody>
+      </p:sp>
+      <p:sp>
+        <p:nvSpPr>
+          <p:cNvPr id="19" name="TextBox 18"/>
+          <p:cNvSpPr txBox="1"/>
+          <p:nvPr/>
+        </p:nvSpPr>
+        <p:spPr>
+          <a:xfrm>
+            <a:off x="4429601" y="3468937"/>
+            <a:ext cx="2402382" cy="461665"/>
+          </a:xfrm>
+          <a:prstGeom prst="rect">
+            <a:avLst/>
+          </a:prstGeom>
+          <a:solidFill>
+            <a:schemeClr val="bg1"/>
+          </a:solidFill>
+        </p:spPr>
+        <p:txBody>
+          <a:bodyPr wrap="square" rtlCol="0">
+            <a:spAutoFit/>
+          </a:bodyPr>
+          <a:lstStyle/>
+          <a:p>
+            <a:r>
+              <a:rPr lang="en-GB" sz="2400" dirty="0" smtClean="0"/>
+              <a:t>Side Scatter</a:t>
+            </a:r>
+            <a:endParaRPr lang="en-GB" sz="2400" dirty="0"/>
+          </a:p>
+        </p:txBody>
+      </p:sp>
+      <p:sp>
+        <p:nvSpPr>
+          <p:cNvPr id="20" name="TextBox 19"/>
+          <p:cNvSpPr txBox="1"/>
+          <p:nvPr/>
+        </p:nvSpPr>
+        <p:spPr>
+          <a:xfrm>
+            <a:off x="1530386" y="108889"/>
+            <a:ext cx="832279" cy="461665"/>
+          </a:xfrm>
+          <a:prstGeom prst="rect">
+            <a:avLst/>
+          </a:prstGeom>
+          <a:noFill/>
+        </p:spPr>
+        <p:txBody>
+          <a:bodyPr wrap="none" rtlCol="0">
+            <a:spAutoFit/>
+          </a:bodyPr>
+          <a:lstStyle/>
+          <a:p>
+            <a:r>
+              <a:rPr lang="en-GB" sz="2400" dirty="0" smtClean="0"/>
+              <a:t>GFP+</a:t>
+            </a:r>
+            <a:endParaRPr lang="en-GB" sz="2400" dirty="0"/>
+          </a:p>
+        </p:txBody>
+      </p:sp>
+      <p:sp>
+        <p:nvSpPr>
+          <p:cNvPr id="21" name="TextBox 20"/>
+          <p:cNvSpPr txBox="1"/>
+          <p:nvPr/>
+        </p:nvSpPr>
+        <p:spPr>
+          <a:xfrm>
+            <a:off x="5017808" y="108889"/>
+            <a:ext cx="772969" cy="461665"/>
+          </a:xfrm>
+          <a:prstGeom prst="rect">
+            <a:avLst/>
+          </a:prstGeom>
+          <a:noFill/>
+        </p:spPr>
+        <p:txBody>
+          <a:bodyPr wrap="none" rtlCol="0">
+            <a:spAutoFit/>
+          </a:bodyPr>
+          <a:lstStyle/>
+          <a:p>
+            <a:r>
+              <a:rPr lang="en-GB" sz="2400" dirty="0" smtClean="0"/>
+              <a:t>GFP-</a:t>
+            </a:r>
+            <a:endParaRPr lang="en-GB" sz="2400" dirty="0"/>
+          </a:p>
+        </p:txBody>
+      </p:sp>
+    </p:spTree>
+    <p:extLst>
+      <p:ext uri="{BB962C8B-B14F-4D97-AF65-F5344CB8AC3E}">
+        <p14:creationId xmlns:p14="http://schemas.microsoft.com/office/powerpoint/2010/main" val="1566873023"/>
       </p:ext>
     </p:extLst>
   </p:cSld>

</xml_diff>

<commit_message>
Pretty much finished results corrections.
</commit_message>
<xml_diff>
--- a/Figures/Powerpoints/2 plots.pptx
+++ b/Figures/Powerpoints/2 plots.pptx
@@ -5,7 +5,7 @@
     <p:sldMasterId id="2147483660" r:id="rId1"/>
   </p:sldMasterIdLst>
   <p:notesMasterIdLst>
-    <p:notesMasterId r:id="rId26"/>
+    <p:notesMasterId r:id="rId27"/>
   </p:notesMasterIdLst>
   <p:sldIdLst>
     <p:sldId id="256" r:id="rId2"/>
@@ -19,19 +19,20 @@
     <p:sldId id="265" r:id="rId10"/>
     <p:sldId id="266" r:id="rId11"/>
     <p:sldId id="267" r:id="rId12"/>
-    <p:sldId id="268" r:id="rId13"/>
-    <p:sldId id="269" r:id="rId14"/>
-    <p:sldId id="270" r:id="rId15"/>
-    <p:sldId id="271" r:id="rId16"/>
-    <p:sldId id="272" r:id="rId17"/>
-    <p:sldId id="273" r:id="rId18"/>
-    <p:sldId id="274" r:id="rId19"/>
-    <p:sldId id="275" r:id="rId20"/>
-    <p:sldId id="276" r:id="rId21"/>
-    <p:sldId id="277" r:id="rId22"/>
-    <p:sldId id="278" r:id="rId23"/>
-    <p:sldId id="279" r:id="rId24"/>
-    <p:sldId id="280" r:id="rId25"/>
+    <p:sldId id="281" r:id="rId13"/>
+    <p:sldId id="268" r:id="rId14"/>
+    <p:sldId id="269" r:id="rId15"/>
+    <p:sldId id="270" r:id="rId16"/>
+    <p:sldId id="271" r:id="rId17"/>
+    <p:sldId id="272" r:id="rId18"/>
+    <p:sldId id="273" r:id="rId19"/>
+    <p:sldId id="274" r:id="rId20"/>
+    <p:sldId id="275" r:id="rId21"/>
+    <p:sldId id="276" r:id="rId22"/>
+    <p:sldId id="277" r:id="rId23"/>
+    <p:sldId id="278" r:id="rId24"/>
+    <p:sldId id="279" r:id="rId25"/>
+    <p:sldId id="280" r:id="rId26"/>
   </p:sldIdLst>
   <p:sldSz cx="7199313" cy="4319588"/>
   <p:notesSz cx="6858000" cy="9144000"/>
@@ -408,11 +409,11 @@
         </c:dLbls>
         <c:gapWidth val="219"/>
         <c:overlap val="-27"/>
-        <c:axId val="-661055920"/>
-        <c:axId val="-661048848"/>
+        <c:axId val="535940032"/>
+        <c:axId val="535952544"/>
       </c:barChart>
       <c:catAx>
-        <c:axId val="-661055920"/>
+        <c:axId val="535940032"/>
         <c:scaling>
           <c:orientation val="minMax"/>
         </c:scaling>
@@ -455,7 +456,7 @@
             <a:endParaRPr lang="en-US"/>
           </a:p>
         </c:txPr>
-        <c:crossAx val="-661048848"/>
+        <c:crossAx val="535952544"/>
         <c:crosses val="autoZero"/>
         <c:auto val="1"/>
         <c:lblAlgn val="ctr"/>
@@ -463,7 +464,7 @@
         <c:noMultiLvlLbl val="0"/>
       </c:catAx>
       <c:valAx>
-        <c:axId val="-661048848"/>
+        <c:axId val="535952544"/>
         <c:scaling>
           <c:orientation val="minMax"/>
         </c:scaling>
@@ -514,7 +515,7 @@
             <a:endParaRPr lang="en-US"/>
           </a:p>
         </c:txPr>
-        <c:crossAx val="-661055920"/>
+        <c:crossAx val="535940032"/>
         <c:crosses val="autoZero"/>
         <c:crossBetween val="between"/>
       </c:valAx>
@@ -1646,7 +1647,7 @@
           <a:p>
             <a:fld id="{299D7968-2305-4D34-80DD-72B95C617568}" type="slidenum">
               <a:rPr lang="en-GB" smtClean="0"/>
-              <a:t>15</a:t>
+              <a:t>16</a:t>
             </a:fld>
             <a:endParaRPr lang="en-GB"/>
           </a:p>
@@ -1750,7 +1751,7 @@
           <a:p>
             <a:fld id="{299D7968-2305-4D34-80DD-72B95C617568}" type="slidenum">
               <a:rPr lang="en-GB" smtClean="0"/>
-              <a:t>17</a:t>
+              <a:t>18</a:t>
             </a:fld>
             <a:endParaRPr lang="en-GB"/>
           </a:p>
@@ -1844,7 +1845,7 @@
           <a:p>
             <a:fld id="{299D7968-2305-4D34-80DD-72B95C617568}" type="slidenum">
               <a:rPr lang="en-GB" smtClean="0"/>
-              <a:t>18</a:t>
+              <a:t>19</a:t>
             </a:fld>
             <a:endParaRPr lang="en-GB"/>
           </a:p>
@@ -1938,7 +1939,7 @@
           <a:p>
             <a:fld id="{299D7968-2305-4D34-80DD-72B95C617568}" type="slidenum">
               <a:rPr lang="en-GB" smtClean="0"/>
-              <a:t>19</a:t>
+              <a:t>20</a:t>
             </a:fld>
             <a:endParaRPr lang="en-GB"/>
           </a:p>
@@ -2616,7 +2617,7 @@
           <a:p>
             <a:fld id="{299D7968-2305-4D34-80DD-72B95C617568}" type="slidenum">
               <a:rPr lang="en-GB" smtClean="0"/>
-              <a:t>12</a:t>
+              <a:t>13</a:t>
             </a:fld>
             <a:endParaRPr lang="en-GB"/>
           </a:p>
@@ -2704,7 +2705,7 @@
           <a:p>
             <a:fld id="{299D7968-2305-4D34-80DD-72B95C617568}" type="slidenum">
               <a:rPr lang="en-GB" smtClean="0"/>
-              <a:t>14</a:t>
+              <a:t>15</a:t>
             </a:fld>
             <a:endParaRPr lang="en-GB"/>
           </a:p>
@@ -6064,21 +6065,16 @@
           </p:cNvPicPr>
           <p:nvPr/>
         </p:nvPicPr>
-        <p:blipFill rotWithShape="1">
-          <a:blip r:embed="rId3">
-            <a:extLst>
-              <a:ext uri="{28A0092B-C50C-407E-A947-70E740481C1C}">
-                <a14:useLocalDpi xmlns:a14="http://schemas.microsoft.com/office/drawing/2010/main" val="0"/>
-              </a:ext>
-            </a:extLst>
-          </a:blip>
-          <a:srcRect l="25181" r="7668"/>
-          <a:stretch/>
+        <p:blipFill>
+          <a:blip r:embed="rId2"/>
+          <a:stretch>
+            <a:fillRect/>
+          </a:stretch>
         </p:blipFill>
         <p:spPr>
           <a:xfrm>
-            <a:off x="0" y="-794"/>
-            <a:ext cx="3625795" cy="4319588"/>
+            <a:off x="3606814" y="339725"/>
+            <a:ext cx="3505200" cy="3638550"/>
           </a:xfrm>
           <a:prstGeom prst="rect">
             <a:avLst/>
@@ -6093,131 +6089,288 @@
           </p:cNvPicPr>
           <p:nvPr/>
         </p:nvPicPr>
-        <p:blipFill rotWithShape="1">
-          <a:blip r:embed="rId3">
-            <a:extLst>
-              <a:ext uri="{28A0092B-C50C-407E-A947-70E740481C1C}">
-                <a14:useLocalDpi xmlns:a14="http://schemas.microsoft.com/office/drawing/2010/main" val="0"/>
-              </a:ext>
-            </a:extLst>
-          </a:blip>
-          <a:srcRect l="38729" t="35811" r="38620" b="38167"/>
-          <a:stretch/>
+        <p:blipFill>
+          <a:blip r:embed="rId3"/>
+          <a:stretch>
+            <a:fillRect/>
+          </a:stretch>
         </p:blipFill>
         <p:spPr>
           <a:xfrm>
-            <a:off x="3815951" y="751951"/>
-            <a:ext cx="3061928" cy="2814097"/>
-          </a:xfrm>
-          <a:prstGeom prst="rect">
-            <a:avLst/>
-          </a:prstGeom>
-          <a:ln w="28575">
-            <a:solidFill>
-              <a:srgbClr val="FF0000"/>
-            </a:solidFill>
-          </a:ln>
+            <a:off x="93663" y="339725"/>
+            <a:ext cx="3505200" cy="3638550"/>
+          </a:xfrm>
+          <a:prstGeom prst="rect">
+            <a:avLst/>
+          </a:prstGeom>
         </p:spPr>
       </p:pic>
-      <p:cxnSp>
-        <p:nvCxnSpPr>
-          <p:cNvPr id="5" name="Straight Arrow Connector 4"/>
-          <p:cNvCxnSpPr/>
-          <p:nvPr/>
-        </p:nvCxnSpPr>
-        <p:spPr>
-          <a:xfrm>
-            <a:off x="1327868" y="2226365"/>
-            <a:ext cx="3434963" cy="238539"/>
-          </a:xfrm>
-          <a:prstGeom prst="straightConnector1">
-            <a:avLst/>
-          </a:prstGeom>
-          <a:ln w="28575">
-            <a:solidFill>
-              <a:srgbClr val="FF0000"/>
-            </a:solidFill>
-            <a:tailEnd type="triangle"/>
-          </a:ln>
-        </p:spPr>
-        <p:style>
-          <a:lnRef idx="1">
-            <a:schemeClr val="accent1"/>
-          </a:lnRef>
-          <a:fillRef idx="0">
-            <a:schemeClr val="accent1"/>
-          </a:fillRef>
-          <a:effectRef idx="0">
-            <a:schemeClr val="accent1"/>
-          </a:effectRef>
-          <a:fontRef idx="minor">
-            <a:schemeClr val="tx1"/>
-          </a:fontRef>
-        </p:style>
-      </p:cxnSp>
-      <p:sp>
-        <p:nvSpPr>
-          <p:cNvPr id="9" name="Rectangle 8"/>
-          <p:cNvSpPr/>
-          <p:nvPr/>
-        </p:nvSpPr>
-        <p:spPr>
-          <a:xfrm>
-            <a:off x="739472" y="1773141"/>
-            <a:ext cx="1168842" cy="898497"/>
+      <p:sp>
+        <p:nvSpPr>
+          <p:cNvPr id="4" name="TextBox 3"/>
+          <p:cNvSpPr txBox="1"/>
+          <p:nvPr/>
+        </p:nvSpPr>
+        <p:spPr>
+          <a:xfrm>
+            <a:off x="2456954" y="811033"/>
+            <a:ext cx="875561" cy="369332"/>
           </a:xfrm>
           <a:prstGeom prst="rect">
             <a:avLst/>
           </a:prstGeom>
           <a:noFill/>
-          <a:ln>
-            <a:solidFill>
-              <a:srgbClr val="FF0000"/>
-            </a:solidFill>
-          </a:ln>
-        </p:spPr>
-        <p:style>
-          <a:lnRef idx="2">
-            <a:schemeClr val="accent1">
-              <a:shade val="50000"/>
-            </a:schemeClr>
-          </a:lnRef>
-          <a:fillRef idx="1">
-            <a:schemeClr val="accent1"/>
-          </a:fillRef>
-          <a:effectRef idx="0">
-            <a:schemeClr val="accent1"/>
-          </a:effectRef>
-          <a:fontRef idx="minor">
-            <a:schemeClr val="lt1"/>
-          </a:fontRef>
-        </p:style>
-        <p:txBody>
-          <a:bodyPr rtlCol="0" anchor="ctr"/>
-          <a:lstStyle/>
-          <a:p>
-            <a:pPr algn="ctr"/>
-            <a:endParaRPr lang="en-GB"/>
+        </p:spPr>
+        <p:txBody>
+          <a:bodyPr wrap="none" rtlCol="0">
+            <a:spAutoFit/>
+          </a:bodyPr>
+          <a:lstStyle/>
+          <a:p>
+            <a:r>
+              <a:rPr lang="en-GB" sz="1800" dirty="0" smtClean="0"/>
+              <a:t>0.440%</a:t>
+            </a:r>
+            <a:endParaRPr lang="en-GB" sz="1800" dirty="0"/>
+          </a:p>
+        </p:txBody>
+      </p:sp>
+      <p:sp>
+        <p:nvSpPr>
+          <p:cNvPr id="5" name="TextBox 4"/>
+          <p:cNvSpPr txBox="1"/>
+          <p:nvPr/>
+        </p:nvSpPr>
+        <p:spPr>
+          <a:xfrm rot="16200000">
+            <a:off x="-727963" y="1897175"/>
+            <a:ext cx="2176216" cy="461665"/>
+          </a:xfrm>
+          <a:prstGeom prst="rect">
+            <a:avLst/>
+          </a:prstGeom>
+          <a:solidFill>
+            <a:schemeClr val="bg1"/>
+          </a:solidFill>
+        </p:spPr>
+        <p:txBody>
+          <a:bodyPr wrap="square" rtlCol="0">
+            <a:spAutoFit/>
+          </a:bodyPr>
+          <a:lstStyle/>
+          <a:p>
+            <a:r>
+              <a:rPr lang="en-GB" sz="2400" dirty="0" smtClean="0"/>
+              <a:t>IgM</a:t>
+            </a:r>
+            <a:endParaRPr lang="en-GB" sz="2400" dirty="0"/>
+          </a:p>
+        </p:txBody>
+      </p:sp>
+      <p:sp>
+        <p:nvSpPr>
+          <p:cNvPr id="6" name="TextBox 5"/>
+          <p:cNvSpPr txBox="1"/>
+          <p:nvPr/>
+        </p:nvSpPr>
+        <p:spPr>
+          <a:xfrm>
+            <a:off x="907169" y="3468937"/>
+            <a:ext cx="2402382" cy="461665"/>
+          </a:xfrm>
+          <a:prstGeom prst="rect">
+            <a:avLst/>
+          </a:prstGeom>
+          <a:solidFill>
+            <a:schemeClr val="bg1"/>
+          </a:solidFill>
+        </p:spPr>
+        <p:txBody>
+          <a:bodyPr wrap="square" rtlCol="0">
+            <a:spAutoFit/>
+          </a:bodyPr>
+          <a:lstStyle/>
+          <a:p>
+            <a:r>
+              <a:rPr lang="en-GB" sz="2400" dirty="0" err="1" smtClean="0"/>
+              <a:t>TcR</a:t>
+            </a:r>
+            <a:r>
+              <a:rPr lang="el-GR" sz="2400" dirty="0" smtClean="0"/>
+              <a:t>β</a:t>
+            </a:r>
+            <a:endParaRPr lang="en-GB" sz="2400" dirty="0"/>
+          </a:p>
+        </p:txBody>
+      </p:sp>
+      <p:sp>
+        <p:nvSpPr>
+          <p:cNvPr id="7" name="TextBox 6"/>
+          <p:cNvSpPr txBox="1"/>
+          <p:nvPr/>
+        </p:nvSpPr>
+        <p:spPr>
+          <a:xfrm rot="16200000">
+            <a:off x="2794469" y="1897175"/>
+            <a:ext cx="2176216" cy="461665"/>
+          </a:xfrm>
+          <a:prstGeom prst="rect">
+            <a:avLst/>
+          </a:prstGeom>
+          <a:solidFill>
+            <a:schemeClr val="bg1"/>
+          </a:solidFill>
+        </p:spPr>
+        <p:txBody>
+          <a:bodyPr wrap="square" rtlCol="0">
+            <a:spAutoFit/>
+          </a:bodyPr>
+          <a:lstStyle/>
+          <a:p>
+            <a:r>
+              <a:rPr lang="en-GB" sz="2400" dirty="0" smtClean="0"/>
+              <a:t>IgM</a:t>
+            </a:r>
+            <a:endParaRPr lang="en-GB" sz="2400" dirty="0"/>
+          </a:p>
+        </p:txBody>
+      </p:sp>
+      <p:sp>
+        <p:nvSpPr>
+          <p:cNvPr id="8" name="TextBox 7"/>
+          <p:cNvSpPr txBox="1"/>
+          <p:nvPr/>
+        </p:nvSpPr>
+        <p:spPr>
+          <a:xfrm>
+            <a:off x="4429601" y="3468937"/>
+            <a:ext cx="2402382" cy="461665"/>
+          </a:xfrm>
+          <a:prstGeom prst="rect">
+            <a:avLst/>
+          </a:prstGeom>
+          <a:solidFill>
+            <a:schemeClr val="bg1"/>
+          </a:solidFill>
+        </p:spPr>
+        <p:txBody>
+          <a:bodyPr wrap="square" rtlCol="0">
+            <a:spAutoFit/>
+          </a:bodyPr>
+          <a:lstStyle/>
+          <a:p>
+            <a:r>
+              <a:rPr lang="en-GB" sz="2400" dirty="0" err="1"/>
+              <a:t>TcR</a:t>
+            </a:r>
+            <a:r>
+              <a:rPr lang="el-GR" sz="2400" dirty="0" smtClean="0"/>
+              <a:t>β</a:t>
+            </a:r>
+            <a:endParaRPr lang="en-GB" sz="2400" dirty="0"/>
+          </a:p>
+        </p:txBody>
+      </p:sp>
+      <p:sp>
+        <p:nvSpPr>
+          <p:cNvPr id="9" name="TextBox 8"/>
+          <p:cNvSpPr txBox="1"/>
+          <p:nvPr/>
+        </p:nvSpPr>
+        <p:spPr>
+          <a:xfrm>
+            <a:off x="6073442" y="811033"/>
+            <a:ext cx="758541" cy="369332"/>
+          </a:xfrm>
+          <a:prstGeom prst="rect">
+            <a:avLst/>
+          </a:prstGeom>
+          <a:noFill/>
+        </p:spPr>
+        <p:txBody>
+          <a:bodyPr wrap="none" rtlCol="0">
+            <a:spAutoFit/>
+          </a:bodyPr>
+          <a:lstStyle/>
+          <a:p>
+            <a:r>
+              <a:rPr lang="en-GB" sz="1800" dirty="0" smtClean="0"/>
+              <a:t>0.00%</a:t>
+            </a:r>
+            <a:endParaRPr lang="en-GB" sz="1800" dirty="0"/>
+          </a:p>
+        </p:txBody>
+      </p:sp>
+      <p:sp>
+        <p:nvSpPr>
+          <p:cNvPr id="10" name="TextBox 9"/>
+          <p:cNvSpPr txBox="1"/>
+          <p:nvPr/>
+        </p:nvSpPr>
+        <p:spPr>
+          <a:xfrm>
+            <a:off x="1426000" y="108891"/>
+            <a:ext cx="1158394" cy="461665"/>
+          </a:xfrm>
+          <a:prstGeom prst="rect">
+            <a:avLst/>
+          </a:prstGeom>
+          <a:noFill/>
+        </p:spPr>
+        <p:txBody>
+          <a:bodyPr wrap="none" rtlCol="0">
+            <a:spAutoFit/>
+          </a:bodyPr>
+          <a:lstStyle/>
+          <a:p>
+            <a:r>
+              <a:rPr lang="en-GB" sz="2400" dirty="0" smtClean="0"/>
+              <a:t>Thymus</a:t>
+            </a:r>
+            <a:endParaRPr lang="en-GB" sz="2400" dirty="0"/>
+          </a:p>
+        </p:txBody>
+      </p:sp>
+      <p:sp>
+        <p:nvSpPr>
+          <p:cNvPr id="11" name="TextBox 10"/>
+          <p:cNvSpPr txBox="1"/>
+          <p:nvPr/>
+        </p:nvSpPr>
+        <p:spPr>
+          <a:xfrm>
+            <a:off x="4716514" y="108892"/>
+            <a:ext cx="1898533" cy="461665"/>
+          </a:xfrm>
+          <a:prstGeom prst="rect">
+            <a:avLst/>
+          </a:prstGeom>
+          <a:noFill/>
+        </p:spPr>
+        <p:txBody>
+          <a:bodyPr wrap="none" rtlCol="0">
+            <a:spAutoFit/>
+          </a:bodyPr>
+          <a:lstStyle/>
+          <a:p>
+            <a:r>
+              <a:rPr lang="en-GB" sz="2400" dirty="0" smtClean="0"/>
+              <a:t>Bone Marrow</a:t>
+            </a:r>
+            <a:endParaRPr lang="en-GB" sz="2400" dirty="0"/>
           </a:p>
         </p:txBody>
       </p:sp>
     </p:spTree>
     <p:extLst>
       <p:ext uri="{BB962C8B-B14F-4D97-AF65-F5344CB8AC3E}">
-        <p14:creationId xmlns:p14="http://schemas.microsoft.com/office/powerpoint/2010/main" val="1515138203"/>
+        <p14:creationId xmlns:p14="http://schemas.microsoft.com/office/powerpoint/2010/main" val="4144646374"/>
       </p:ext>
     </p:extLst>
   </p:cSld>
   <p:clrMapOvr>
     <a:masterClrMapping/>
   </p:clrMapOvr>
-  <p:timing>
-    <p:tnLst>
-      <p:par>
-        <p:cTn id="1" dur="indefinite" restart="never" nodeType="tmRoot"/>
-      </p:par>
-    </p:tnLst>
-  </p:timing>
 </p:sld>
 </file>
 
@@ -6246,32 +6399,147 @@
           </p:cNvPicPr>
           <p:nvPr/>
         </p:nvPicPr>
-        <p:blipFill>
-          <a:blip r:embed="rId2">
+        <p:blipFill rotWithShape="1">
+          <a:blip r:embed="rId3">
             <a:extLst>
               <a:ext uri="{28A0092B-C50C-407E-A947-70E740481C1C}">
                 <a14:useLocalDpi xmlns:a14="http://schemas.microsoft.com/office/drawing/2010/main" val="0"/>
               </a:ext>
             </a:extLst>
           </a:blip>
-          <a:stretch>
-            <a:fillRect/>
-          </a:stretch>
+          <a:srcRect l="25181" r="7668"/>
+          <a:stretch/>
         </p:blipFill>
         <p:spPr>
           <a:xfrm>
-            <a:off x="899120" y="0"/>
-            <a:ext cx="5399485" cy="4319588"/>
+            <a:off x="0" y="-794"/>
+            <a:ext cx="3625795" cy="4319588"/>
           </a:xfrm>
           <a:prstGeom prst="rect">
             <a:avLst/>
           </a:prstGeom>
         </p:spPr>
       </p:pic>
+      <p:pic>
+        <p:nvPicPr>
+          <p:cNvPr id="3" name="Picture 2"/>
+          <p:cNvPicPr>
+            <a:picLocks noChangeAspect="1"/>
+          </p:cNvPicPr>
+          <p:nvPr/>
+        </p:nvPicPr>
+        <p:blipFill rotWithShape="1">
+          <a:blip r:embed="rId3">
+            <a:extLst>
+              <a:ext uri="{28A0092B-C50C-407E-A947-70E740481C1C}">
+                <a14:useLocalDpi xmlns:a14="http://schemas.microsoft.com/office/drawing/2010/main" val="0"/>
+              </a:ext>
+            </a:extLst>
+          </a:blip>
+          <a:srcRect l="38729" t="35811" r="38620" b="38167"/>
+          <a:stretch/>
+        </p:blipFill>
+        <p:spPr>
+          <a:xfrm>
+            <a:off x="3815951" y="751951"/>
+            <a:ext cx="3061928" cy="2814097"/>
+          </a:xfrm>
+          <a:prstGeom prst="rect">
+            <a:avLst/>
+          </a:prstGeom>
+          <a:ln w="28575">
+            <a:solidFill>
+              <a:srgbClr val="FF0000"/>
+            </a:solidFill>
+          </a:ln>
+        </p:spPr>
+      </p:pic>
+      <p:cxnSp>
+        <p:nvCxnSpPr>
+          <p:cNvPr id="5" name="Straight Arrow Connector 4"/>
+          <p:cNvCxnSpPr/>
+          <p:nvPr/>
+        </p:nvCxnSpPr>
+        <p:spPr>
+          <a:xfrm>
+            <a:off x="1327868" y="2226365"/>
+            <a:ext cx="3434963" cy="238539"/>
+          </a:xfrm>
+          <a:prstGeom prst="straightConnector1">
+            <a:avLst/>
+          </a:prstGeom>
+          <a:ln w="28575">
+            <a:solidFill>
+              <a:srgbClr val="FF0000"/>
+            </a:solidFill>
+            <a:tailEnd type="triangle"/>
+          </a:ln>
+        </p:spPr>
+        <p:style>
+          <a:lnRef idx="1">
+            <a:schemeClr val="accent1"/>
+          </a:lnRef>
+          <a:fillRef idx="0">
+            <a:schemeClr val="accent1"/>
+          </a:fillRef>
+          <a:effectRef idx="0">
+            <a:schemeClr val="accent1"/>
+          </a:effectRef>
+          <a:fontRef idx="minor">
+            <a:schemeClr val="tx1"/>
+          </a:fontRef>
+        </p:style>
+      </p:cxnSp>
+      <p:sp>
+        <p:nvSpPr>
+          <p:cNvPr id="9" name="Rectangle 8"/>
+          <p:cNvSpPr/>
+          <p:nvPr/>
+        </p:nvSpPr>
+        <p:spPr>
+          <a:xfrm>
+            <a:off x="739472" y="1773141"/>
+            <a:ext cx="1168842" cy="898497"/>
+          </a:xfrm>
+          <a:prstGeom prst="rect">
+            <a:avLst/>
+          </a:prstGeom>
+          <a:noFill/>
+          <a:ln>
+            <a:solidFill>
+              <a:srgbClr val="FF0000"/>
+            </a:solidFill>
+          </a:ln>
+        </p:spPr>
+        <p:style>
+          <a:lnRef idx="2">
+            <a:schemeClr val="accent1">
+              <a:shade val="50000"/>
+            </a:schemeClr>
+          </a:lnRef>
+          <a:fillRef idx="1">
+            <a:schemeClr val="accent1"/>
+          </a:fillRef>
+          <a:effectRef idx="0">
+            <a:schemeClr val="accent1"/>
+          </a:effectRef>
+          <a:fontRef idx="minor">
+            <a:schemeClr val="lt1"/>
+          </a:fontRef>
+        </p:style>
+        <p:txBody>
+          <a:bodyPr rtlCol="0" anchor="ctr"/>
+          <a:lstStyle/>
+          <a:p>
+            <a:pPr algn="ctr"/>
+            <a:endParaRPr lang="en-GB"/>
+          </a:p>
+        </p:txBody>
+      </p:sp>
     </p:spTree>
     <p:extLst>
       <p:ext uri="{BB962C8B-B14F-4D97-AF65-F5344CB8AC3E}">
-        <p14:creationId xmlns:p14="http://schemas.microsoft.com/office/powerpoint/2010/main" val="2758503847"/>
+        <p14:creationId xmlns:p14="http://schemas.microsoft.com/office/powerpoint/2010/main" val="1515138203"/>
       </p:ext>
     </p:extLst>
   </p:cSld>
@@ -6307,378 +6575,51 @@
       </p:grpSpPr>
       <p:pic>
         <p:nvPicPr>
-          <p:cNvPr id="3" name="Picture 2"/>
+          <p:cNvPr id="2" name="Picture 1"/>
           <p:cNvPicPr>
             <a:picLocks noChangeAspect="1"/>
           </p:cNvPicPr>
           <p:nvPr/>
         </p:nvPicPr>
         <p:blipFill>
-          <a:blip r:embed="rId3"/>
+          <a:blip r:embed="rId2">
+            <a:extLst>
+              <a:ext uri="{28A0092B-C50C-407E-A947-70E740481C1C}">
+                <a14:useLocalDpi xmlns:a14="http://schemas.microsoft.com/office/drawing/2010/main" val="0"/>
+              </a:ext>
+            </a:extLst>
+          </a:blip>
           <a:stretch>
             <a:fillRect/>
           </a:stretch>
         </p:blipFill>
         <p:spPr>
           <a:xfrm>
-            <a:off x="93663" y="339725"/>
-            <a:ext cx="3505200" cy="3638550"/>
+            <a:off x="899120" y="0"/>
+            <a:ext cx="5399485" cy="4319588"/>
           </a:xfrm>
           <a:prstGeom prst="rect">
             <a:avLst/>
           </a:prstGeom>
         </p:spPr>
       </p:pic>
-      <p:pic>
-        <p:nvPicPr>
-          <p:cNvPr id="4" name="Picture 3"/>
-          <p:cNvPicPr>
-            <a:picLocks noChangeAspect="1"/>
-          </p:cNvPicPr>
-          <p:nvPr/>
-        </p:nvPicPr>
-        <p:blipFill>
-          <a:blip r:embed="rId4"/>
-          <a:stretch>
-            <a:fillRect/>
-          </a:stretch>
-        </p:blipFill>
-        <p:spPr>
-          <a:xfrm>
-            <a:off x="3606814" y="339725"/>
-            <a:ext cx="3505200" cy="3638550"/>
-          </a:xfrm>
-          <a:prstGeom prst="rect">
-            <a:avLst/>
-          </a:prstGeom>
-        </p:spPr>
-      </p:pic>
-      <p:sp>
-        <p:nvSpPr>
-          <p:cNvPr id="5" name="TextBox 4"/>
-          <p:cNvSpPr txBox="1"/>
-          <p:nvPr/>
-        </p:nvSpPr>
-        <p:spPr>
-          <a:xfrm rot="16200000">
-            <a:off x="-727963" y="1897175"/>
-            <a:ext cx="2176216" cy="461665"/>
-          </a:xfrm>
-          <a:prstGeom prst="rect">
-            <a:avLst/>
-          </a:prstGeom>
-          <a:solidFill>
-            <a:schemeClr val="bg1"/>
-          </a:solidFill>
-        </p:spPr>
-        <p:txBody>
-          <a:bodyPr wrap="square" rtlCol="0">
-            <a:spAutoFit/>
-          </a:bodyPr>
-          <a:lstStyle/>
-          <a:p>
-            <a:r>
-              <a:rPr lang="en-GB" sz="2400" dirty="0" smtClean="0"/>
-              <a:t>Side Scatter</a:t>
-            </a:r>
-            <a:endParaRPr lang="en-GB" sz="2400" dirty="0"/>
-          </a:p>
-        </p:txBody>
-      </p:sp>
-      <p:sp>
-        <p:nvSpPr>
-          <p:cNvPr id="6" name="TextBox 5"/>
-          <p:cNvSpPr txBox="1"/>
-          <p:nvPr/>
-        </p:nvSpPr>
-        <p:spPr>
-          <a:xfrm>
-            <a:off x="907169" y="3468937"/>
-            <a:ext cx="2402382" cy="461665"/>
-          </a:xfrm>
-          <a:prstGeom prst="rect">
-            <a:avLst/>
-          </a:prstGeom>
-          <a:solidFill>
-            <a:schemeClr val="bg1"/>
-          </a:solidFill>
-        </p:spPr>
-        <p:txBody>
-          <a:bodyPr wrap="square" rtlCol="0">
-            <a:spAutoFit/>
-          </a:bodyPr>
-          <a:lstStyle/>
-          <a:p>
-            <a:r>
-              <a:rPr lang="en-GB" sz="2400" dirty="0" smtClean="0"/>
-              <a:t>CD43</a:t>
-            </a:r>
-            <a:endParaRPr lang="en-GB" sz="2400" dirty="0"/>
-          </a:p>
-        </p:txBody>
-      </p:sp>
-      <p:sp>
-        <p:nvSpPr>
-          <p:cNvPr id="7" name="TextBox 6"/>
-          <p:cNvSpPr txBox="1"/>
-          <p:nvPr/>
-        </p:nvSpPr>
-        <p:spPr>
-          <a:xfrm rot="16200000">
-            <a:off x="2794469" y="1897175"/>
-            <a:ext cx="2176216" cy="461665"/>
-          </a:xfrm>
-          <a:prstGeom prst="rect">
-            <a:avLst/>
-          </a:prstGeom>
-          <a:solidFill>
-            <a:schemeClr val="bg1"/>
-          </a:solidFill>
-        </p:spPr>
-        <p:txBody>
-          <a:bodyPr wrap="square" rtlCol="0">
-            <a:spAutoFit/>
-          </a:bodyPr>
-          <a:lstStyle/>
-          <a:p>
-            <a:r>
-              <a:rPr lang="en-GB" sz="2400" dirty="0" smtClean="0"/>
-              <a:t>Side Scatter</a:t>
-            </a:r>
-            <a:endParaRPr lang="en-GB" sz="2400" dirty="0"/>
-          </a:p>
-        </p:txBody>
-      </p:sp>
-      <p:sp>
-        <p:nvSpPr>
-          <p:cNvPr id="8" name="TextBox 7"/>
-          <p:cNvSpPr txBox="1"/>
-          <p:nvPr/>
-        </p:nvSpPr>
-        <p:spPr>
-          <a:xfrm>
-            <a:off x="4429601" y="3468937"/>
-            <a:ext cx="2402382" cy="461665"/>
-          </a:xfrm>
-          <a:prstGeom prst="rect">
-            <a:avLst/>
-          </a:prstGeom>
-          <a:solidFill>
-            <a:schemeClr val="bg1"/>
-          </a:solidFill>
-        </p:spPr>
-        <p:txBody>
-          <a:bodyPr wrap="square" rtlCol="0">
-            <a:spAutoFit/>
-          </a:bodyPr>
-          <a:lstStyle/>
-          <a:p>
-            <a:r>
-              <a:rPr lang="en-GB" sz="2400" dirty="0" smtClean="0"/>
-              <a:t>CD43</a:t>
-            </a:r>
-            <a:endParaRPr lang="en-GB" sz="2400" dirty="0"/>
-          </a:p>
-        </p:txBody>
-      </p:sp>
-      <p:sp>
-        <p:nvSpPr>
-          <p:cNvPr id="9" name="TextBox 8"/>
-          <p:cNvSpPr txBox="1"/>
-          <p:nvPr/>
-        </p:nvSpPr>
-        <p:spPr>
-          <a:xfrm>
-            <a:off x="1592828" y="108891"/>
-            <a:ext cx="506870" cy="461665"/>
-          </a:xfrm>
-          <a:prstGeom prst="rect">
-            <a:avLst/>
-          </a:prstGeom>
-          <a:noFill/>
-        </p:spPr>
-        <p:txBody>
-          <a:bodyPr wrap="none" rtlCol="0">
-            <a:spAutoFit/>
-          </a:bodyPr>
-          <a:lstStyle/>
-          <a:p>
-            <a:r>
-              <a:rPr lang="en-GB" sz="2400" dirty="0" smtClean="0"/>
-              <a:t>B6</a:t>
-            </a:r>
-            <a:endParaRPr lang="en-GB" sz="2400" dirty="0"/>
-          </a:p>
-        </p:txBody>
-      </p:sp>
-      <p:sp>
-        <p:nvSpPr>
-          <p:cNvPr id="10" name="TextBox 9"/>
-          <p:cNvSpPr txBox="1"/>
-          <p:nvPr/>
-        </p:nvSpPr>
-        <p:spPr>
-          <a:xfrm>
-            <a:off x="4971326" y="108890"/>
-            <a:ext cx="776175" cy="461665"/>
-          </a:xfrm>
-          <a:prstGeom prst="rect">
-            <a:avLst/>
-          </a:prstGeom>
-          <a:noFill/>
-        </p:spPr>
-        <p:txBody>
-          <a:bodyPr wrap="none" rtlCol="0">
-            <a:spAutoFit/>
-          </a:bodyPr>
-          <a:lstStyle/>
-          <a:p>
-            <a:r>
-              <a:rPr lang="en-GB" sz="2400" dirty="0" smtClean="0"/>
-              <a:t>NOD</a:t>
-            </a:r>
-            <a:endParaRPr lang="en-GB" sz="2400" dirty="0"/>
-          </a:p>
-        </p:txBody>
-      </p:sp>
-      <p:sp>
-        <p:nvSpPr>
-          <p:cNvPr id="11" name="TextBox 10"/>
-          <p:cNvSpPr txBox="1"/>
-          <p:nvPr/>
-        </p:nvSpPr>
-        <p:spPr>
-          <a:xfrm>
-            <a:off x="1820852" y="1121528"/>
-            <a:ext cx="679481" cy="369332"/>
-          </a:xfrm>
-          <a:prstGeom prst="rect">
-            <a:avLst/>
-          </a:prstGeom>
-          <a:solidFill>
-            <a:schemeClr val="bg1"/>
-          </a:solidFill>
-        </p:spPr>
-        <p:txBody>
-          <a:bodyPr wrap="none" rtlCol="0">
-            <a:spAutoFit/>
-          </a:bodyPr>
-          <a:lstStyle/>
-          <a:p>
-            <a:r>
-              <a:rPr lang="en-GB" sz="1800" dirty="0" smtClean="0"/>
-              <a:t>Pro B</a:t>
-            </a:r>
-            <a:endParaRPr lang="en-GB" sz="1800" dirty="0"/>
-          </a:p>
-        </p:txBody>
-      </p:sp>
-      <p:sp>
-        <p:nvSpPr>
-          <p:cNvPr id="12" name="TextBox 11"/>
-          <p:cNvSpPr txBox="1"/>
-          <p:nvPr/>
-        </p:nvSpPr>
-        <p:spPr>
-          <a:xfrm>
-            <a:off x="5306953" y="1121528"/>
-            <a:ext cx="679481" cy="369332"/>
-          </a:xfrm>
-          <a:prstGeom prst="rect">
-            <a:avLst/>
-          </a:prstGeom>
-          <a:solidFill>
-            <a:schemeClr val="bg1"/>
-          </a:solidFill>
-        </p:spPr>
-        <p:txBody>
-          <a:bodyPr wrap="none" rtlCol="0">
-            <a:spAutoFit/>
-          </a:bodyPr>
-          <a:lstStyle/>
-          <a:p>
-            <a:r>
-              <a:rPr lang="en-GB" sz="1800" dirty="0" smtClean="0"/>
-              <a:t>Pro B</a:t>
-            </a:r>
-            <a:endParaRPr lang="en-GB" sz="1800" dirty="0"/>
-          </a:p>
-        </p:txBody>
-      </p:sp>
-      <p:sp>
-        <p:nvSpPr>
-          <p:cNvPr id="13" name="TextBox 12"/>
-          <p:cNvSpPr txBox="1"/>
-          <p:nvPr/>
-        </p:nvSpPr>
-        <p:spPr>
-          <a:xfrm>
-            <a:off x="1159385" y="1121528"/>
-            <a:ext cx="673774" cy="369332"/>
-          </a:xfrm>
-          <a:prstGeom prst="rect">
-            <a:avLst/>
-          </a:prstGeom>
-          <a:solidFill>
-            <a:schemeClr val="bg1"/>
-          </a:solidFill>
-        </p:spPr>
-        <p:txBody>
-          <a:bodyPr wrap="none" rtlCol="0">
-            <a:spAutoFit/>
-          </a:bodyPr>
-          <a:lstStyle/>
-          <a:p>
-            <a:r>
-              <a:rPr lang="en-GB" sz="1800" dirty="0" smtClean="0"/>
-              <a:t>Pre B</a:t>
-            </a:r>
-            <a:endParaRPr lang="en-GB" sz="1800" dirty="0"/>
-          </a:p>
-        </p:txBody>
-      </p:sp>
-      <p:sp>
-        <p:nvSpPr>
-          <p:cNvPr id="14" name="TextBox 13"/>
-          <p:cNvSpPr txBox="1"/>
-          <p:nvPr/>
-        </p:nvSpPr>
-        <p:spPr>
-          <a:xfrm>
-            <a:off x="4655924" y="1121528"/>
-            <a:ext cx="673774" cy="369332"/>
-          </a:xfrm>
-          <a:prstGeom prst="rect">
-            <a:avLst/>
-          </a:prstGeom>
-          <a:solidFill>
-            <a:schemeClr val="bg1"/>
-          </a:solidFill>
-        </p:spPr>
-        <p:txBody>
-          <a:bodyPr wrap="none" rtlCol="0">
-            <a:spAutoFit/>
-          </a:bodyPr>
-          <a:lstStyle/>
-          <a:p>
-            <a:r>
-              <a:rPr lang="en-GB" sz="1800" dirty="0" smtClean="0"/>
-              <a:t>Pre B</a:t>
-            </a:r>
-            <a:endParaRPr lang="en-GB" sz="1800" dirty="0"/>
-          </a:p>
-        </p:txBody>
-      </p:sp>
     </p:spTree>
     <p:extLst>
       <p:ext uri="{BB962C8B-B14F-4D97-AF65-F5344CB8AC3E}">
-        <p14:creationId xmlns:p14="http://schemas.microsoft.com/office/powerpoint/2010/main" val="3845103055"/>
+        <p14:creationId xmlns:p14="http://schemas.microsoft.com/office/powerpoint/2010/main" val="2758503847"/>
       </p:ext>
     </p:extLst>
   </p:cSld>
   <p:clrMapOvr>
     <a:masterClrMapping/>
   </p:clrMapOvr>
+  <p:timing>
+    <p:tnLst>
+      <p:par>
+        <p:cTn id="1" dur="indefinite" restart="never" nodeType="tmRoot"/>
+      </p:par>
+    </p:tnLst>
+  </p:timing>
 </p:sld>
 </file>
 
@@ -6701,7 +6642,7 @@
       </p:grpSpPr>
       <p:pic>
         <p:nvPicPr>
-          <p:cNvPr id="15" name="Picture 14"/>
+          <p:cNvPr id="3" name="Picture 2"/>
           <p:cNvPicPr>
             <a:picLocks noChangeAspect="1"/>
           </p:cNvPicPr>
@@ -6715,7 +6656,7 @@
         </p:blipFill>
         <p:spPr>
           <a:xfrm>
-            <a:off x="96137" y="339725"/>
+            <a:off x="93663" y="339725"/>
             <a:ext cx="3505200" cy="3638550"/>
           </a:xfrm>
           <a:prstGeom prst="rect">
@@ -6725,7 +6666,7 @@
       </p:pic>
       <p:pic>
         <p:nvPicPr>
-          <p:cNvPr id="10" name="Picture 9"/>
+          <p:cNvPr id="4" name="Picture 3"/>
           <p:cNvPicPr>
             <a:picLocks noChangeAspect="1"/>
           </p:cNvPicPr>
@@ -6739,7 +6680,7 @@
         </p:blipFill>
         <p:spPr>
           <a:xfrm>
-            <a:off x="3610010" y="339725"/>
+            <a:off x="3606814" y="339725"/>
             <a:ext cx="3505200" cy="3638550"/>
           </a:xfrm>
           <a:prstGeom prst="rect">
@@ -6749,7 +6690,7 @@
       </p:pic>
       <p:sp>
         <p:nvSpPr>
-          <p:cNvPr id="2" name="TextBox 1"/>
+          <p:cNvPr id="5" name="TextBox 4"/>
           <p:cNvSpPr txBox="1"/>
           <p:nvPr/>
         </p:nvSpPr>
@@ -6781,7 +6722,7 @@
       </p:sp>
       <p:sp>
         <p:nvSpPr>
-          <p:cNvPr id="3" name="TextBox 2"/>
+          <p:cNvPr id="6" name="TextBox 5"/>
           <p:cNvSpPr txBox="1"/>
           <p:nvPr/>
         </p:nvSpPr>
@@ -6813,7 +6754,7 @@
       </p:sp>
       <p:sp>
         <p:nvSpPr>
-          <p:cNvPr id="4" name="TextBox 3"/>
+          <p:cNvPr id="7" name="TextBox 6"/>
           <p:cNvSpPr txBox="1"/>
           <p:nvPr/>
         </p:nvSpPr>
@@ -6845,7 +6786,7 @@
       </p:sp>
       <p:sp>
         <p:nvSpPr>
-          <p:cNvPr id="5" name="TextBox 4"/>
+          <p:cNvPr id="8" name="TextBox 7"/>
           <p:cNvSpPr txBox="1"/>
           <p:nvPr/>
         </p:nvSpPr>
@@ -6877,7 +6818,7 @@
       </p:sp>
       <p:sp>
         <p:nvSpPr>
-          <p:cNvPr id="6" name="TextBox 5"/>
+          <p:cNvPr id="9" name="TextBox 8"/>
           <p:cNvSpPr txBox="1"/>
           <p:nvPr/>
         </p:nvSpPr>
@@ -6907,7 +6848,7 @@
       </p:sp>
       <p:sp>
         <p:nvSpPr>
-          <p:cNvPr id="7" name="TextBox 6"/>
+          <p:cNvPr id="10" name="TextBox 9"/>
           <p:cNvSpPr txBox="1"/>
           <p:nvPr/>
         </p:nvSpPr>
@@ -6943,7 +6884,7 @@
         </p:nvSpPr>
         <p:spPr>
           <a:xfrm>
-            <a:off x="1836754" y="1606558"/>
+            <a:off x="1820852" y="1121528"/>
             <a:ext cx="679481" cy="369332"/>
           </a:xfrm>
           <a:prstGeom prst="rect">
@@ -6975,7 +6916,7 @@
         </p:nvSpPr>
         <p:spPr>
           <a:xfrm>
-            <a:off x="5322855" y="1606558"/>
+            <a:off x="5306953" y="1121528"/>
             <a:ext cx="679481" cy="369332"/>
           </a:xfrm>
           <a:prstGeom prst="rect">
@@ -7007,7 +6948,7 @@
         </p:nvSpPr>
         <p:spPr>
           <a:xfrm>
-            <a:off x="1175287" y="1606558"/>
+            <a:off x="1159385" y="1121528"/>
             <a:ext cx="673774" cy="369332"/>
           </a:xfrm>
           <a:prstGeom prst="rect">
@@ -7039,7 +6980,7 @@
         </p:nvSpPr>
         <p:spPr>
           <a:xfrm>
-            <a:off x="4671826" y="1606558"/>
+            <a:off x="4655924" y="1121528"/>
             <a:ext cx="673774" cy="369332"/>
           </a:xfrm>
           <a:prstGeom prst="rect">
@@ -7066,7 +7007,7 @@
     </p:spTree>
     <p:extLst>
       <p:ext uri="{BB962C8B-B14F-4D97-AF65-F5344CB8AC3E}">
-        <p14:creationId xmlns:p14="http://schemas.microsoft.com/office/powerpoint/2010/main" val="3444880531"/>
+        <p14:creationId xmlns:p14="http://schemas.microsoft.com/office/powerpoint/2010/main" val="3845103055"/>
       </p:ext>
     </p:extLst>
   </p:cSld>
@@ -7095,31 +7036,7 @@
       </p:grpSpPr>
       <p:pic>
         <p:nvPicPr>
-          <p:cNvPr id="9" name="Picture 8"/>
-          <p:cNvPicPr>
-            <a:picLocks noChangeAspect="1"/>
-          </p:cNvPicPr>
-          <p:nvPr/>
-        </p:nvPicPr>
-        <p:blipFill>
-          <a:blip r:embed="rId2"/>
-          <a:stretch>
-            <a:fillRect/>
-          </a:stretch>
-        </p:blipFill>
-        <p:spPr>
-          <a:xfrm>
-            <a:off x="3606814" y="339725"/>
-            <a:ext cx="3505200" cy="3638550"/>
-          </a:xfrm>
-          <a:prstGeom prst="rect">
-            <a:avLst/>
-          </a:prstGeom>
-        </p:spPr>
-      </p:pic>
-      <p:pic>
-        <p:nvPicPr>
-          <p:cNvPr id="8" name="Picture 7"/>
+          <p:cNvPr id="15" name="Picture 14"/>
           <p:cNvPicPr>
             <a:picLocks noChangeAspect="1"/>
           </p:cNvPicPr>
@@ -7133,7 +7050,31 @@
         </p:blipFill>
         <p:spPr>
           <a:xfrm>
-            <a:off x="93663" y="339725"/>
+            <a:off x="96137" y="339725"/>
+            <a:ext cx="3505200" cy="3638550"/>
+          </a:xfrm>
+          <a:prstGeom prst="rect">
+            <a:avLst/>
+          </a:prstGeom>
+        </p:spPr>
+      </p:pic>
+      <p:pic>
+        <p:nvPicPr>
+          <p:cNvPr id="10" name="Picture 9"/>
+          <p:cNvPicPr>
+            <a:picLocks noChangeAspect="1"/>
+          </p:cNvPicPr>
+          <p:nvPr/>
+        </p:nvPicPr>
+        <p:blipFill>
+          <a:blip r:embed="rId4"/>
+          <a:stretch>
+            <a:fillRect/>
+          </a:stretch>
+        </p:blipFill>
+        <p:spPr>
+          <a:xfrm>
+            <a:off x="3610010" y="339725"/>
             <a:ext cx="3505200" cy="3638550"/>
           </a:xfrm>
           <a:prstGeom prst="rect">
@@ -7167,7 +7108,7 @@
           <a:p>
             <a:r>
               <a:rPr lang="en-GB" sz="2400" dirty="0" smtClean="0"/>
-              <a:t>IgM</a:t>
+              <a:t>Side Scatter</a:t>
             </a:r>
             <a:endParaRPr lang="en-GB" sz="2400" dirty="0"/>
           </a:p>
@@ -7231,7 +7172,7 @@
           <a:p>
             <a:r>
               <a:rPr lang="en-GB" sz="2400" dirty="0" smtClean="0"/>
-              <a:t>IgM</a:t>
+              <a:t>Side Scatter</a:t>
             </a:r>
             <a:endParaRPr lang="en-GB" sz="2400" dirty="0"/>
           </a:p>
@@ -7277,7 +7218,37 @@
         </p:nvSpPr>
         <p:spPr>
           <a:xfrm>
-            <a:off x="1458175" y="108890"/>
+            <a:off x="1592828" y="108891"/>
+            <a:ext cx="506870" cy="461665"/>
+          </a:xfrm>
+          <a:prstGeom prst="rect">
+            <a:avLst/>
+          </a:prstGeom>
+          <a:noFill/>
+        </p:spPr>
+        <p:txBody>
+          <a:bodyPr wrap="none" rtlCol="0">
+            <a:spAutoFit/>
+          </a:bodyPr>
+          <a:lstStyle/>
+          <a:p>
+            <a:r>
+              <a:rPr lang="en-GB" sz="2400" dirty="0" smtClean="0"/>
+              <a:t>B6</a:t>
+            </a:r>
+            <a:endParaRPr lang="en-GB" sz="2400" dirty="0"/>
+          </a:p>
+        </p:txBody>
+      </p:sp>
+      <p:sp>
+        <p:nvSpPr>
+          <p:cNvPr id="7" name="TextBox 6"/>
+          <p:cNvSpPr txBox="1"/>
+          <p:nvPr/>
+        </p:nvSpPr>
+        <p:spPr>
+          <a:xfrm>
+            <a:off x="4971326" y="108890"/>
             <a:ext cx="776175" cy="461665"/>
           </a:xfrm>
           <a:prstGeom prst="rect">
@@ -7301,19 +7272,21 @@
       </p:sp>
       <p:sp>
         <p:nvSpPr>
-          <p:cNvPr id="7" name="TextBox 6"/>
-          <p:cNvSpPr txBox="1"/>
-          <p:nvPr/>
-        </p:nvSpPr>
-        <p:spPr>
-          <a:xfrm>
-            <a:off x="4762199" y="108889"/>
-            <a:ext cx="1194430" cy="461665"/>
-          </a:xfrm>
-          <a:prstGeom prst="rect">
-            <a:avLst/>
-          </a:prstGeom>
-          <a:noFill/>
+          <p:cNvPr id="11" name="TextBox 10"/>
+          <p:cNvSpPr txBox="1"/>
+          <p:nvPr/>
+        </p:nvSpPr>
+        <p:spPr>
+          <a:xfrm>
+            <a:off x="1836754" y="1606558"/>
+            <a:ext cx="679481" cy="369332"/>
+          </a:xfrm>
+          <a:prstGeom prst="rect">
+            <a:avLst/>
+          </a:prstGeom>
+          <a:solidFill>
+            <a:schemeClr val="bg1"/>
+          </a:solidFill>
         </p:spPr>
         <p:txBody>
           <a:bodyPr wrap="none" rtlCol="0">
@@ -7322,17 +7295,113 @@
           <a:lstStyle/>
           <a:p>
             <a:r>
-              <a:rPr lang="en-GB" sz="2400" dirty="0" smtClean="0"/>
-              <a:t>NOD KO</a:t>
-            </a:r>
-            <a:endParaRPr lang="en-GB" sz="2400" dirty="0"/>
+              <a:rPr lang="en-GB" sz="1800" dirty="0" smtClean="0"/>
+              <a:t>Pro B</a:t>
+            </a:r>
+            <a:endParaRPr lang="en-GB" sz="1800" dirty="0"/>
+          </a:p>
+        </p:txBody>
+      </p:sp>
+      <p:sp>
+        <p:nvSpPr>
+          <p:cNvPr id="12" name="TextBox 11"/>
+          <p:cNvSpPr txBox="1"/>
+          <p:nvPr/>
+        </p:nvSpPr>
+        <p:spPr>
+          <a:xfrm>
+            <a:off x="5322855" y="1606558"/>
+            <a:ext cx="679481" cy="369332"/>
+          </a:xfrm>
+          <a:prstGeom prst="rect">
+            <a:avLst/>
+          </a:prstGeom>
+          <a:solidFill>
+            <a:schemeClr val="bg1"/>
+          </a:solidFill>
+        </p:spPr>
+        <p:txBody>
+          <a:bodyPr wrap="none" rtlCol="0">
+            <a:spAutoFit/>
+          </a:bodyPr>
+          <a:lstStyle/>
+          <a:p>
+            <a:r>
+              <a:rPr lang="en-GB" sz="1800" dirty="0" smtClean="0"/>
+              <a:t>Pro B</a:t>
+            </a:r>
+            <a:endParaRPr lang="en-GB" sz="1800" dirty="0"/>
+          </a:p>
+        </p:txBody>
+      </p:sp>
+      <p:sp>
+        <p:nvSpPr>
+          <p:cNvPr id="13" name="TextBox 12"/>
+          <p:cNvSpPr txBox="1"/>
+          <p:nvPr/>
+        </p:nvSpPr>
+        <p:spPr>
+          <a:xfrm>
+            <a:off x="1175287" y="1606558"/>
+            <a:ext cx="673774" cy="369332"/>
+          </a:xfrm>
+          <a:prstGeom prst="rect">
+            <a:avLst/>
+          </a:prstGeom>
+          <a:solidFill>
+            <a:schemeClr val="bg1"/>
+          </a:solidFill>
+        </p:spPr>
+        <p:txBody>
+          <a:bodyPr wrap="none" rtlCol="0">
+            <a:spAutoFit/>
+          </a:bodyPr>
+          <a:lstStyle/>
+          <a:p>
+            <a:r>
+              <a:rPr lang="en-GB" sz="1800" dirty="0" smtClean="0"/>
+              <a:t>Pre B</a:t>
+            </a:r>
+            <a:endParaRPr lang="en-GB" sz="1800" dirty="0"/>
+          </a:p>
+        </p:txBody>
+      </p:sp>
+      <p:sp>
+        <p:nvSpPr>
+          <p:cNvPr id="14" name="TextBox 13"/>
+          <p:cNvSpPr txBox="1"/>
+          <p:nvPr/>
+        </p:nvSpPr>
+        <p:spPr>
+          <a:xfrm>
+            <a:off x="4671826" y="1606558"/>
+            <a:ext cx="673774" cy="369332"/>
+          </a:xfrm>
+          <a:prstGeom prst="rect">
+            <a:avLst/>
+          </a:prstGeom>
+          <a:solidFill>
+            <a:schemeClr val="bg1"/>
+          </a:solidFill>
+        </p:spPr>
+        <p:txBody>
+          <a:bodyPr wrap="none" rtlCol="0">
+            <a:spAutoFit/>
+          </a:bodyPr>
+          <a:lstStyle/>
+          <a:p>
+            <a:r>
+              <a:rPr lang="en-GB" sz="1800" dirty="0" smtClean="0"/>
+              <a:t>Pre B</a:t>
+            </a:r>
+            <a:endParaRPr lang="en-GB" sz="1800" dirty="0"/>
           </a:p>
         </p:txBody>
       </p:sp>
     </p:spTree>
     <p:extLst>
       <p:ext uri="{BB962C8B-B14F-4D97-AF65-F5344CB8AC3E}">
-        <p14:creationId xmlns:p14="http://schemas.microsoft.com/office/powerpoint/2010/main" val="711378402"/>
+        <p14:creationId xmlns:p14="http://schemas.microsoft.com/office/powerpoint/2010/main" val="3444880531"/>
       </p:ext>
     </p:extLst>
   </p:cSld>
@@ -7361,6 +7430,30 @@
       </p:grpSpPr>
       <p:pic>
         <p:nvPicPr>
+          <p:cNvPr id="9" name="Picture 8"/>
+          <p:cNvPicPr>
+            <a:picLocks noChangeAspect="1"/>
+          </p:cNvPicPr>
+          <p:nvPr/>
+        </p:nvPicPr>
+        <p:blipFill>
+          <a:blip r:embed="rId2"/>
+          <a:stretch>
+            <a:fillRect/>
+          </a:stretch>
+        </p:blipFill>
+        <p:spPr>
+          <a:xfrm>
+            <a:off x="3606814" y="339725"/>
+            <a:ext cx="3505200" cy="3638550"/>
+          </a:xfrm>
+          <a:prstGeom prst="rect">
+            <a:avLst/>
+          </a:prstGeom>
+        </p:spPr>
+      </p:pic>
+      <p:pic>
+        <p:nvPicPr>
           <p:cNvPr id="8" name="Picture 7"/>
           <p:cNvPicPr>
             <a:picLocks noChangeAspect="1"/>
@@ -7383,34 +7476,198 @@
           </a:prstGeom>
         </p:spPr>
       </p:pic>
-      <p:pic>
-        <p:nvPicPr>
-          <p:cNvPr id="9" name="Picture 8"/>
-          <p:cNvPicPr>
-            <a:picLocks noChangeAspect="1"/>
-          </p:cNvPicPr>
-          <p:nvPr/>
-        </p:nvPicPr>
-        <p:blipFill>
-          <a:blip r:embed="rId4"/>
-          <a:stretch>
-            <a:fillRect/>
-          </a:stretch>
-        </p:blipFill>
-        <p:spPr>
-          <a:xfrm>
-            <a:off x="3598863" y="339725"/>
-            <a:ext cx="3505200" cy="3638550"/>
-          </a:xfrm>
-          <a:prstGeom prst="rect">
-            <a:avLst/>
-          </a:prstGeom>
-        </p:spPr>
-      </p:pic>
+      <p:sp>
+        <p:nvSpPr>
+          <p:cNvPr id="2" name="TextBox 1"/>
+          <p:cNvSpPr txBox="1"/>
+          <p:nvPr/>
+        </p:nvSpPr>
+        <p:spPr>
+          <a:xfrm rot="16200000">
+            <a:off x="-727963" y="1897175"/>
+            <a:ext cx="2176216" cy="461665"/>
+          </a:xfrm>
+          <a:prstGeom prst="rect">
+            <a:avLst/>
+          </a:prstGeom>
+          <a:solidFill>
+            <a:schemeClr val="bg1"/>
+          </a:solidFill>
+        </p:spPr>
+        <p:txBody>
+          <a:bodyPr wrap="square" rtlCol="0">
+            <a:spAutoFit/>
+          </a:bodyPr>
+          <a:lstStyle/>
+          <a:p>
+            <a:r>
+              <a:rPr lang="en-GB" sz="2400" dirty="0" smtClean="0"/>
+              <a:t>IgM</a:t>
+            </a:r>
+            <a:endParaRPr lang="en-GB" sz="2400" dirty="0"/>
+          </a:p>
+        </p:txBody>
+      </p:sp>
+      <p:sp>
+        <p:nvSpPr>
+          <p:cNvPr id="3" name="TextBox 2"/>
+          <p:cNvSpPr txBox="1"/>
+          <p:nvPr/>
+        </p:nvSpPr>
+        <p:spPr>
+          <a:xfrm>
+            <a:off x="907169" y="3468937"/>
+            <a:ext cx="2402382" cy="461665"/>
+          </a:xfrm>
+          <a:prstGeom prst="rect">
+            <a:avLst/>
+          </a:prstGeom>
+          <a:solidFill>
+            <a:schemeClr val="bg1"/>
+          </a:solidFill>
+        </p:spPr>
+        <p:txBody>
+          <a:bodyPr wrap="square" rtlCol="0">
+            <a:spAutoFit/>
+          </a:bodyPr>
+          <a:lstStyle/>
+          <a:p>
+            <a:r>
+              <a:rPr lang="en-GB" sz="2400" dirty="0" smtClean="0"/>
+              <a:t>CD43</a:t>
+            </a:r>
+            <a:endParaRPr lang="en-GB" sz="2400" dirty="0"/>
+          </a:p>
+        </p:txBody>
+      </p:sp>
+      <p:sp>
+        <p:nvSpPr>
+          <p:cNvPr id="4" name="TextBox 3"/>
+          <p:cNvSpPr txBox="1"/>
+          <p:nvPr/>
+        </p:nvSpPr>
+        <p:spPr>
+          <a:xfrm rot="16200000">
+            <a:off x="2794469" y="1897175"/>
+            <a:ext cx="2176216" cy="461665"/>
+          </a:xfrm>
+          <a:prstGeom prst="rect">
+            <a:avLst/>
+          </a:prstGeom>
+          <a:solidFill>
+            <a:schemeClr val="bg1"/>
+          </a:solidFill>
+        </p:spPr>
+        <p:txBody>
+          <a:bodyPr wrap="square" rtlCol="0">
+            <a:spAutoFit/>
+          </a:bodyPr>
+          <a:lstStyle/>
+          <a:p>
+            <a:r>
+              <a:rPr lang="en-GB" sz="2400" dirty="0" smtClean="0"/>
+              <a:t>IgM</a:t>
+            </a:r>
+            <a:endParaRPr lang="en-GB" sz="2400" dirty="0"/>
+          </a:p>
+        </p:txBody>
+      </p:sp>
+      <p:sp>
+        <p:nvSpPr>
+          <p:cNvPr id="5" name="TextBox 4"/>
+          <p:cNvSpPr txBox="1"/>
+          <p:nvPr/>
+        </p:nvSpPr>
+        <p:spPr>
+          <a:xfrm>
+            <a:off x="4429601" y="3468937"/>
+            <a:ext cx="2402382" cy="461665"/>
+          </a:xfrm>
+          <a:prstGeom prst="rect">
+            <a:avLst/>
+          </a:prstGeom>
+          <a:solidFill>
+            <a:schemeClr val="bg1"/>
+          </a:solidFill>
+        </p:spPr>
+        <p:txBody>
+          <a:bodyPr wrap="square" rtlCol="0">
+            <a:spAutoFit/>
+          </a:bodyPr>
+          <a:lstStyle/>
+          <a:p>
+            <a:r>
+              <a:rPr lang="en-GB" sz="2400" dirty="0" smtClean="0"/>
+              <a:t>CD43</a:t>
+            </a:r>
+            <a:endParaRPr lang="en-GB" sz="2400" dirty="0"/>
+          </a:p>
+        </p:txBody>
+      </p:sp>
+      <p:sp>
+        <p:nvSpPr>
+          <p:cNvPr id="6" name="TextBox 5"/>
+          <p:cNvSpPr txBox="1"/>
+          <p:nvPr/>
+        </p:nvSpPr>
+        <p:spPr>
+          <a:xfrm>
+            <a:off x="1458175" y="108890"/>
+            <a:ext cx="776175" cy="461665"/>
+          </a:xfrm>
+          <a:prstGeom prst="rect">
+            <a:avLst/>
+          </a:prstGeom>
+          <a:noFill/>
+        </p:spPr>
+        <p:txBody>
+          <a:bodyPr wrap="none" rtlCol="0">
+            <a:spAutoFit/>
+          </a:bodyPr>
+          <a:lstStyle/>
+          <a:p>
+            <a:r>
+              <a:rPr lang="en-GB" sz="2400" dirty="0" smtClean="0"/>
+              <a:t>NOD</a:t>
+            </a:r>
+            <a:endParaRPr lang="en-GB" sz="2400" dirty="0"/>
+          </a:p>
+        </p:txBody>
+      </p:sp>
+      <p:sp>
+        <p:nvSpPr>
+          <p:cNvPr id="7" name="TextBox 6"/>
+          <p:cNvSpPr txBox="1"/>
+          <p:nvPr/>
+        </p:nvSpPr>
+        <p:spPr>
+          <a:xfrm>
+            <a:off x="4762199" y="108889"/>
+            <a:ext cx="1194430" cy="461665"/>
+          </a:xfrm>
+          <a:prstGeom prst="rect">
+            <a:avLst/>
+          </a:prstGeom>
+          <a:noFill/>
+        </p:spPr>
+        <p:txBody>
+          <a:bodyPr wrap="none" rtlCol="0">
+            <a:spAutoFit/>
+          </a:bodyPr>
+          <a:lstStyle/>
+          <a:p>
+            <a:r>
+              <a:rPr lang="en-GB" sz="2400" dirty="0" smtClean="0"/>
+              <a:t>NOD KO</a:t>
+            </a:r>
+            <a:endParaRPr lang="en-GB" sz="2400" dirty="0"/>
+          </a:p>
+        </p:txBody>
+      </p:sp>
     </p:spTree>
     <p:extLst>
       <p:ext uri="{BB962C8B-B14F-4D97-AF65-F5344CB8AC3E}">
-        <p14:creationId xmlns:p14="http://schemas.microsoft.com/office/powerpoint/2010/main" val="2956810755"/>
+        <p14:creationId xmlns:p14="http://schemas.microsoft.com/office/powerpoint/2010/main" val="711378402"/>
       </p:ext>
     </p:extLst>
   </p:cSld>
@@ -7439,7 +7696,7 @@
       </p:grpSpPr>
       <p:pic>
         <p:nvPicPr>
-          <p:cNvPr id="2" name="Picture 1"/>
+          <p:cNvPr id="8" name="Picture 7"/>
           <p:cNvPicPr>
             <a:picLocks noChangeAspect="1"/>
           </p:cNvPicPr>
@@ -7453,7 +7710,7 @@
         </p:blipFill>
         <p:spPr>
           <a:xfrm>
-            <a:off x="3608137" y="339725"/>
+            <a:off x="93663" y="339725"/>
             <a:ext cx="3505200" cy="3638550"/>
           </a:xfrm>
           <a:prstGeom prst="rect">
@@ -7463,7 +7720,7 @@
       </p:pic>
       <p:pic>
         <p:nvPicPr>
-          <p:cNvPr id="4" name="Picture 3"/>
+          <p:cNvPr id="9" name="Picture 8"/>
           <p:cNvPicPr>
             <a:picLocks noChangeAspect="1"/>
           </p:cNvPicPr>
@@ -7477,7 +7734,7 @@
         </p:blipFill>
         <p:spPr>
           <a:xfrm>
-            <a:off x="94986" y="339725"/>
+            <a:off x="3598863" y="339725"/>
             <a:ext cx="3505200" cy="3638550"/>
           </a:xfrm>
           <a:prstGeom prst="rect">
@@ -7485,258 +7742,10 @@
           </a:prstGeom>
         </p:spPr>
       </p:pic>
-      <p:sp>
-        <p:nvSpPr>
-          <p:cNvPr id="5" name="TextBox 4"/>
-          <p:cNvSpPr txBox="1"/>
-          <p:nvPr/>
-        </p:nvSpPr>
-        <p:spPr>
-          <a:xfrm rot="16200000">
-            <a:off x="-727963" y="1897175"/>
-            <a:ext cx="2176216" cy="461665"/>
-          </a:xfrm>
-          <a:prstGeom prst="rect">
-            <a:avLst/>
-          </a:prstGeom>
-          <a:solidFill>
-            <a:schemeClr val="bg1"/>
-          </a:solidFill>
-        </p:spPr>
-        <p:txBody>
-          <a:bodyPr wrap="square" rtlCol="0">
-            <a:spAutoFit/>
-          </a:bodyPr>
-          <a:lstStyle/>
-          <a:p>
-            <a:r>
-              <a:rPr lang="en-GB" sz="2400" dirty="0" smtClean="0"/>
-              <a:t>IgM</a:t>
-            </a:r>
-            <a:endParaRPr lang="en-GB" sz="2400" dirty="0"/>
-          </a:p>
-        </p:txBody>
-      </p:sp>
-      <p:sp>
-        <p:nvSpPr>
-          <p:cNvPr id="6" name="TextBox 5"/>
-          <p:cNvSpPr txBox="1"/>
-          <p:nvPr/>
-        </p:nvSpPr>
-        <p:spPr>
-          <a:xfrm>
-            <a:off x="907169" y="3468937"/>
-            <a:ext cx="2402382" cy="461665"/>
-          </a:xfrm>
-          <a:prstGeom prst="rect">
-            <a:avLst/>
-          </a:prstGeom>
-          <a:solidFill>
-            <a:schemeClr val="bg1"/>
-          </a:solidFill>
-        </p:spPr>
-        <p:txBody>
-          <a:bodyPr wrap="square" rtlCol="0">
-            <a:spAutoFit/>
-          </a:bodyPr>
-          <a:lstStyle/>
-          <a:p>
-            <a:r>
-              <a:rPr lang="en-GB" sz="2400" dirty="0" smtClean="0"/>
-              <a:t>B220</a:t>
-            </a:r>
-            <a:endParaRPr lang="en-GB" sz="2400" dirty="0"/>
-          </a:p>
-        </p:txBody>
-      </p:sp>
-      <p:sp>
-        <p:nvSpPr>
-          <p:cNvPr id="7" name="TextBox 6"/>
-          <p:cNvSpPr txBox="1"/>
-          <p:nvPr/>
-        </p:nvSpPr>
-        <p:spPr>
-          <a:xfrm rot="16200000">
-            <a:off x="2794469" y="1897175"/>
-            <a:ext cx="2176216" cy="461665"/>
-          </a:xfrm>
-          <a:prstGeom prst="rect">
-            <a:avLst/>
-          </a:prstGeom>
-          <a:solidFill>
-            <a:schemeClr val="bg1"/>
-          </a:solidFill>
-        </p:spPr>
-        <p:txBody>
-          <a:bodyPr wrap="square" rtlCol="0">
-            <a:spAutoFit/>
-          </a:bodyPr>
-          <a:lstStyle/>
-          <a:p>
-            <a:r>
-              <a:rPr lang="en-GB" sz="2400" dirty="0" smtClean="0"/>
-              <a:t>IgM</a:t>
-            </a:r>
-            <a:endParaRPr lang="en-GB" sz="2400" dirty="0"/>
-          </a:p>
-        </p:txBody>
-      </p:sp>
-      <p:sp>
-        <p:nvSpPr>
-          <p:cNvPr id="8" name="TextBox 7"/>
-          <p:cNvSpPr txBox="1"/>
-          <p:nvPr/>
-        </p:nvSpPr>
-        <p:spPr>
-          <a:xfrm>
-            <a:off x="4429601" y="3468937"/>
-            <a:ext cx="2402382" cy="461665"/>
-          </a:xfrm>
-          <a:prstGeom prst="rect">
-            <a:avLst/>
-          </a:prstGeom>
-          <a:solidFill>
-            <a:schemeClr val="bg1"/>
-          </a:solidFill>
-        </p:spPr>
-        <p:txBody>
-          <a:bodyPr wrap="square" rtlCol="0">
-            <a:spAutoFit/>
-          </a:bodyPr>
-          <a:lstStyle/>
-          <a:p>
-            <a:r>
-              <a:rPr lang="en-GB" sz="2400" dirty="0" smtClean="0"/>
-              <a:t>B220</a:t>
-            </a:r>
-            <a:endParaRPr lang="en-GB" sz="2400" dirty="0"/>
-          </a:p>
-        </p:txBody>
-      </p:sp>
-      <p:sp>
-        <p:nvSpPr>
-          <p:cNvPr id="9" name="TextBox 8"/>
-          <p:cNvSpPr txBox="1"/>
-          <p:nvPr/>
-        </p:nvSpPr>
-        <p:spPr>
-          <a:xfrm>
-            <a:off x="1064580" y="108888"/>
-            <a:ext cx="2087559" cy="461665"/>
-          </a:xfrm>
-          <a:prstGeom prst="rect">
-            <a:avLst/>
-          </a:prstGeom>
-          <a:noFill/>
-        </p:spPr>
-        <p:txBody>
-          <a:bodyPr wrap="none" rtlCol="0">
-            <a:spAutoFit/>
-          </a:bodyPr>
-          <a:lstStyle/>
-          <a:p>
-            <a:r>
-              <a:rPr lang="en-GB" sz="2400" dirty="0" smtClean="0"/>
-              <a:t>CD19+ Fraction</a:t>
-            </a:r>
-            <a:endParaRPr lang="en-GB" sz="2400" dirty="0"/>
-          </a:p>
-        </p:txBody>
-      </p:sp>
-      <p:sp>
-        <p:nvSpPr>
-          <p:cNvPr id="10" name="TextBox 9"/>
-          <p:cNvSpPr txBox="1"/>
-          <p:nvPr/>
-        </p:nvSpPr>
-        <p:spPr>
-          <a:xfrm>
-            <a:off x="4616668" y="108888"/>
-            <a:ext cx="2028248" cy="461665"/>
-          </a:xfrm>
-          <a:prstGeom prst="rect">
-            <a:avLst/>
-          </a:prstGeom>
-          <a:noFill/>
-        </p:spPr>
-        <p:txBody>
-          <a:bodyPr wrap="none" rtlCol="0">
-            <a:spAutoFit/>
-          </a:bodyPr>
-          <a:lstStyle/>
-          <a:p>
-            <a:r>
-              <a:rPr lang="en-GB" sz="2400" dirty="0" smtClean="0"/>
-              <a:t>CD19- Fraction</a:t>
-            </a:r>
-            <a:endParaRPr lang="en-GB" sz="2400" dirty="0"/>
-          </a:p>
-        </p:txBody>
-      </p:sp>
-      <p:sp>
-        <p:nvSpPr>
-          <p:cNvPr id="11" name="TextBox 10"/>
-          <p:cNvSpPr txBox="1"/>
-          <p:nvPr/>
-        </p:nvSpPr>
-        <p:spPr>
-          <a:xfrm>
-            <a:off x="2623933" y="691762"/>
-            <a:ext cx="758541" cy="369332"/>
-          </a:xfrm>
-          <a:prstGeom prst="rect">
-            <a:avLst/>
-          </a:prstGeom>
-          <a:noFill/>
-        </p:spPr>
-        <p:txBody>
-          <a:bodyPr wrap="none" rtlCol="0">
-            <a:spAutoFit/>
-          </a:bodyPr>
-          <a:lstStyle/>
-          <a:p>
-            <a:r>
-              <a:rPr lang="en-GB" sz="1800" dirty="0" smtClean="0"/>
-              <a:t>2.37%</a:t>
-            </a:r>
-            <a:endParaRPr lang="en-GB" sz="1800" dirty="0"/>
-          </a:p>
-        </p:txBody>
-      </p:sp>
-      <p:sp>
-        <p:nvSpPr>
-          <p:cNvPr id="12" name="TextBox 11"/>
-          <p:cNvSpPr txBox="1"/>
-          <p:nvPr/>
-        </p:nvSpPr>
-        <p:spPr>
-          <a:xfrm>
-            <a:off x="6041638" y="691762"/>
-            <a:ext cx="875561" cy="369332"/>
-          </a:xfrm>
-          <a:prstGeom prst="rect">
-            <a:avLst/>
-          </a:prstGeom>
-          <a:noFill/>
-        </p:spPr>
-        <p:txBody>
-          <a:bodyPr wrap="none" rtlCol="0">
-            <a:spAutoFit/>
-          </a:bodyPr>
-          <a:lstStyle/>
-          <a:p>
-            <a:r>
-              <a:rPr lang="en-GB" sz="1800" dirty="0" smtClean="0"/>
-              <a:t>0.005%</a:t>
-            </a:r>
-            <a:endParaRPr lang="en-GB" sz="1800" dirty="0"/>
-          </a:p>
-        </p:txBody>
-      </p:sp>
     </p:spTree>
     <p:extLst>
       <p:ext uri="{BB962C8B-B14F-4D97-AF65-F5344CB8AC3E}">
-        <p14:creationId xmlns:p14="http://schemas.microsoft.com/office/powerpoint/2010/main" val="744710000"/>
+        <p14:creationId xmlns:p14="http://schemas.microsoft.com/office/powerpoint/2010/main" val="2956810755"/>
       </p:ext>
     </p:extLst>
   </p:cSld>
@@ -7765,7 +7774,7 @@
       </p:grpSpPr>
       <p:pic>
         <p:nvPicPr>
-          <p:cNvPr id="12" name="Picture 11"/>
+          <p:cNvPr id="2" name="Picture 1"/>
           <p:cNvPicPr>
             <a:picLocks noChangeAspect="1"/>
           </p:cNvPicPr>
@@ -7779,7 +7788,7 @@
         </p:blipFill>
         <p:spPr>
           <a:xfrm>
-            <a:off x="95051" y="339725"/>
+            <a:off x="3608137" y="339725"/>
             <a:ext cx="3505200" cy="3638550"/>
           </a:xfrm>
           <a:prstGeom prst="rect">
@@ -7789,7 +7798,7 @@
       </p:pic>
       <p:pic>
         <p:nvPicPr>
-          <p:cNvPr id="2" name="Picture 1"/>
+          <p:cNvPr id="4" name="Picture 3"/>
           <p:cNvPicPr>
             <a:picLocks noChangeAspect="1"/>
           </p:cNvPicPr>
@@ -7803,7 +7812,7 @@
         </p:blipFill>
         <p:spPr>
           <a:xfrm>
-            <a:off x="3606814" y="339725"/>
+            <a:off x="94986" y="339725"/>
             <a:ext cx="3505200" cy="3638550"/>
           </a:xfrm>
           <a:prstGeom prst="rect">
@@ -7813,7 +7822,7 @@
       </p:pic>
       <p:sp>
         <p:nvSpPr>
-          <p:cNvPr id="4" name="TextBox 3"/>
+          <p:cNvPr id="5" name="TextBox 4"/>
           <p:cNvSpPr txBox="1"/>
           <p:nvPr/>
         </p:nvSpPr>
@@ -7845,7 +7854,7 @@
       </p:sp>
       <p:sp>
         <p:nvSpPr>
-          <p:cNvPr id="5" name="TextBox 4"/>
+          <p:cNvPr id="6" name="TextBox 5"/>
           <p:cNvSpPr txBox="1"/>
           <p:nvPr/>
         </p:nvSpPr>
@@ -7877,7 +7886,7 @@
       </p:sp>
       <p:sp>
         <p:nvSpPr>
-          <p:cNvPr id="6" name="TextBox 5"/>
+          <p:cNvPr id="7" name="TextBox 6"/>
           <p:cNvSpPr txBox="1"/>
           <p:nvPr/>
         </p:nvSpPr>
@@ -7909,7 +7918,7 @@
       </p:sp>
       <p:sp>
         <p:nvSpPr>
-          <p:cNvPr id="7" name="TextBox 6"/>
+          <p:cNvPr id="8" name="TextBox 7"/>
           <p:cNvSpPr txBox="1"/>
           <p:nvPr/>
         </p:nvSpPr>
@@ -7941,7 +7950,7 @@
       </p:sp>
       <p:sp>
         <p:nvSpPr>
-          <p:cNvPr id="8" name="TextBox 7"/>
+          <p:cNvPr id="9" name="TextBox 8"/>
           <p:cNvSpPr txBox="1"/>
           <p:nvPr/>
         </p:nvSpPr>
@@ -7971,7 +7980,7 @@
       </p:sp>
       <p:sp>
         <p:nvSpPr>
-          <p:cNvPr id="9" name="TextBox 8"/>
+          <p:cNvPr id="10" name="TextBox 9"/>
           <p:cNvSpPr txBox="1"/>
           <p:nvPr/>
         </p:nvSpPr>
@@ -8001,7 +8010,7 @@
       </p:sp>
       <p:sp>
         <p:nvSpPr>
-          <p:cNvPr id="10" name="TextBox 9"/>
+          <p:cNvPr id="11" name="TextBox 10"/>
           <p:cNvSpPr txBox="1"/>
           <p:nvPr/>
         </p:nvSpPr>
@@ -8023,7 +8032,7 @@
           <a:p>
             <a:r>
               <a:rPr lang="en-GB" sz="1800" dirty="0" smtClean="0"/>
-              <a:t>4.64%</a:t>
+              <a:t>2.37%</a:t>
             </a:r>
             <a:endParaRPr lang="en-GB" sz="1800" dirty="0"/>
           </a:p>
@@ -8031,7 +8040,7 @@
       </p:sp>
       <p:sp>
         <p:nvSpPr>
-          <p:cNvPr id="11" name="TextBox 10"/>
+          <p:cNvPr id="12" name="TextBox 11"/>
           <p:cNvSpPr txBox="1"/>
           <p:nvPr/>
         </p:nvSpPr>
@@ -8053,7 +8062,7 @@
           <a:p>
             <a:r>
               <a:rPr lang="en-GB" sz="1800" dirty="0" smtClean="0"/>
-              <a:t>0.002%</a:t>
+              <a:t>0.005%</a:t>
             </a:r>
             <a:endParaRPr lang="en-GB" sz="1800" dirty="0"/>
           </a:p>
@@ -8062,7 +8071,7 @@
     </p:spTree>
     <p:extLst>
       <p:ext uri="{BB962C8B-B14F-4D97-AF65-F5344CB8AC3E}">
-        <p14:creationId xmlns:p14="http://schemas.microsoft.com/office/powerpoint/2010/main" val="3430481495"/>
+        <p14:creationId xmlns:p14="http://schemas.microsoft.com/office/powerpoint/2010/main" val="744710000"/>
       </p:ext>
     </p:extLst>
   </p:cSld>
@@ -8313,31 +8322,7 @@
       </p:grpSpPr>
       <p:pic>
         <p:nvPicPr>
-          <p:cNvPr id="14" name="Picture 13"/>
-          <p:cNvPicPr>
-            <a:picLocks noChangeAspect="1"/>
-          </p:cNvPicPr>
-          <p:nvPr/>
-        </p:nvPicPr>
-        <p:blipFill>
-          <a:blip r:embed="rId2"/>
-          <a:stretch>
-            <a:fillRect/>
-          </a:stretch>
-        </p:blipFill>
-        <p:spPr>
-          <a:xfrm>
-            <a:off x="3612864" y="339721"/>
-            <a:ext cx="3505200" cy="3638550"/>
-          </a:xfrm>
-          <a:prstGeom prst="rect">
-            <a:avLst/>
-          </a:prstGeom>
-        </p:spPr>
-      </p:pic>
-      <p:pic>
-        <p:nvPicPr>
-          <p:cNvPr id="4" name="Picture 3"/>
+          <p:cNvPr id="12" name="Picture 11"/>
           <p:cNvPicPr>
             <a:picLocks noChangeAspect="1"/>
           </p:cNvPicPr>
@@ -8351,7 +8336,7 @@
         </p:blipFill>
         <p:spPr>
           <a:xfrm>
-            <a:off x="93663" y="339725"/>
+            <a:off x="95051" y="339725"/>
             <a:ext cx="3505200" cy="3638550"/>
           </a:xfrm>
           <a:prstGeom prst="rect">
@@ -8359,39 +8344,33 @@
           </a:prstGeom>
         </p:spPr>
       </p:pic>
-      <p:sp>
-        <p:nvSpPr>
-          <p:cNvPr id="5" name="TextBox 4"/>
-          <p:cNvSpPr txBox="1"/>
-          <p:nvPr/>
-        </p:nvSpPr>
-        <p:spPr>
-          <a:xfrm>
-            <a:off x="2520563" y="715617"/>
-            <a:ext cx="875561" cy="369332"/>
-          </a:xfrm>
-          <a:prstGeom prst="rect">
-            <a:avLst/>
-          </a:prstGeom>
-          <a:noFill/>
-        </p:spPr>
-        <p:txBody>
-          <a:bodyPr wrap="none" rtlCol="0">
-            <a:spAutoFit/>
-          </a:bodyPr>
-          <a:lstStyle/>
-          <a:p>
-            <a:r>
-              <a:rPr lang="en-GB" sz="1800" dirty="0" smtClean="0"/>
-              <a:t>0.670%</a:t>
-            </a:r>
-            <a:endParaRPr lang="en-GB" sz="1800" dirty="0"/>
-          </a:p>
-        </p:txBody>
-      </p:sp>
-      <p:sp>
-        <p:nvSpPr>
-          <p:cNvPr id="8" name="TextBox 7"/>
+      <p:pic>
+        <p:nvPicPr>
+          <p:cNvPr id="2" name="Picture 1"/>
+          <p:cNvPicPr>
+            <a:picLocks noChangeAspect="1"/>
+          </p:cNvPicPr>
+          <p:nvPr/>
+        </p:nvPicPr>
+        <p:blipFill>
+          <a:blip r:embed="rId4"/>
+          <a:stretch>
+            <a:fillRect/>
+          </a:stretch>
+        </p:blipFill>
+        <p:spPr>
+          <a:xfrm>
+            <a:off x="3606814" y="339725"/>
+            <a:ext cx="3505200" cy="3638550"/>
+          </a:xfrm>
+          <a:prstGeom prst="rect">
+            <a:avLst/>
+          </a:prstGeom>
+        </p:spPr>
+      </p:pic>
+      <p:sp>
+        <p:nvSpPr>
+          <p:cNvPr id="4" name="TextBox 3"/>
           <p:cNvSpPr txBox="1"/>
           <p:nvPr/>
         </p:nvSpPr>
@@ -8423,7 +8402,7 @@
       </p:sp>
       <p:sp>
         <p:nvSpPr>
-          <p:cNvPr id="9" name="TextBox 8"/>
+          <p:cNvPr id="5" name="TextBox 4"/>
           <p:cNvSpPr txBox="1"/>
           <p:nvPr/>
         </p:nvSpPr>
@@ -8446,12 +8425,8 @@
           <a:lstStyle/>
           <a:p>
             <a:r>
-              <a:rPr lang="en-GB" sz="2400" dirty="0" err="1" smtClean="0"/>
-              <a:t>TcR</a:t>
-            </a:r>
-            <a:r>
-              <a:rPr lang="el-GR" sz="2400" dirty="0" smtClean="0"/>
-              <a:t>β</a:t>
+              <a:rPr lang="en-GB" sz="2400" dirty="0" smtClean="0"/>
+              <a:t>B220</a:t>
             </a:r>
             <a:endParaRPr lang="en-GB" sz="2400" dirty="0"/>
           </a:p>
@@ -8459,7 +8434,7 @@
       </p:sp>
       <p:sp>
         <p:nvSpPr>
-          <p:cNvPr id="10" name="TextBox 9"/>
+          <p:cNvPr id="6" name="TextBox 5"/>
           <p:cNvSpPr txBox="1"/>
           <p:nvPr/>
         </p:nvSpPr>
@@ -8491,7 +8466,7 @@
       </p:sp>
       <p:sp>
         <p:nvSpPr>
-          <p:cNvPr id="11" name="TextBox 10"/>
+          <p:cNvPr id="7" name="TextBox 6"/>
           <p:cNvSpPr txBox="1"/>
           <p:nvPr/>
         </p:nvSpPr>
@@ -8514,12 +8489,8 @@
           <a:lstStyle/>
           <a:p>
             <a:r>
-              <a:rPr lang="en-GB" sz="2400" dirty="0" err="1"/>
-              <a:t>TcR</a:t>
-            </a:r>
-            <a:r>
-              <a:rPr lang="el-GR" sz="2400" dirty="0"/>
-              <a:t>β</a:t>
+              <a:rPr lang="en-GB" sz="2400" dirty="0" smtClean="0"/>
+              <a:t>B220</a:t>
             </a:r>
             <a:endParaRPr lang="en-GB" sz="2400" dirty="0"/>
           </a:p>
@@ -8527,14 +8498,14 @@
       </p:sp>
       <p:sp>
         <p:nvSpPr>
-          <p:cNvPr id="12" name="TextBox 11"/>
-          <p:cNvSpPr txBox="1"/>
-          <p:nvPr/>
-        </p:nvSpPr>
-        <p:spPr>
-          <a:xfrm>
-            <a:off x="1458175" y="108890"/>
-            <a:ext cx="776175" cy="461665"/>
+          <p:cNvPr id="8" name="TextBox 7"/>
+          <p:cNvSpPr txBox="1"/>
+          <p:nvPr/>
+        </p:nvSpPr>
+        <p:spPr>
+          <a:xfrm>
+            <a:off x="1064580" y="108888"/>
+            <a:ext cx="2087559" cy="461665"/>
           </a:xfrm>
           <a:prstGeom prst="rect">
             <a:avLst/>
@@ -8549,7 +8520,7 @@
           <a:p>
             <a:r>
               <a:rPr lang="en-GB" sz="2400" dirty="0" smtClean="0"/>
-              <a:t>NOD</a:t>
+              <a:t>CD19+ Fraction</a:t>
             </a:r>
             <a:endParaRPr lang="en-GB" sz="2400" dirty="0"/>
           </a:p>
@@ -8557,14 +8528,14 @@
       </p:sp>
       <p:sp>
         <p:nvSpPr>
-          <p:cNvPr id="13" name="TextBox 12"/>
-          <p:cNvSpPr txBox="1"/>
-          <p:nvPr/>
-        </p:nvSpPr>
-        <p:spPr>
-          <a:xfrm>
-            <a:off x="4762199" y="108889"/>
-            <a:ext cx="1194430" cy="461665"/>
+          <p:cNvPr id="9" name="TextBox 8"/>
+          <p:cNvSpPr txBox="1"/>
+          <p:nvPr/>
+        </p:nvSpPr>
+        <p:spPr>
+          <a:xfrm>
+            <a:off x="4616668" y="108888"/>
+            <a:ext cx="2028248" cy="461665"/>
           </a:xfrm>
           <a:prstGeom prst="rect">
             <a:avLst/>
@@ -8579,7 +8550,7 @@
           <a:p>
             <a:r>
               <a:rPr lang="en-GB" sz="2400" dirty="0" smtClean="0"/>
-              <a:t>NOD KO</a:t>
+              <a:t>CD19- Fraction</a:t>
             </a:r>
             <a:endParaRPr lang="en-GB" sz="2400" dirty="0"/>
           </a:p>
@@ -8587,13 +8558,43 @@
       </p:sp>
       <p:sp>
         <p:nvSpPr>
-          <p:cNvPr id="15" name="TextBox 14"/>
-          <p:cNvSpPr txBox="1"/>
-          <p:nvPr/>
-        </p:nvSpPr>
-        <p:spPr>
-          <a:xfrm>
-            <a:off x="6025763" y="715617"/>
+          <p:cNvPr id="10" name="TextBox 9"/>
+          <p:cNvSpPr txBox="1"/>
+          <p:nvPr/>
+        </p:nvSpPr>
+        <p:spPr>
+          <a:xfrm>
+            <a:off x="2623933" y="691762"/>
+            <a:ext cx="758541" cy="369332"/>
+          </a:xfrm>
+          <a:prstGeom prst="rect">
+            <a:avLst/>
+          </a:prstGeom>
+          <a:noFill/>
+        </p:spPr>
+        <p:txBody>
+          <a:bodyPr wrap="none" rtlCol="0">
+            <a:spAutoFit/>
+          </a:bodyPr>
+          <a:lstStyle/>
+          <a:p>
+            <a:r>
+              <a:rPr lang="en-GB" sz="1800" dirty="0" smtClean="0"/>
+              <a:t>4.64%</a:t>
+            </a:r>
+            <a:endParaRPr lang="en-GB" sz="1800" dirty="0"/>
+          </a:p>
+        </p:txBody>
+      </p:sp>
+      <p:sp>
+        <p:nvSpPr>
+          <p:cNvPr id="11" name="TextBox 10"/>
+          <p:cNvSpPr txBox="1"/>
+          <p:nvPr/>
+        </p:nvSpPr>
+        <p:spPr>
+          <a:xfrm>
+            <a:off x="6041638" y="691762"/>
             <a:ext cx="875561" cy="369332"/>
           </a:xfrm>
           <a:prstGeom prst="rect">
@@ -8609,7 +8610,7 @@
           <a:p>
             <a:r>
               <a:rPr lang="en-GB" sz="1800" dirty="0" smtClean="0"/>
-              <a:t>0.054%</a:t>
+              <a:t>0.002%</a:t>
             </a:r>
             <a:endParaRPr lang="en-GB" sz="1800" dirty="0"/>
           </a:p>
@@ -8618,7 +8619,7 @@
     </p:spTree>
     <p:extLst>
       <p:ext uri="{BB962C8B-B14F-4D97-AF65-F5344CB8AC3E}">
-        <p14:creationId xmlns:p14="http://schemas.microsoft.com/office/powerpoint/2010/main" val="1792757575"/>
+        <p14:creationId xmlns:p14="http://schemas.microsoft.com/office/powerpoint/2010/main" val="3430481495"/>
       </p:ext>
     </p:extLst>
   </p:cSld>
@@ -8647,7 +8648,7 @@
       </p:grpSpPr>
       <p:pic>
         <p:nvPicPr>
-          <p:cNvPr id="2" name="Picture 1"/>
+          <p:cNvPr id="14" name="Picture 13"/>
           <p:cNvPicPr>
             <a:picLocks noChangeAspect="1"/>
           </p:cNvPicPr>
@@ -8661,7 +8662,7 @@
         </p:blipFill>
         <p:spPr>
           <a:xfrm>
-            <a:off x="3598863" y="339725"/>
+            <a:off x="3612864" y="339721"/>
             <a:ext cx="3505200" cy="3638550"/>
           </a:xfrm>
           <a:prstGeom prst="rect">
@@ -8671,7 +8672,7 @@
       </p:pic>
       <p:pic>
         <p:nvPicPr>
-          <p:cNvPr id="3" name="Picture 2"/>
+          <p:cNvPr id="4" name="Picture 3"/>
           <p:cNvPicPr>
             <a:picLocks noChangeAspect="1"/>
           </p:cNvPicPr>
@@ -8685,7 +8686,7 @@
         </p:blipFill>
         <p:spPr>
           <a:xfrm>
-            <a:off x="95412" y="339725"/>
+            <a:off x="93663" y="339725"/>
             <a:ext cx="3505200" cy="3638550"/>
           </a:xfrm>
           <a:prstGeom prst="rect">
@@ -8701,8 +8702,38 @@
         </p:nvSpPr>
         <p:spPr>
           <a:xfrm>
-            <a:off x="978010" y="1168842"/>
-            <a:ext cx="477033" cy="341906"/>
+            <a:off x="2520563" y="715617"/>
+            <a:ext cx="875561" cy="369332"/>
+          </a:xfrm>
+          <a:prstGeom prst="rect">
+            <a:avLst/>
+          </a:prstGeom>
+          <a:noFill/>
+        </p:spPr>
+        <p:txBody>
+          <a:bodyPr wrap="none" rtlCol="0">
+            <a:spAutoFit/>
+          </a:bodyPr>
+          <a:lstStyle/>
+          <a:p>
+            <a:r>
+              <a:rPr lang="en-GB" sz="1800" dirty="0" smtClean="0"/>
+              <a:t>0.670%</a:t>
+            </a:r>
+            <a:endParaRPr lang="en-GB" sz="1800" dirty="0"/>
+          </a:p>
+        </p:txBody>
+      </p:sp>
+      <p:sp>
+        <p:nvSpPr>
+          <p:cNvPr id="8" name="TextBox 7"/>
+          <p:cNvSpPr txBox="1"/>
+          <p:nvPr/>
+        </p:nvSpPr>
+        <p:spPr>
+          <a:xfrm rot="16200000">
+            <a:off x="-727963" y="1897175"/>
+            <a:ext cx="2176216" cy="461665"/>
           </a:xfrm>
           <a:prstGeom prst="rect">
             <a:avLst/>
@@ -8717,63 +8748,24 @@
           </a:bodyPr>
           <a:lstStyle/>
           <a:p>
-            <a:endParaRPr lang="en-GB" dirty="0"/>
-          </a:p>
-        </p:txBody>
-      </p:sp>
-      <p:sp>
-        <p:nvSpPr>
-          <p:cNvPr id="4" name="TextBox 3"/>
-          <p:cNvSpPr txBox="1"/>
-          <p:nvPr/>
-        </p:nvSpPr>
-        <p:spPr>
-          <a:xfrm>
-            <a:off x="848284" y="1032018"/>
-            <a:ext cx="784189" cy="615553"/>
-          </a:xfrm>
-          <a:prstGeom prst="rect">
-            <a:avLst/>
-          </a:prstGeom>
-          <a:noFill/>
-        </p:spPr>
-        <p:txBody>
-          <a:bodyPr wrap="none" rtlCol="0">
-            <a:spAutoFit/>
-          </a:bodyPr>
-          <a:lstStyle/>
-          <a:p>
-            <a:pPr algn="ctr"/>
-            <a:r>
-              <a:rPr lang="en-GB" sz="1700" dirty="0" err="1" smtClean="0"/>
+            <a:r>
+              <a:rPr lang="en-GB" sz="2400" dirty="0" smtClean="0"/>
               <a:t>IgM</a:t>
             </a:r>
-            <a:r>
-              <a:rPr lang="en-GB" sz="1700" baseline="30000" dirty="0" err="1" smtClean="0"/>
-              <a:t>high</a:t>
-            </a:r>
-            <a:endParaRPr lang="en-GB" sz="1700" dirty="0" smtClean="0"/>
-          </a:p>
-          <a:p>
-            <a:pPr algn="ctr"/>
-            <a:r>
-              <a:rPr lang="en-GB" sz="1700" dirty="0" smtClean="0"/>
-              <a:t>40.2%</a:t>
-            </a:r>
-            <a:endParaRPr lang="en-GB" sz="1700" dirty="0"/>
-          </a:p>
-        </p:txBody>
-      </p:sp>
-      <p:sp>
-        <p:nvSpPr>
-          <p:cNvPr id="7" name="Rectangle 6"/>
-          <p:cNvSpPr/>
-          <p:nvPr/>
-        </p:nvSpPr>
-        <p:spPr>
-          <a:xfrm>
-            <a:off x="4492487" y="1168842"/>
-            <a:ext cx="467756" cy="341906"/>
+            <a:endParaRPr lang="en-GB" sz="2400" dirty="0"/>
+          </a:p>
+        </p:txBody>
+      </p:sp>
+      <p:sp>
+        <p:nvSpPr>
+          <p:cNvPr id="9" name="TextBox 8"/>
+          <p:cNvSpPr txBox="1"/>
+          <p:nvPr/>
+        </p:nvSpPr>
+        <p:spPr>
+          <a:xfrm>
+            <a:off x="907169" y="3468937"/>
+            <a:ext cx="2402382" cy="461665"/>
           </a:xfrm>
           <a:prstGeom prst="rect">
             <a:avLst/>
@@ -8781,88 +8773,35 @@
           <a:solidFill>
             <a:schemeClr val="bg1"/>
           </a:solidFill>
-          <a:ln>
-            <a:solidFill>
-              <a:schemeClr val="bg1"/>
-            </a:solidFill>
-          </a:ln>
-        </p:spPr>
-        <p:style>
-          <a:lnRef idx="2">
-            <a:schemeClr val="accent1">
-              <a:shade val="50000"/>
-            </a:schemeClr>
-          </a:lnRef>
-          <a:fillRef idx="1">
-            <a:schemeClr val="accent1"/>
-          </a:fillRef>
-          <a:effectRef idx="0">
-            <a:schemeClr val="accent1"/>
-          </a:effectRef>
-          <a:fontRef idx="minor">
-            <a:schemeClr val="lt1"/>
-          </a:fontRef>
-        </p:style>
-        <p:txBody>
-          <a:bodyPr rtlCol="0" anchor="ctr"/>
-          <a:lstStyle/>
-          <a:p>
-            <a:pPr algn="ctr"/>
-            <a:endParaRPr lang="en-GB"/>
-          </a:p>
-        </p:txBody>
-      </p:sp>
-      <p:sp>
-        <p:nvSpPr>
-          <p:cNvPr id="6" name="TextBox 5"/>
-          <p:cNvSpPr txBox="1"/>
-          <p:nvPr/>
-        </p:nvSpPr>
-        <p:spPr>
-          <a:xfrm>
-            <a:off x="4353484" y="1005983"/>
-            <a:ext cx="784189" cy="615553"/>
-          </a:xfrm>
-          <a:prstGeom prst="rect">
-            <a:avLst/>
-          </a:prstGeom>
-          <a:noFill/>
-        </p:spPr>
-        <p:txBody>
-          <a:bodyPr wrap="none" rtlCol="0">
-            <a:spAutoFit/>
-          </a:bodyPr>
-          <a:lstStyle/>
-          <a:p>
-            <a:r>
-              <a:rPr lang="en-GB" sz="1700" dirty="0" err="1" smtClean="0"/>
-              <a:t>IgM</a:t>
-            </a:r>
-            <a:r>
-              <a:rPr lang="en-GB" sz="1700" baseline="30000" dirty="0" err="1" smtClean="0"/>
-              <a:t>high</a:t>
-            </a:r>
-            <a:endParaRPr lang="en-GB" sz="1700" dirty="0" smtClean="0"/>
-          </a:p>
-          <a:p>
-            <a:r>
-              <a:rPr lang="en-GB" sz="1700" dirty="0" smtClean="0"/>
-              <a:t>17.2%</a:t>
-            </a:r>
-            <a:endParaRPr lang="en-GB" sz="1700" dirty="0"/>
-          </a:p>
-        </p:txBody>
-      </p:sp>
-      <p:sp>
-        <p:nvSpPr>
-          <p:cNvPr id="8" name="Rectangle 7"/>
-          <p:cNvSpPr/>
-          <p:nvPr/>
-        </p:nvSpPr>
-        <p:spPr>
-          <a:xfrm>
-            <a:off x="1053353" y="1952371"/>
-            <a:ext cx="477033" cy="302150"/>
+        </p:spPr>
+        <p:txBody>
+          <a:bodyPr wrap="square" rtlCol="0">
+            <a:spAutoFit/>
+          </a:bodyPr>
+          <a:lstStyle/>
+          <a:p>
+            <a:r>
+              <a:rPr lang="en-GB" sz="2400" dirty="0" err="1" smtClean="0"/>
+              <a:t>TcR</a:t>
+            </a:r>
+            <a:r>
+              <a:rPr lang="el-GR" sz="2400" dirty="0" smtClean="0"/>
+              <a:t>β</a:t>
+            </a:r>
+            <a:endParaRPr lang="en-GB" sz="2400" dirty="0"/>
+          </a:p>
+        </p:txBody>
+      </p:sp>
+      <p:sp>
+        <p:nvSpPr>
+          <p:cNvPr id="10" name="TextBox 9"/>
+          <p:cNvSpPr txBox="1"/>
+          <p:nvPr/>
+        </p:nvSpPr>
+        <p:spPr>
+          <a:xfrm rot="16200000">
+            <a:off x="2794469" y="1897175"/>
+            <a:ext cx="2176216" cy="461665"/>
           </a:xfrm>
           <a:prstGeom prst="rect">
             <a:avLst/>
@@ -8870,47 +8809,31 @@
           <a:solidFill>
             <a:schemeClr val="bg1"/>
           </a:solidFill>
-          <a:ln>
-            <a:solidFill>
-              <a:schemeClr val="bg1"/>
-            </a:solidFill>
-          </a:ln>
-        </p:spPr>
-        <p:style>
-          <a:lnRef idx="2">
-            <a:schemeClr val="accent1">
-              <a:shade val="50000"/>
-            </a:schemeClr>
-          </a:lnRef>
-          <a:fillRef idx="1">
-            <a:schemeClr val="accent1"/>
-          </a:fillRef>
-          <a:effectRef idx="0">
-            <a:schemeClr val="accent1"/>
-          </a:effectRef>
-          <a:fontRef idx="minor">
-            <a:schemeClr val="lt1"/>
-          </a:fontRef>
-        </p:style>
-        <p:txBody>
-          <a:bodyPr rtlCol="0" anchor="ctr"/>
-          <a:lstStyle/>
-          <a:p>
-            <a:pPr algn="ctr"/>
-            <a:endParaRPr lang="en-GB"/>
-          </a:p>
-        </p:txBody>
-      </p:sp>
-      <p:sp>
-        <p:nvSpPr>
-          <p:cNvPr id="9" name="Rectangle 8"/>
-          <p:cNvSpPr/>
-          <p:nvPr/>
-        </p:nvSpPr>
-        <p:spPr>
-          <a:xfrm>
-            <a:off x="4540775" y="1924762"/>
-            <a:ext cx="477033" cy="302150"/>
+        </p:spPr>
+        <p:txBody>
+          <a:bodyPr wrap="square" rtlCol="0">
+            <a:spAutoFit/>
+          </a:bodyPr>
+          <a:lstStyle/>
+          <a:p>
+            <a:r>
+              <a:rPr lang="en-GB" sz="2400" dirty="0" smtClean="0"/>
+              <a:t>IgM</a:t>
+            </a:r>
+            <a:endParaRPr lang="en-GB" sz="2400" dirty="0"/>
+          </a:p>
+        </p:txBody>
+      </p:sp>
+      <p:sp>
+        <p:nvSpPr>
+          <p:cNvPr id="11" name="TextBox 10"/>
+          <p:cNvSpPr txBox="1"/>
+          <p:nvPr/>
+        </p:nvSpPr>
+        <p:spPr>
+          <a:xfrm>
+            <a:off x="4429601" y="3468937"/>
+            <a:ext cx="2402382" cy="461665"/>
           </a:xfrm>
           <a:prstGeom prst="rect">
             <a:avLst/>
@@ -8918,47 +8841,35 @@
           <a:solidFill>
             <a:schemeClr val="bg1"/>
           </a:solidFill>
-          <a:ln>
-            <a:solidFill>
-              <a:schemeClr val="bg1"/>
-            </a:solidFill>
-          </a:ln>
-        </p:spPr>
-        <p:style>
-          <a:lnRef idx="2">
-            <a:schemeClr val="accent1">
-              <a:shade val="50000"/>
-            </a:schemeClr>
-          </a:lnRef>
-          <a:fillRef idx="1">
-            <a:schemeClr val="accent1"/>
-          </a:fillRef>
-          <a:effectRef idx="0">
-            <a:schemeClr val="accent1"/>
-          </a:effectRef>
-          <a:fontRef idx="minor">
-            <a:schemeClr val="lt1"/>
-          </a:fontRef>
-        </p:style>
-        <p:txBody>
-          <a:bodyPr rtlCol="0" anchor="ctr"/>
-          <a:lstStyle/>
-          <a:p>
-            <a:pPr algn="ctr"/>
-            <a:endParaRPr lang="en-GB"/>
-          </a:p>
-        </p:txBody>
-      </p:sp>
-      <p:sp>
-        <p:nvSpPr>
-          <p:cNvPr id="10" name="TextBox 9"/>
-          <p:cNvSpPr txBox="1"/>
-          <p:nvPr/>
-        </p:nvSpPr>
-        <p:spPr>
-          <a:xfrm>
-            <a:off x="848284" y="1764066"/>
-            <a:ext cx="741934" cy="615553"/>
+        </p:spPr>
+        <p:txBody>
+          <a:bodyPr wrap="square" rtlCol="0">
+            <a:spAutoFit/>
+          </a:bodyPr>
+          <a:lstStyle/>
+          <a:p>
+            <a:r>
+              <a:rPr lang="en-GB" sz="2400" dirty="0" err="1"/>
+              <a:t>TcR</a:t>
+            </a:r>
+            <a:r>
+              <a:rPr lang="el-GR" sz="2400" dirty="0"/>
+              <a:t>β</a:t>
+            </a:r>
+            <a:endParaRPr lang="en-GB" sz="2400" dirty="0"/>
+          </a:p>
+        </p:txBody>
+      </p:sp>
+      <p:sp>
+        <p:nvSpPr>
+          <p:cNvPr id="12" name="TextBox 11"/>
+          <p:cNvSpPr txBox="1"/>
+          <p:nvPr/>
+        </p:nvSpPr>
+        <p:spPr>
+          <a:xfrm>
+            <a:off x="1458175" y="108890"/>
+            <a:ext cx="776175" cy="461665"/>
           </a:xfrm>
           <a:prstGeom prst="rect">
             <a:avLst/>
@@ -8971,37 +8882,24 @@
           </a:bodyPr>
           <a:lstStyle/>
           <a:p>
-            <a:pPr algn="ctr"/>
-            <a:r>
-              <a:rPr lang="en-GB" sz="1700" dirty="0" err="1" smtClean="0"/>
-              <a:t>IgM</a:t>
-            </a:r>
-            <a:r>
-              <a:rPr lang="en-GB" sz="1700" baseline="30000" dirty="0" err="1" smtClean="0"/>
-              <a:t>low</a:t>
-            </a:r>
-            <a:endParaRPr lang="en-GB" sz="1700" dirty="0" smtClean="0"/>
-          </a:p>
-          <a:p>
-            <a:pPr algn="ctr"/>
-            <a:r>
-              <a:rPr lang="en-GB" sz="1700" dirty="0" smtClean="0"/>
-              <a:t>23.9%</a:t>
-            </a:r>
-            <a:endParaRPr lang="en-GB" sz="1700" dirty="0"/>
-          </a:p>
-        </p:txBody>
-      </p:sp>
-      <p:sp>
-        <p:nvSpPr>
-          <p:cNvPr id="11" name="TextBox 10"/>
-          <p:cNvSpPr txBox="1"/>
-          <p:nvPr/>
-        </p:nvSpPr>
-        <p:spPr>
-          <a:xfrm>
-            <a:off x="4353484" y="1764065"/>
-            <a:ext cx="741934" cy="615553"/>
+            <a:r>
+              <a:rPr lang="en-GB" sz="2400" dirty="0" smtClean="0"/>
+              <a:t>NOD</a:t>
+            </a:r>
+            <a:endParaRPr lang="en-GB" sz="2400" dirty="0"/>
+          </a:p>
+        </p:txBody>
+      </p:sp>
+      <p:sp>
+        <p:nvSpPr>
+          <p:cNvPr id="13" name="TextBox 12"/>
+          <p:cNvSpPr txBox="1"/>
+          <p:nvPr/>
+        </p:nvSpPr>
+        <p:spPr>
+          <a:xfrm>
+            <a:off x="4762199" y="108889"/>
+            <a:ext cx="1194430" cy="461665"/>
           </a:xfrm>
           <a:prstGeom prst="rect">
             <a:avLst/>
@@ -9014,133 +8912,24 @@
           </a:bodyPr>
           <a:lstStyle/>
           <a:p>
-            <a:pPr algn="ctr"/>
-            <a:r>
-              <a:rPr lang="en-GB" sz="1700" dirty="0" err="1" smtClean="0"/>
-              <a:t>IgM</a:t>
-            </a:r>
-            <a:r>
-              <a:rPr lang="en-GB" sz="1700" baseline="30000" dirty="0" err="1" smtClean="0"/>
-              <a:t>low</a:t>
-            </a:r>
-            <a:endParaRPr lang="en-GB" sz="1700" dirty="0" smtClean="0"/>
-          </a:p>
-          <a:p>
-            <a:pPr algn="ctr"/>
-            <a:r>
-              <a:rPr lang="en-GB" sz="1700" dirty="0" smtClean="0"/>
-              <a:t>74.1%</a:t>
-            </a:r>
-            <a:endParaRPr lang="en-GB" sz="1700" dirty="0"/>
-          </a:p>
-        </p:txBody>
-      </p:sp>
-      <p:sp>
-        <p:nvSpPr>
-          <p:cNvPr id="14" name="Rectangle 13"/>
-          <p:cNvSpPr/>
-          <p:nvPr/>
-        </p:nvSpPr>
-        <p:spPr>
-          <a:xfrm>
-            <a:off x="4492487" y="2639833"/>
-            <a:ext cx="389614" cy="318254"/>
-          </a:xfrm>
-          <a:prstGeom prst="rect">
-            <a:avLst/>
-          </a:prstGeom>
-          <a:solidFill>
-            <a:schemeClr val="bg1"/>
-          </a:solidFill>
-          <a:ln>
-            <a:solidFill>
-              <a:schemeClr val="bg1"/>
-            </a:solidFill>
-          </a:ln>
-        </p:spPr>
-        <p:style>
-          <a:lnRef idx="2">
-            <a:schemeClr val="accent1">
-              <a:shade val="50000"/>
-            </a:schemeClr>
-          </a:lnRef>
-          <a:fillRef idx="1">
-            <a:schemeClr val="accent1"/>
-          </a:fillRef>
-          <a:effectRef idx="0">
-            <a:schemeClr val="accent1"/>
-          </a:effectRef>
-          <a:fontRef idx="minor">
-            <a:schemeClr val="lt1"/>
-          </a:fontRef>
-        </p:style>
-        <p:txBody>
-          <a:bodyPr rtlCol="0" anchor="ctr"/>
-          <a:lstStyle/>
-          <a:p>
-            <a:pPr algn="ctr"/>
-            <a:endParaRPr lang="en-GB"/>
-          </a:p>
-        </p:txBody>
-      </p:sp>
-      <p:sp>
-        <p:nvSpPr>
-          <p:cNvPr id="15" name="Rectangle 14"/>
-          <p:cNvSpPr/>
-          <p:nvPr/>
-        </p:nvSpPr>
-        <p:spPr>
-          <a:xfrm>
-            <a:off x="1021719" y="2639833"/>
-            <a:ext cx="389614" cy="318254"/>
-          </a:xfrm>
-          <a:prstGeom prst="rect">
-            <a:avLst/>
-          </a:prstGeom>
-          <a:solidFill>
-            <a:schemeClr val="bg1"/>
-          </a:solidFill>
-          <a:ln>
-            <a:solidFill>
-              <a:schemeClr val="bg1"/>
-            </a:solidFill>
-          </a:ln>
-        </p:spPr>
-        <p:style>
-          <a:lnRef idx="2">
-            <a:schemeClr val="accent1">
-              <a:shade val="50000"/>
-            </a:schemeClr>
-          </a:lnRef>
-          <a:fillRef idx="1">
-            <a:schemeClr val="accent1"/>
-          </a:fillRef>
-          <a:effectRef idx="0">
-            <a:schemeClr val="accent1"/>
-          </a:effectRef>
-          <a:fontRef idx="minor">
-            <a:schemeClr val="lt1"/>
-          </a:fontRef>
-        </p:style>
-        <p:txBody>
-          <a:bodyPr rtlCol="0" anchor="ctr"/>
-          <a:lstStyle/>
-          <a:p>
-            <a:pPr algn="ctr"/>
-            <a:endParaRPr lang="en-GB"/>
-          </a:p>
-        </p:txBody>
-      </p:sp>
-      <p:sp>
-        <p:nvSpPr>
-          <p:cNvPr id="12" name="TextBox 11"/>
-          <p:cNvSpPr txBox="1"/>
-          <p:nvPr/>
-        </p:nvSpPr>
-        <p:spPr>
-          <a:xfrm>
-            <a:off x="853285" y="2442826"/>
-            <a:ext cx="726482" cy="615553"/>
+            <a:r>
+              <a:rPr lang="en-GB" sz="2400" dirty="0" smtClean="0"/>
+              <a:t>NOD KO</a:t>
+            </a:r>
+            <a:endParaRPr lang="en-GB" sz="2400" dirty="0"/>
+          </a:p>
+        </p:txBody>
+      </p:sp>
+      <p:sp>
+        <p:nvSpPr>
+          <p:cNvPr id="15" name="TextBox 14"/>
+          <p:cNvSpPr txBox="1"/>
+          <p:nvPr/>
+        </p:nvSpPr>
+        <p:spPr>
+          <a:xfrm>
+            <a:off x="6025763" y="715617"/>
+            <a:ext cx="875561" cy="369332"/>
           </a:xfrm>
           <a:prstGeom prst="rect">
             <a:avLst/>
@@ -9153,252 +8942,18 @@
           </a:bodyPr>
           <a:lstStyle/>
           <a:p>
-            <a:pPr algn="ctr"/>
-            <a:r>
-              <a:rPr lang="en-GB" sz="1700" dirty="0" smtClean="0"/>
-              <a:t>IgM-</a:t>
-            </a:r>
-          </a:p>
-          <a:p>
-            <a:pPr algn="ctr"/>
-            <a:r>
-              <a:rPr lang="en-GB" sz="1700" dirty="0" smtClean="0"/>
-              <a:t>21.7%</a:t>
-            </a:r>
-            <a:endParaRPr lang="en-GB" sz="1700" dirty="0"/>
-          </a:p>
-        </p:txBody>
-      </p:sp>
-      <p:sp>
-        <p:nvSpPr>
-          <p:cNvPr id="13" name="TextBox 12"/>
-          <p:cNvSpPr txBox="1"/>
-          <p:nvPr/>
-        </p:nvSpPr>
-        <p:spPr>
-          <a:xfrm>
-            <a:off x="4353484" y="2442826"/>
-            <a:ext cx="726482" cy="615553"/>
-          </a:xfrm>
-          <a:prstGeom prst="rect">
-            <a:avLst/>
-          </a:prstGeom>
-          <a:noFill/>
-        </p:spPr>
-        <p:txBody>
-          <a:bodyPr wrap="none" rtlCol="0">
-            <a:spAutoFit/>
-          </a:bodyPr>
-          <a:lstStyle/>
-          <a:p>
-            <a:pPr algn="ctr"/>
-            <a:r>
-              <a:rPr lang="en-GB" sz="1700" dirty="0" smtClean="0"/>
-              <a:t>IgM-</a:t>
-            </a:r>
-          </a:p>
-          <a:p>
-            <a:pPr algn="ctr"/>
-            <a:r>
-              <a:rPr lang="en-GB" sz="1700" dirty="0" smtClean="0"/>
-              <a:t>4.01%</a:t>
-            </a:r>
-            <a:endParaRPr lang="en-GB" sz="1700" dirty="0"/>
-          </a:p>
-        </p:txBody>
-      </p:sp>
-      <p:sp>
-        <p:nvSpPr>
-          <p:cNvPr id="16" name="TextBox 15"/>
-          <p:cNvSpPr txBox="1"/>
-          <p:nvPr/>
-        </p:nvSpPr>
-        <p:spPr>
-          <a:xfrm rot="16200000">
-            <a:off x="-727963" y="1897175"/>
-            <a:ext cx="2176216" cy="461665"/>
-          </a:xfrm>
-          <a:prstGeom prst="rect">
-            <a:avLst/>
-          </a:prstGeom>
-          <a:solidFill>
-            <a:schemeClr val="bg1"/>
-          </a:solidFill>
-        </p:spPr>
-        <p:txBody>
-          <a:bodyPr wrap="square" rtlCol="0">
-            <a:spAutoFit/>
-          </a:bodyPr>
-          <a:lstStyle/>
-          <a:p>
-            <a:r>
-              <a:rPr lang="en-GB" sz="2400" dirty="0" smtClean="0"/>
-              <a:t>IgM</a:t>
-            </a:r>
-            <a:endParaRPr lang="en-GB" sz="2400" dirty="0"/>
-          </a:p>
-        </p:txBody>
-      </p:sp>
-      <p:sp>
-        <p:nvSpPr>
-          <p:cNvPr id="17" name="TextBox 16"/>
-          <p:cNvSpPr txBox="1"/>
-          <p:nvPr/>
-        </p:nvSpPr>
-        <p:spPr>
-          <a:xfrm>
-            <a:off x="907169" y="3468937"/>
-            <a:ext cx="2402382" cy="461665"/>
-          </a:xfrm>
-          <a:prstGeom prst="rect">
-            <a:avLst/>
-          </a:prstGeom>
-          <a:solidFill>
-            <a:schemeClr val="bg1"/>
-          </a:solidFill>
-        </p:spPr>
-        <p:txBody>
-          <a:bodyPr wrap="square" rtlCol="0">
-            <a:spAutoFit/>
-          </a:bodyPr>
-          <a:lstStyle/>
-          <a:p>
-            <a:r>
-              <a:rPr lang="en-GB" sz="2400" dirty="0" smtClean="0"/>
-              <a:t>Side Scatter</a:t>
-            </a:r>
-            <a:endParaRPr lang="en-GB" sz="2400" dirty="0"/>
-          </a:p>
-        </p:txBody>
-      </p:sp>
-      <p:sp>
-        <p:nvSpPr>
-          <p:cNvPr id="18" name="TextBox 17"/>
-          <p:cNvSpPr txBox="1"/>
-          <p:nvPr/>
-        </p:nvSpPr>
-        <p:spPr>
-          <a:xfrm rot="16200000">
-            <a:off x="2794469" y="1897175"/>
-            <a:ext cx="2176216" cy="461665"/>
-          </a:xfrm>
-          <a:prstGeom prst="rect">
-            <a:avLst/>
-          </a:prstGeom>
-          <a:solidFill>
-            <a:schemeClr val="bg1"/>
-          </a:solidFill>
-        </p:spPr>
-        <p:txBody>
-          <a:bodyPr wrap="square" rtlCol="0">
-            <a:spAutoFit/>
-          </a:bodyPr>
-          <a:lstStyle/>
-          <a:p>
-            <a:r>
-              <a:rPr lang="en-GB" sz="2400" dirty="0" smtClean="0"/>
-              <a:t>IgM</a:t>
-            </a:r>
-            <a:endParaRPr lang="en-GB" sz="2400" dirty="0"/>
-          </a:p>
-        </p:txBody>
-      </p:sp>
-      <p:sp>
-        <p:nvSpPr>
-          <p:cNvPr id="19" name="TextBox 18"/>
-          <p:cNvSpPr txBox="1"/>
-          <p:nvPr/>
-        </p:nvSpPr>
-        <p:spPr>
-          <a:xfrm>
-            <a:off x="4429601" y="3468937"/>
-            <a:ext cx="2402382" cy="461665"/>
-          </a:xfrm>
-          <a:prstGeom prst="rect">
-            <a:avLst/>
-          </a:prstGeom>
-          <a:solidFill>
-            <a:schemeClr val="bg1"/>
-          </a:solidFill>
-        </p:spPr>
-        <p:txBody>
-          <a:bodyPr wrap="square" rtlCol="0">
-            <a:spAutoFit/>
-          </a:bodyPr>
-          <a:lstStyle/>
-          <a:p>
-            <a:r>
-              <a:rPr lang="en-GB" sz="2400" dirty="0" smtClean="0"/>
-              <a:t>Side Scatter</a:t>
-            </a:r>
-            <a:endParaRPr lang="en-GB" sz="2400" dirty="0"/>
-          </a:p>
-        </p:txBody>
-      </p:sp>
-      <p:sp>
-        <p:nvSpPr>
-          <p:cNvPr id="20" name="TextBox 19"/>
-          <p:cNvSpPr txBox="1"/>
-          <p:nvPr/>
-        </p:nvSpPr>
-        <p:spPr>
-          <a:xfrm>
-            <a:off x="1530386" y="108889"/>
-            <a:ext cx="832279" cy="461665"/>
-          </a:xfrm>
-          <a:prstGeom prst="rect">
-            <a:avLst/>
-          </a:prstGeom>
-          <a:noFill/>
-        </p:spPr>
-        <p:txBody>
-          <a:bodyPr wrap="none" rtlCol="0">
-            <a:spAutoFit/>
-          </a:bodyPr>
-          <a:lstStyle/>
-          <a:p>
-            <a:r>
-              <a:rPr lang="en-GB" sz="2400" dirty="0" smtClean="0"/>
-              <a:t>GFP+</a:t>
-            </a:r>
-            <a:endParaRPr lang="en-GB" sz="2400" dirty="0"/>
-          </a:p>
-        </p:txBody>
-      </p:sp>
-      <p:sp>
-        <p:nvSpPr>
-          <p:cNvPr id="21" name="TextBox 20"/>
-          <p:cNvSpPr txBox="1"/>
-          <p:nvPr/>
-        </p:nvSpPr>
-        <p:spPr>
-          <a:xfrm>
-            <a:off x="5017808" y="108889"/>
-            <a:ext cx="772969" cy="461665"/>
-          </a:xfrm>
-          <a:prstGeom prst="rect">
-            <a:avLst/>
-          </a:prstGeom>
-          <a:noFill/>
-        </p:spPr>
-        <p:txBody>
-          <a:bodyPr wrap="none" rtlCol="0">
-            <a:spAutoFit/>
-          </a:bodyPr>
-          <a:lstStyle/>
-          <a:p>
-            <a:r>
-              <a:rPr lang="en-GB" sz="2400" dirty="0" smtClean="0"/>
-              <a:t>GFP-</a:t>
-            </a:r>
-            <a:endParaRPr lang="en-GB" sz="2400" dirty="0"/>
+            <a:r>
+              <a:rPr lang="en-GB" sz="1800" dirty="0" smtClean="0"/>
+              <a:t>0.054%</a:t>
+            </a:r>
+            <a:endParaRPr lang="en-GB" sz="1800" dirty="0"/>
           </a:p>
         </p:txBody>
       </p:sp>
     </p:spTree>
     <p:extLst>
       <p:ext uri="{BB962C8B-B14F-4D97-AF65-F5344CB8AC3E}">
-        <p14:creationId xmlns:p14="http://schemas.microsoft.com/office/powerpoint/2010/main" val="1566873023"/>
+        <p14:creationId xmlns:p14="http://schemas.microsoft.com/office/powerpoint/2010/main" val="1792757575"/>
       </p:ext>
     </p:extLst>
   </p:cSld>
@@ -9441,7 +8996,7 @@
         </p:blipFill>
         <p:spPr>
           <a:xfrm>
-            <a:off x="93663" y="339725"/>
+            <a:off x="3598863" y="339725"/>
             <a:ext cx="3505200" cy="3638550"/>
           </a:xfrm>
           <a:prstGeom prst="rect">
@@ -9449,143 +9004,9 @@
           </a:prstGeom>
         </p:spPr>
       </p:pic>
-      <p:sp>
-        <p:nvSpPr>
-          <p:cNvPr id="3" name="TextBox 2"/>
-          <p:cNvSpPr txBox="1"/>
-          <p:nvPr/>
-        </p:nvSpPr>
-        <p:spPr>
-          <a:xfrm>
-            <a:off x="954352" y="1235108"/>
-            <a:ext cx="800220" cy="646331"/>
-          </a:xfrm>
-          <a:prstGeom prst="rect">
-            <a:avLst/>
-          </a:prstGeom>
-          <a:solidFill>
-            <a:schemeClr val="bg1"/>
-          </a:solidFill>
-        </p:spPr>
-        <p:txBody>
-          <a:bodyPr wrap="none" rtlCol="0">
-            <a:spAutoFit/>
-          </a:bodyPr>
-          <a:lstStyle/>
-          <a:p>
-            <a:pPr algn="ctr"/>
-            <a:r>
-              <a:rPr lang="en-GB" sz="1800" dirty="0" smtClean="0"/>
-              <a:t>CD19+</a:t>
-            </a:r>
-          </a:p>
-          <a:p>
-            <a:pPr algn="ctr"/>
-            <a:r>
-              <a:rPr lang="en-GB" sz="1800" dirty="0" smtClean="0"/>
-              <a:t>3.48%</a:t>
-            </a:r>
-            <a:endParaRPr lang="en-GB" sz="1800" dirty="0"/>
-          </a:p>
-        </p:txBody>
-      </p:sp>
-      <p:sp>
-        <p:nvSpPr>
-          <p:cNvPr id="4" name="TextBox 3"/>
-          <p:cNvSpPr txBox="1"/>
-          <p:nvPr/>
-        </p:nvSpPr>
-        <p:spPr>
-          <a:xfrm rot="16200000">
-            <a:off x="-707810" y="1920582"/>
-            <a:ext cx="2176216" cy="461665"/>
-          </a:xfrm>
-          <a:prstGeom prst="rect">
-            <a:avLst/>
-          </a:prstGeom>
-          <a:solidFill>
-            <a:schemeClr val="bg1"/>
-          </a:solidFill>
-        </p:spPr>
-        <p:txBody>
-          <a:bodyPr wrap="square" rtlCol="0">
-            <a:spAutoFit/>
-          </a:bodyPr>
-          <a:lstStyle/>
-          <a:p>
-            <a:r>
-              <a:rPr lang="en-GB" sz="2400" dirty="0" smtClean="0"/>
-              <a:t>CD19</a:t>
-            </a:r>
-            <a:endParaRPr lang="en-GB" sz="2400" dirty="0"/>
-          </a:p>
-        </p:txBody>
-      </p:sp>
-      <p:sp>
-        <p:nvSpPr>
-          <p:cNvPr id="5" name="TextBox 4"/>
-          <p:cNvSpPr txBox="1"/>
-          <p:nvPr/>
-        </p:nvSpPr>
-        <p:spPr>
-          <a:xfrm>
-            <a:off x="894076" y="3424121"/>
-            <a:ext cx="1652697" cy="461665"/>
-          </a:xfrm>
-          <a:prstGeom prst="rect">
-            <a:avLst/>
-          </a:prstGeom>
-          <a:solidFill>
-            <a:schemeClr val="bg1"/>
-          </a:solidFill>
-        </p:spPr>
-        <p:txBody>
-          <a:bodyPr wrap="none" rtlCol="0">
-            <a:spAutoFit/>
-          </a:bodyPr>
-          <a:lstStyle/>
-          <a:p>
-            <a:r>
-              <a:rPr lang="en-GB" sz="2400" dirty="0" smtClean="0"/>
-              <a:t>Side Scatter</a:t>
-            </a:r>
-            <a:endParaRPr lang="en-GB" sz="2400" dirty="0"/>
-          </a:p>
-        </p:txBody>
-      </p:sp>
-      <p:sp>
-        <p:nvSpPr>
-          <p:cNvPr id="6" name="TextBox 5"/>
-          <p:cNvSpPr txBox="1"/>
-          <p:nvPr/>
-        </p:nvSpPr>
-        <p:spPr>
-          <a:xfrm>
-            <a:off x="1402427" y="120534"/>
-            <a:ext cx="1269899" cy="461665"/>
-          </a:xfrm>
-          <a:prstGeom prst="rect">
-            <a:avLst/>
-          </a:prstGeom>
-          <a:noFill/>
-        </p:spPr>
-        <p:txBody>
-          <a:bodyPr wrap="none" rtlCol="0">
-            <a:spAutoFit/>
-          </a:bodyPr>
-          <a:lstStyle/>
-          <a:p>
-            <a:r>
-              <a:rPr lang="en-GB" sz="2400" dirty="0" smtClean="0"/>
-              <a:t>NOD WT</a:t>
-            </a:r>
-            <a:endParaRPr lang="en-GB" sz="2400" dirty="0"/>
-          </a:p>
-        </p:txBody>
-      </p:sp>
       <p:pic>
         <p:nvPicPr>
-          <p:cNvPr id="7" name="Picture 6"/>
+          <p:cNvPr id="3" name="Picture 2"/>
           <p:cNvPicPr>
             <a:picLocks noChangeAspect="1"/>
           </p:cNvPicPr>
@@ -9599,7 +9020,7 @@
         </p:blipFill>
         <p:spPr>
           <a:xfrm>
-            <a:off x="3606959" y="351367"/>
+            <a:off x="95412" y="339725"/>
             <a:ext cx="3505200" cy="3638550"/>
           </a:xfrm>
           <a:prstGeom prst="rect">
@@ -9609,14 +9030,14 @@
       </p:pic>
       <p:sp>
         <p:nvSpPr>
-          <p:cNvPr id="8" name="TextBox 7"/>
-          <p:cNvSpPr txBox="1"/>
-          <p:nvPr/>
-        </p:nvSpPr>
-        <p:spPr>
-          <a:xfrm>
-            <a:off x="4475713" y="1235107"/>
-            <a:ext cx="800220" cy="646331"/>
+          <p:cNvPr id="5" name="TextBox 4"/>
+          <p:cNvSpPr txBox="1"/>
+          <p:nvPr/>
+        </p:nvSpPr>
+        <p:spPr>
+          <a:xfrm>
+            <a:off x="978010" y="1168842"/>
+            <a:ext cx="477033" cy="341906"/>
           </a:xfrm>
           <a:prstGeom prst="rect">
             <a:avLst/>
@@ -9626,6 +9047,32 @@
           </a:solidFill>
         </p:spPr>
         <p:txBody>
+          <a:bodyPr wrap="square" rtlCol="0">
+            <a:spAutoFit/>
+          </a:bodyPr>
+          <a:lstStyle/>
+          <a:p>
+            <a:endParaRPr lang="en-GB" dirty="0"/>
+          </a:p>
+        </p:txBody>
+      </p:sp>
+      <p:sp>
+        <p:nvSpPr>
+          <p:cNvPr id="4" name="TextBox 3"/>
+          <p:cNvSpPr txBox="1"/>
+          <p:nvPr/>
+        </p:nvSpPr>
+        <p:spPr>
+          <a:xfrm>
+            <a:off x="848284" y="1032018"/>
+            <a:ext cx="784189" cy="615553"/>
+          </a:xfrm>
+          <a:prstGeom prst="rect">
+            <a:avLst/>
+          </a:prstGeom>
+          <a:noFill/>
+        </p:spPr>
+        <p:txBody>
           <a:bodyPr wrap="none" rtlCol="0">
             <a:spAutoFit/>
           </a:bodyPr>
@@ -9633,30 +9080,35 @@
           <a:p>
             <a:pPr algn="ctr"/>
             <a:r>
-              <a:rPr lang="en-GB" sz="1800" dirty="0" smtClean="0"/>
-              <a:t>CD19+</a:t>
-            </a:r>
+              <a:rPr lang="en-GB" sz="1700" dirty="0" err="1" smtClean="0"/>
+              <a:t>IgM</a:t>
+            </a:r>
+            <a:r>
+              <a:rPr lang="en-GB" sz="1700" baseline="30000" dirty="0" err="1" smtClean="0"/>
+              <a:t>high</a:t>
+            </a:r>
+            <a:endParaRPr lang="en-GB" sz="1700" dirty="0" smtClean="0"/>
           </a:p>
           <a:p>
             <a:pPr algn="ctr"/>
             <a:r>
-              <a:rPr lang="en-GB" sz="1800" dirty="0" smtClean="0"/>
-              <a:t>1.24%</a:t>
-            </a:r>
-            <a:endParaRPr lang="en-GB" sz="1800" dirty="0"/>
-          </a:p>
-        </p:txBody>
-      </p:sp>
-      <p:sp>
-        <p:nvSpPr>
-          <p:cNvPr id="9" name="TextBox 8"/>
-          <p:cNvSpPr txBox="1"/>
-          <p:nvPr/>
-        </p:nvSpPr>
-        <p:spPr>
-          <a:xfrm rot="16200000">
-            <a:off x="2799562" y="1932225"/>
-            <a:ext cx="2176216" cy="461665"/>
+              <a:rPr lang="en-GB" sz="1700" dirty="0" smtClean="0"/>
+              <a:t>40.2%</a:t>
+            </a:r>
+            <a:endParaRPr lang="en-GB" sz="1700" dirty="0"/>
+          </a:p>
+        </p:txBody>
+      </p:sp>
+      <p:sp>
+        <p:nvSpPr>
+          <p:cNvPr id="7" name="Rectangle 6"/>
+          <p:cNvSpPr/>
+          <p:nvPr/>
+        </p:nvSpPr>
+        <p:spPr>
+          <a:xfrm>
+            <a:off x="4492487" y="1168842"/>
+            <a:ext cx="467756" cy="341906"/>
           </a:xfrm>
           <a:prstGeom prst="rect">
             <a:avLst/>
@@ -9664,31 +9116,88 @@
           <a:solidFill>
             <a:schemeClr val="bg1"/>
           </a:solidFill>
-        </p:spPr>
-        <p:txBody>
-          <a:bodyPr wrap="square" rtlCol="0">
-            <a:spAutoFit/>
-          </a:bodyPr>
-          <a:lstStyle/>
-          <a:p>
-            <a:r>
-              <a:rPr lang="en-GB" sz="2400" dirty="0" smtClean="0"/>
-              <a:t>CD19</a:t>
-            </a:r>
-            <a:endParaRPr lang="en-GB" sz="2400" dirty="0"/>
-          </a:p>
-        </p:txBody>
-      </p:sp>
-      <p:sp>
-        <p:nvSpPr>
-          <p:cNvPr id="10" name="TextBox 9"/>
-          <p:cNvSpPr txBox="1"/>
-          <p:nvPr/>
-        </p:nvSpPr>
-        <p:spPr>
-          <a:xfrm>
-            <a:off x="4401448" y="3435764"/>
-            <a:ext cx="1652697" cy="461665"/>
+          <a:ln>
+            <a:solidFill>
+              <a:schemeClr val="bg1"/>
+            </a:solidFill>
+          </a:ln>
+        </p:spPr>
+        <p:style>
+          <a:lnRef idx="2">
+            <a:schemeClr val="accent1">
+              <a:shade val="50000"/>
+            </a:schemeClr>
+          </a:lnRef>
+          <a:fillRef idx="1">
+            <a:schemeClr val="accent1"/>
+          </a:fillRef>
+          <a:effectRef idx="0">
+            <a:schemeClr val="accent1"/>
+          </a:effectRef>
+          <a:fontRef idx="minor">
+            <a:schemeClr val="lt1"/>
+          </a:fontRef>
+        </p:style>
+        <p:txBody>
+          <a:bodyPr rtlCol="0" anchor="ctr"/>
+          <a:lstStyle/>
+          <a:p>
+            <a:pPr algn="ctr"/>
+            <a:endParaRPr lang="en-GB"/>
+          </a:p>
+        </p:txBody>
+      </p:sp>
+      <p:sp>
+        <p:nvSpPr>
+          <p:cNvPr id="6" name="TextBox 5"/>
+          <p:cNvSpPr txBox="1"/>
+          <p:nvPr/>
+        </p:nvSpPr>
+        <p:spPr>
+          <a:xfrm>
+            <a:off x="4353484" y="1005983"/>
+            <a:ext cx="784189" cy="615553"/>
+          </a:xfrm>
+          <a:prstGeom prst="rect">
+            <a:avLst/>
+          </a:prstGeom>
+          <a:noFill/>
+        </p:spPr>
+        <p:txBody>
+          <a:bodyPr wrap="none" rtlCol="0">
+            <a:spAutoFit/>
+          </a:bodyPr>
+          <a:lstStyle/>
+          <a:p>
+            <a:r>
+              <a:rPr lang="en-GB" sz="1700" dirty="0" err="1" smtClean="0"/>
+              <a:t>IgM</a:t>
+            </a:r>
+            <a:r>
+              <a:rPr lang="en-GB" sz="1700" baseline="30000" dirty="0" err="1" smtClean="0"/>
+              <a:t>high</a:t>
+            </a:r>
+            <a:endParaRPr lang="en-GB" sz="1700" dirty="0" smtClean="0"/>
+          </a:p>
+          <a:p>
+            <a:r>
+              <a:rPr lang="en-GB" sz="1700" dirty="0" smtClean="0"/>
+              <a:t>17.2%</a:t>
+            </a:r>
+            <a:endParaRPr lang="en-GB" sz="1700" dirty="0"/>
+          </a:p>
+        </p:txBody>
+      </p:sp>
+      <p:sp>
+        <p:nvSpPr>
+          <p:cNvPr id="8" name="Rectangle 7"/>
+          <p:cNvSpPr/>
+          <p:nvPr/>
+        </p:nvSpPr>
+        <p:spPr>
+          <a:xfrm>
+            <a:off x="1053353" y="1952371"/>
+            <a:ext cx="477033" cy="302150"/>
           </a:xfrm>
           <a:prstGeom prst="rect">
             <a:avLst/>
@@ -9696,9 +9205,395 @@
           <a:solidFill>
             <a:schemeClr val="bg1"/>
           </a:solidFill>
+          <a:ln>
+            <a:solidFill>
+              <a:schemeClr val="bg1"/>
+            </a:solidFill>
+          </a:ln>
+        </p:spPr>
+        <p:style>
+          <a:lnRef idx="2">
+            <a:schemeClr val="accent1">
+              <a:shade val="50000"/>
+            </a:schemeClr>
+          </a:lnRef>
+          <a:fillRef idx="1">
+            <a:schemeClr val="accent1"/>
+          </a:fillRef>
+          <a:effectRef idx="0">
+            <a:schemeClr val="accent1"/>
+          </a:effectRef>
+          <a:fontRef idx="minor">
+            <a:schemeClr val="lt1"/>
+          </a:fontRef>
+        </p:style>
+        <p:txBody>
+          <a:bodyPr rtlCol="0" anchor="ctr"/>
+          <a:lstStyle/>
+          <a:p>
+            <a:pPr algn="ctr"/>
+            <a:endParaRPr lang="en-GB"/>
+          </a:p>
+        </p:txBody>
+      </p:sp>
+      <p:sp>
+        <p:nvSpPr>
+          <p:cNvPr id="9" name="Rectangle 8"/>
+          <p:cNvSpPr/>
+          <p:nvPr/>
+        </p:nvSpPr>
+        <p:spPr>
+          <a:xfrm>
+            <a:off x="4540775" y="1924762"/>
+            <a:ext cx="477033" cy="302150"/>
+          </a:xfrm>
+          <a:prstGeom prst="rect">
+            <a:avLst/>
+          </a:prstGeom>
+          <a:solidFill>
+            <a:schemeClr val="bg1"/>
+          </a:solidFill>
+          <a:ln>
+            <a:solidFill>
+              <a:schemeClr val="bg1"/>
+            </a:solidFill>
+          </a:ln>
+        </p:spPr>
+        <p:style>
+          <a:lnRef idx="2">
+            <a:schemeClr val="accent1">
+              <a:shade val="50000"/>
+            </a:schemeClr>
+          </a:lnRef>
+          <a:fillRef idx="1">
+            <a:schemeClr val="accent1"/>
+          </a:fillRef>
+          <a:effectRef idx="0">
+            <a:schemeClr val="accent1"/>
+          </a:effectRef>
+          <a:fontRef idx="minor">
+            <a:schemeClr val="lt1"/>
+          </a:fontRef>
+        </p:style>
+        <p:txBody>
+          <a:bodyPr rtlCol="0" anchor="ctr"/>
+          <a:lstStyle/>
+          <a:p>
+            <a:pPr algn="ctr"/>
+            <a:endParaRPr lang="en-GB"/>
+          </a:p>
+        </p:txBody>
+      </p:sp>
+      <p:sp>
+        <p:nvSpPr>
+          <p:cNvPr id="10" name="TextBox 9"/>
+          <p:cNvSpPr txBox="1"/>
+          <p:nvPr/>
+        </p:nvSpPr>
+        <p:spPr>
+          <a:xfrm>
+            <a:off x="848284" y="1764066"/>
+            <a:ext cx="741934" cy="615553"/>
+          </a:xfrm>
+          <a:prstGeom prst="rect">
+            <a:avLst/>
+          </a:prstGeom>
+          <a:noFill/>
         </p:spPr>
         <p:txBody>
           <a:bodyPr wrap="none" rtlCol="0">
+            <a:spAutoFit/>
+          </a:bodyPr>
+          <a:lstStyle/>
+          <a:p>
+            <a:pPr algn="ctr"/>
+            <a:r>
+              <a:rPr lang="en-GB" sz="1700" dirty="0" err="1" smtClean="0"/>
+              <a:t>IgM</a:t>
+            </a:r>
+            <a:r>
+              <a:rPr lang="en-GB" sz="1700" baseline="30000" dirty="0" err="1" smtClean="0"/>
+              <a:t>low</a:t>
+            </a:r>
+            <a:endParaRPr lang="en-GB" sz="1700" dirty="0" smtClean="0"/>
+          </a:p>
+          <a:p>
+            <a:pPr algn="ctr"/>
+            <a:r>
+              <a:rPr lang="en-GB" sz="1700" dirty="0" smtClean="0"/>
+              <a:t>23.9%</a:t>
+            </a:r>
+            <a:endParaRPr lang="en-GB" sz="1700" dirty="0"/>
+          </a:p>
+        </p:txBody>
+      </p:sp>
+      <p:sp>
+        <p:nvSpPr>
+          <p:cNvPr id="11" name="TextBox 10"/>
+          <p:cNvSpPr txBox="1"/>
+          <p:nvPr/>
+        </p:nvSpPr>
+        <p:spPr>
+          <a:xfrm>
+            <a:off x="4353484" y="1764065"/>
+            <a:ext cx="741934" cy="615553"/>
+          </a:xfrm>
+          <a:prstGeom prst="rect">
+            <a:avLst/>
+          </a:prstGeom>
+          <a:noFill/>
+        </p:spPr>
+        <p:txBody>
+          <a:bodyPr wrap="none" rtlCol="0">
+            <a:spAutoFit/>
+          </a:bodyPr>
+          <a:lstStyle/>
+          <a:p>
+            <a:pPr algn="ctr"/>
+            <a:r>
+              <a:rPr lang="en-GB" sz="1700" dirty="0" err="1" smtClean="0"/>
+              <a:t>IgM</a:t>
+            </a:r>
+            <a:r>
+              <a:rPr lang="en-GB" sz="1700" baseline="30000" dirty="0" err="1" smtClean="0"/>
+              <a:t>low</a:t>
+            </a:r>
+            <a:endParaRPr lang="en-GB" sz="1700" dirty="0" smtClean="0"/>
+          </a:p>
+          <a:p>
+            <a:pPr algn="ctr"/>
+            <a:r>
+              <a:rPr lang="en-GB" sz="1700" dirty="0" smtClean="0"/>
+              <a:t>74.1%</a:t>
+            </a:r>
+            <a:endParaRPr lang="en-GB" sz="1700" dirty="0"/>
+          </a:p>
+        </p:txBody>
+      </p:sp>
+      <p:sp>
+        <p:nvSpPr>
+          <p:cNvPr id="14" name="Rectangle 13"/>
+          <p:cNvSpPr/>
+          <p:nvPr/>
+        </p:nvSpPr>
+        <p:spPr>
+          <a:xfrm>
+            <a:off x="4492487" y="2639833"/>
+            <a:ext cx="389614" cy="318254"/>
+          </a:xfrm>
+          <a:prstGeom prst="rect">
+            <a:avLst/>
+          </a:prstGeom>
+          <a:solidFill>
+            <a:schemeClr val="bg1"/>
+          </a:solidFill>
+          <a:ln>
+            <a:solidFill>
+              <a:schemeClr val="bg1"/>
+            </a:solidFill>
+          </a:ln>
+        </p:spPr>
+        <p:style>
+          <a:lnRef idx="2">
+            <a:schemeClr val="accent1">
+              <a:shade val="50000"/>
+            </a:schemeClr>
+          </a:lnRef>
+          <a:fillRef idx="1">
+            <a:schemeClr val="accent1"/>
+          </a:fillRef>
+          <a:effectRef idx="0">
+            <a:schemeClr val="accent1"/>
+          </a:effectRef>
+          <a:fontRef idx="minor">
+            <a:schemeClr val="lt1"/>
+          </a:fontRef>
+        </p:style>
+        <p:txBody>
+          <a:bodyPr rtlCol="0" anchor="ctr"/>
+          <a:lstStyle/>
+          <a:p>
+            <a:pPr algn="ctr"/>
+            <a:endParaRPr lang="en-GB"/>
+          </a:p>
+        </p:txBody>
+      </p:sp>
+      <p:sp>
+        <p:nvSpPr>
+          <p:cNvPr id="15" name="Rectangle 14"/>
+          <p:cNvSpPr/>
+          <p:nvPr/>
+        </p:nvSpPr>
+        <p:spPr>
+          <a:xfrm>
+            <a:off x="1021719" y="2639833"/>
+            <a:ext cx="389614" cy="318254"/>
+          </a:xfrm>
+          <a:prstGeom prst="rect">
+            <a:avLst/>
+          </a:prstGeom>
+          <a:solidFill>
+            <a:schemeClr val="bg1"/>
+          </a:solidFill>
+          <a:ln>
+            <a:solidFill>
+              <a:schemeClr val="bg1"/>
+            </a:solidFill>
+          </a:ln>
+        </p:spPr>
+        <p:style>
+          <a:lnRef idx="2">
+            <a:schemeClr val="accent1">
+              <a:shade val="50000"/>
+            </a:schemeClr>
+          </a:lnRef>
+          <a:fillRef idx="1">
+            <a:schemeClr val="accent1"/>
+          </a:fillRef>
+          <a:effectRef idx="0">
+            <a:schemeClr val="accent1"/>
+          </a:effectRef>
+          <a:fontRef idx="minor">
+            <a:schemeClr val="lt1"/>
+          </a:fontRef>
+        </p:style>
+        <p:txBody>
+          <a:bodyPr rtlCol="0" anchor="ctr"/>
+          <a:lstStyle/>
+          <a:p>
+            <a:pPr algn="ctr"/>
+            <a:endParaRPr lang="en-GB"/>
+          </a:p>
+        </p:txBody>
+      </p:sp>
+      <p:sp>
+        <p:nvSpPr>
+          <p:cNvPr id="12" name="TextBox 11"/>
+          <p:cNvSpPr txBox="1"/>
+          <p:nvPr/>
+        </p:nvSpPr>
+        <p:spPr>
+          <a:xfrm>
+            <a:off x="853285" y="2442826"/>
+            <a:ext cx="726482" cy="615553"/>
+          </a:xfrm>
+          <a:prstGeom prst="rect">
+            <a:avLst/>
+          </a:prstGeom>
+          <a:noFill/>
+        </p:spPr>
+        <p:txBody>
+          <a:bodyPr wrap="none" rtlCol="0">
+            <a:spAutoFit/>
+          </a:bodyPr>
+          <a:lstStyle/>
+          <a:p>
+            <a:pPr algn="ctr"/>
+            <a:r>
+              <a:rPr lang="en-GB" sz="1700" dirty="0" smtClean="0"/>
+              <a:t>IgM-</a:t>
+            </a:r>
+          </a:p>
+          <a:p>
+            <a:pPr algn="ctr"/>
+            <a:r>
+              <a:rPr lang="en-GB" sz="1700" dirty="0" smtClean="0"/>
+              <a:t>21.7%</a:t>
+            </a:r>
+            <a:endParaRPr lang="en-GB" sz="1700" dirty="0"/>
+          </a:p>
+        </p:txBody>
+      </p:sp>
+      <p:sp>
+        <p:nvSpPr>
+          <p:cNvPr id="13" name="TextBox 12"/>
+          <p:cNvSpPr txBox="1"/>
+          <p:nvPr/>
+        </p:nvSpPr>
+        <p:spPr>
+          <a:xfrm>
+            <a:off x="4353484" y="2442826"/>
+            <a:ext cx="726482" cy="615553"/>
+          </a:xfrm>
+          <a:prstGeom prst="rect">
+            <a:avLst/>
+          </a:prstGeom>
+          <a:noFill/>
+        </p:spPr>
+        <p:txBody>
+          <a:bodyPr wrap="none" rtlCol="0">
+            <a:spAutoFit/>
+          </a:bodyPr>
+          <a:lstStyle/>
+          <a:p>
+            <a:pPr algn="ctr"/>
+            <a:r>
+              <a:rPr lang="en-GB" sz="1700" dirty="0" smtClean="0"/>
+              <a:t>IgM-</a:t>
+            </a:r>
+          </a:p>
+          <a:p>
+            <a:pPr algn="ctr"/>
+            <a:r>
+              <a:rPr lang="en-GB" sz="1700" dirty="0" smtClean="0"/>
+              <a:t>4.01%</a:t>
+            </a:r>
+            <a:endParaRPr lang="en-GB" sz="1700" dirty="0"/>
+          </a:p>
+        </p:txBody>
+      </p:sp>
+      <p:sp>
+        <p:nvSpPr>
+          <p:cNvPr id="16" name="TextBox 15"/>
+          <p:cNvSpPr txBox="1"/>
+          <p:nvPr/>
+        </p:nvSpPr>
+        <p:spPr>
+          <a:xfrm rot="16200000">
+            <a:off x="-727963" y="1897175"/>
+            <a:ext cx="2176216" cy="461665"/>
+          </a:xfrm>
+          <a:prstGeom prst="rect">
+            <a:avLst/>
+          </a:prstGeom>
+          <a:solidFill>
+            <a:schemeClr val="bg1"/>
+          </a:solidFill>
+        </p:spPr>
+        <p:txBody>
+          <a:bodyPr wrap="square" rtlCol="0">
+            <a:spAutoFit/>
+          </a:bodyPr>
+          <a:lstStyle/>
+          <a:p>
+            <a:r>
+              <a:rPr lang="en-GB" sz="2400" dirty="0" smtClean="0"/>
+              <a:t>IgM</a:t>
+            </a:r>
+            <a:endParaRPr lang="en-GB" sz="2400" dirty="0"/>
+          </a:p>
+        </p:txBody>
+      </p:sp>
+      <p:sp>
+        <p:nvSpPr>
+          <p:cNvPr id="17" name="TextBox 16"/>
+          <p:cNvSpPr txBox="1"/>
+          <p:nvPr/>
+        </p:nvSpPr>
+        <p:spPr>
+          <a:xfrm>
+            <a:off x="907169" y="3468937"/>
+            <a:ext cx="2402382" cy="461665"/>
+          </a:xfrm>
+          <a:prstGeom prst="rect">
+            <a:avLst/>
+          </a:prstGeom>
+          <a:solidFill>
+            <a:schemeClr val="bg1"/>
+          </a:solidFill>
+        </p:spPr>
+        <p:txBody>
+          <a:bodyPr wrap="square" rtlCol="0">
             <a:spAutoFit/>
           </a:bodyPr>
           <a:lstStyle/>
@@ -9713,14 +9608,78 @@
       </p:sp>
       <p:sp>
         <p:nvSpPr>
-          <p:cNvPr id="11" name="TextBox 10"/>
-          <p:cNvSpPr txBox="1"/>
-          <p:nvPr/>
-        </p:nvSpPr>
-        <p:spPr>
-          <a:xfrm>
-            <a:off x="4907627" y="120534"/>
-            <a:ext cx="1194430" cy="461665"/>
+          <p:cNvPr id="18" name="TextBox 17"/>
+          <p:cNvSpPr txBox="1"/>
+          <p:nvPr/>
+        </p:nvSpPr>
+        <p:spPr>
+          <a:xfrm rot="16200000">
+            <a:off x="2794469" y="1897175"/>
+            <a:ext cx="2176216" cy="461665"/>
+          </a:xfrm>
+          <a:prstGeom prst="rect">
+            <a:avLst/>
+          </a:prstGeom>
+          <a:solidFill>
+            <a:schemeClr val="bg1"/>
+          </a:solidFill>
+        </p:spPr>
+        <p:txBody>
+          <a:bodyPr wrap="square" rtlCol="0">
+            <a:spAutoFit/>
+          </a:bodyPr>
+          <a:lstStyle/>
+          <a:p>
+            <a:r>
+              <a:rPr lang="en-GB" sz="2400" dirty="0" smtClean="0"/>
+              <a:t>IgM</a:t>
+            </a:r>
+            <a:endParaRPr lang="en-GB" sz="2400" dirty="0"/>
+          </a:p>
+        </p:txBody>
+      </p:sp>
+      <p:sp>
+        <p:nvSpPr>
+          <p:cNvPr id="19" name="TextBox 18"/>
+          <p:cNvSpPr txBox="1"/>
+          <p:nvPr/>
+        </p:nvSpPr>
+        <p:spPr>
+          <a:xfrm>
+            <a:off x="4429601" y="3468937"/>
+            <a:ext cx="2402382" cy="461665"/>
+          </a:xfrm>
+          <a:prstGeom prst="rect">
+            <a:avLst/>
+          </a:prstGeom>
+          <a:solidFill>
+            <a:schemeClr val="bg1"/>
+          </a:solidFill>
+        </p:spPr>
+        <p:txBody>
+          <a:bodyPr wrap="square" rtlCol="0">
+            <a:spAutoFit/>
+          </a:bodyPr>
+          <a:lstStyle/>
+          <a:p>
+            <a:r>
+              <a:rPr lang="en-GB" sz="2400" dirty="0" smtClean="0"/>
+              <a:t>Side Scatter</a:t>
+            </a:r>
+            <a:endParaRPr lang="en-GB" sz="2400" dirty="0"/>
+          </a:p>
+        </p:txBody>
+      </p:sp>
+      <p:sp>
+        <p:nvSpPr>
+          <p:cNvPr id="20" name="TextBox 19"/>
+          <p:cNvSpPr txBox="1"/>
+          <p:nvPr/>
+        </p:nvSpPr>
+        <p:spPr>
+          <a:xfrm>
+            <a:off x="1530386" y="108889"/>
+            <a:ext cx="832279" cy="461665"/>
           </a:xfrm>
           <a:prstGeom prst="rect">
             <a:avLst/>
@@ -9735,7 +9694,37 @@
           <a:p>
             <a:r>
               <a:rPr lang="en-GB" sz="2400" dirty="0" smtClean="0"/>
-              <a:t>NOD KO</a:t>
+              <a:t>GFP+</a:t>
+            </a:r>
+            <a:endParaRPr lang="en-GB" sz="2400" dirty="0"/>
+          </a:p>
+        </p:txBody>
+      </p:sp>
+      <p:sp>
+        <p:nvSpPr>
+          <p:cNvPr id="21" name="TextBox 20"/>
+          <p:cNvSpPr txBox="1"/>
+          <p:nvPr/>
+        </p:nvSpPr>
+        <p:spPr>
+          <a:xfrm>
+            <a:off x="5017808" y="108889"/>
+            <a:ext cx="772969" cy="461665"/>
+          </a:xfrm>
+          <a:prstGeom prst="rect">
+            <a:avLst/>
+          </a:prstGeom>
+          <a:noFill/>
+        </p:spPr>
+        <p:txBody>
+          <a:bodyPr wrap="none" rtlCol="0">
+            <a:spAutoFit/>
+          </a:bodyPr>
+          <a:lstStyle/>
+          <a:p>
+            <a:r>
+              <a:rPr lang="en-GB" sz="2400" dirty="0" smtClean="0"/>
+              <a:t>GFP-</a:t>
             </a:r>
             <a:endParaRPr lang="en-GB" sz="2400" dirty="0"/>
           </a:p>
@@ -9744,7 +9733,7 @@
     </p:spTree>
     <p:extLst>
       <p:ext uri="{BB962C8B-B14F-4D97-AF65-F5344CB8AC3E}">
-        <p14:creationId xmlns:p14="http://schemas.microsoft.com/office/powerpoint/2010/main" val="1913451524"/>
+        <p14:creationId xmlns:p14="http://schemas.microsoft.com/office/powerpoint/2010/main" val="1566873023"/>
       </p:ext>
     </p:extLst>
   </p:cSld>
@@ -9787,6 +9776,352 @@
         </p:blipFill>
         <p:spPr>
           <a:xfrm>
+            <a:off x="93663" y="339725"/>
+            <a:ext cx="3505200" cy="3638550"/>
+          </a:xfrm>
+          <a:prstGeom prst="rect">
+            <a:avLst/>
+          </a:prstGeom>
+        </p:spPr>
+      </p:pic>
+      <p:sp>
+        <p:nvSpPr>
+          <p:cNvPr id="3" name="TextBox 2"/>
+          <p:cNvSpPr txBox="1"/>
+          <p:nvPr/>
+        </p:nvSpPr>
+        <p:spPr>
+          <a:xfrm>
+            <a:off x="954352" y="1235108"/>
+            <a:ext cx="800220" cy="646331"/>
+          </a:xfrm>
+          <a:prstGeom prst="rect">
+            <a:avLst/>
+          </a:prstGeom>
+          <a:solidFill>
+            <a:schemeClr val="bg1"/>
+          </a:solidFill>
+        </p:spPr>
+        <p:txBody>
+          <a:bodyPr wrap="none" rtlCol="0">
+            <a:spAutoFit/>
+          </a:bodyPr>
+          <a:lstStyle/>
+          <a:p>
+            <a:pPr algn="ctr"/>
+            <a:r>
+              <a:rPr lang="en-GB" sz="1800" dirty="0" smtClean="0"/>
+              <a:t>CD19+</a:t>
+            </a:r>
+          </a:p>
+          <a:p>
+            <a:pPr algn="ctr"/>
+            <a:r>
+              <a:rPr lang="en-GB" sz="1800" dirty="0" smtClean="0"/>
+              <a:t>3.48%</a:t>
+            </a:r>
+            <a:endParaRPr lang="en-GB" sz="1800" dirty="0"/>
+          </a:p>
+        </p:txBody>
+      </p:sp>
+      <p:sp>
+        <p:nvSpPr>
+          <p:cNvPr id="4" name="TextBox 3"/>
+          <p:cNvSpPr txBox="1"/>
+          <p:nvPr/>
+        </p:nvSpPr>
+        <p:spPr>
+          <a:xfrm rot="16200000">
+            <a:off x="-707810" y="1920582"/>
+            <a:ext cx="2176216" cy="461665"/>
+          </a:xfrm>
+          <a:prstGeom prst="rect">
+            <a:avLst/>
+          </a:prstGeom>
+          <a:solidFill>
+            <a:schemeClr val="bg1"/>
+          </a:solidFill>
+        </p:spPr>
+        <p:txBody>
+          <a:bodyPr wrap="square" rtlCol="0">
+            <a:spAutoFit/>
+          </a:bodyPr>
+          <a:lstStyle/>
+          <a:p>
+            <a:r>
+              <a:rPr lang="en-GB" sz="2400" dirty="0" smtClean="0"/>
+              <a:t>CD19</a:t>
+            </a:r>
+            <a:endParaRPr lang="en-GB" sz="2400" dirty="0"/>
+          </a:p>
+        </p:txBody>
+      </p:sp>
+      <p:sp>
+        <p:nvSpPr>
+          <p:cNvPr id="5" name="TextBox 4"/>
+          <p:cNvSpPr txBox="1"/>
+          <p:nvPr/>
+        </p:nvSpPr>
+        <p:spPr>
+          <a:xfrm>
+            <a:off x="894076" y="3424121"/>
+            <a:ext cx="1652697" cy="461665"/>
+          </a:xfrm>
+          <a:prstGeom prst="rect">
+            <a:avLst/>
+          </a:prstGeom>
+          <a:solidFill>
+            <a:schemeClr val="bg1"/>
+          </a:solidFill>
+        </p:spPr>
+        <p:txBody>
+          <a:bodyPr wrap="none" rtlCol="0">
+            <a:spAutoFit/>
+          </a:bodyPr>
+          <a:lstStyle/>
+          <a:p>
+            <a:r>
+              <a:rPr lang="en-GB" sz="2400" dirty="0" smtClean="0"/>
+              <a:t>Side Scatter</a:t>
+            </a:r>
+            <a:endParaRPr lang="en-GB" sz="2400" dirty="0"/>
+          </a:p>
+        </p:txBody>
+      </p:sp>
+      <p:sp>
+        <p:nvSpPr>
+          <p:cNvPr id="6" name="TextBox 5"/>
+          <p:cNvSpPr txBox="1"/>
+          <p:nvPr/>
+        </p:nvSpPr>
+        <p:spPr>
+          <a:xfrm>
+            <a:off x="1402427" y="120534"/>
+            <a:ext cx="1269899" cy="461665"/>
+          </a:xfrm>
+          <a:prstGeom prst="rect">
+            <a:avLst/>
+          </a:prstGeom>
+          <a:noFill/>
+        </p:spPr>
+        <p:txBody>
+          <a:bodyPr wrap="none" rtlCol="0">
+            <a:spAutoFit/>
+          </a:bodyPr>
+          <a:lstStyle/>
+          <a:p>
+            <a:r>
+              <a:rPr lang="en-GB" sz="2400" dirty="0" smtClean="0"/>
+              <a:t>NOD WT</a:t>
+            </a:r>
+            <a:endParaRPr lang="en-GB" sz="2400" dirty="0"/>
+          </a:p>
+        </p:txBody>
+      </p:sp>
+      <p:pic>
+        <p:nvPicPr>
+          <p:cNvPr id="7" name="Picture 6"/>
+          <p:cNvPicPr>
+            <a:picLocks noChangeAspect="1"/>
+          </p:cNvPicPr>
+          <p:nvPr/>
+        </p:nvPicPr>
+        <p:blipFill>
+          <a:blip r:embed="rId3"/>
+          <a:stretch>
+            <a:fillRect/>
+          </a:stretch>
+        </p:blipFill>
+        <p:spPr>
+          <a:xfrm>
+            <a:off x="3606959" y="351367"/>
+            <a:ext cx="3505200" cy="3638550"/>
+          </a:xfrm>
+          <a:prstGeom prst="rect">
+            <a:avLst/>
+          </a:prstGeom>
+        </p:spPr>
+      </p:pic>
+      <p:sp>
+        <p:nvSpPr>
+          <p:cNvPr id="8" name="TextBox 7"/>
+          <p:cNvSpPr txBox="1"/>
+          <p:nvPr/>
+        </p:nvSpPr>
+        <p:spPr>
+          <a:xfrm>
+            <a:off x="4475713" y="1235107"/>
+            <a:ext cx="800220" cy="646331"/>
+          </a:xfrm>
+          <a:prstGeom prst="rect">
+            <a:avLst/>
+          </a:prstGeom>
+          <a:solidFill>
+            <a:schemeClr val="bg1"/>
+          </a:solidFill>
+        </p:spPr>
+        <p:txBody>
+          <a:bodyPr wrap="none" rtlCol="0">
+            <a:spAutoFit/>
+          </a:bodyPr>
+          <a:lstStyle/>
+          <a:p>
+            <a:pPr algn="ctr"/>
+            <a:r>
+              <a:rPr lang="en-GB" sz="1800" dirty="0" smtClean="0"/>
+              <a:t>CD19+</a:t>
+            </a:r>
+          </a:p>
+          <a:p>
+            <a:pPr algn="ctr"/>
+            <a:r>
+              <a:rPr lang="en-GB" sz="1800" dirty="0" smtClean="0"/>
+              <a:t>1.24%</a:t>
+            </a:r>
+            <a:endParaRPr lang="en-GB" sz="1800" dirty="0"/>
+          </a:p>
+        </p:txBody>
+      </p:sp>
+      <p:sp>
+        <p:nvSpPr>
+          <p:cNvPr id="9" name="TextBox 8"/>
+          <p:cNvSpPr txBox="1"/>
+          <p:nvPr/>
+        </p:nvSpPr>
+        <p:spPr>
+          <a:xfrm rot="16200000">
+            <a:off x="2799562" y="1932225"/>
+            <a:ext cx="2176216" cy="461665"/>
+          </a:xfrm>
+          <a:prstGeom prst="rect">
+            <a:avLst/>
+          </a:prstGeom>
+          <a:solidFill>
+            <a:schemeClr val="bg1"/>
+          </a:solidFill>
+        </p:spPr>
+        <p:txBody>
+          <a:bodyPr wrap="square" rtlCol="0">
+            <a:spAutoFit/>
+          </a:bodyPr>
+          <a:lstStyle/>
+          <a:p>
+            <a:r>
+              <a:rPr lang="en-GB" sz="2400" dirty="0" smtClean="0"/>
+              <a:t>CD19</a:t>
+            </a:r>
+            <a:endParaRPr lang="en-GB" sz="2400" dirty="0"/>
+          </a:p>
+        </p:txBody>
+      </p:sp>
+      <p:sp>
+        <p:nvSpPr>
+          <p:cNvPr id="10" name="TextBox 9"/>
+          <p:cNvSpPr txBox="1"/>
+          <p:nvPr/>
+        </p:nvSpPr>
+        <p:spPr>
+          <a:xfrm>
+            <a:off x="4401448" y="3435764"/>
+            <a:ext cx="1652697" cy="461665"/>
+          </a:xfrm>
+          <a:prstGeom prst="rect">
+            <a:avLst/>
+          </a:prstGeom>
+          <a:solidFill>
+            <a:schemeClr val="bg1"/>
+          </a:solidFill>
+        </p:spPr>
+        <p:txBody>
+          <a:bodyPr wrap="none" rtlCol="0">
+            <a:spAutoFit/>
+          </a:bodyPr>
+          <a:lstStyle/>
+          <a:p>
+            <a:r>
+              <a:rPr lang="en-GB" sz="2400" dirty="0" smtClean="0"/>
+              <a:t>Side Scatter</a:t>
+            </a:r>
+            <a:endParaRPr lang="en-GB" sz="2400" dirty="0"/>
+          </a:p>
+        </p:txBody>
+      </p:sp>
+      <p:sp>
+        <p:nvSpPr>
+          <p:cNvPr id="11" name="TextBox 10"/>
+          <p:cNvSpPr txBox="1"/>
+          <p:nvPr/>
+        </p:nvSpPr>
+        <p:spPr>
+          <a:xfrm>
+            <a:off x="4907627" y="120534"/>
+            <a:ext cx="1194430" cy="461665"/>
+          </a:xfrm>
+          <a:prstGeom prst="rect">
+            <a:avLst/>
+          </a:prstGeom>
+          <a:noFill/>
+        </p:spPr>
+        <p:txBody>
+          <a:bodyPr wrap="none" rtlCol="0">
+            <a:spAutoFit/>
+          </a:bodyPr>
+          <a:lstStyle/>
+          <a:p>
+            <a:r>
+              <a:rPr lang="en-GB" sz="2400" dirty="0" smtClean="0"/>
+              <a:t>NOD KO</a:t>
+            </a:r>
+            <a:endParaRPr lang="en-GB" sz="2400" dirty="0"/>
+          </a:p>
+        </p:txBody>
+      </p:sp>
+    </p:spTree>
+    <p:extLst>
+      <p:ext uri="{BB962C8B-B14F-4D97-AF65-F5344CB8AC3E}">
+        <p14:creationId xmlns:p14="http://schemas.microsoft.com/office/powerpoint/2010/main" val="1913451524"/>
+      </p:ext>
+    </p:extLst>
+  </p:cSld>
+  <p:clrMapOvr>
+    <a:masterClrMapping/>
+  </p:clrMapOvr>
+</p:sld>
+</file>
+
+<file path=ppt/slides/slide24.xml><?xml version="1.0" encoding="utf-8"?>
+<p:sld xmlns:a="http://schemas.openxmlformats.org/drawingml/2006/main" xmlns:r="http://schemas.openxmlformats.org/officeDocument/2006/relationships" xmlns:p="http://schemas.openxmlformats.org/presentationml/2006/main">
+  <p:cSld>
+    <p:spTree>
+      <p:nvGrpSpPr>
+        <p:cNvPr id="1" name=""/>
+        <p:cNvGrpSpPr/>
+        <p:nvPr/>
+      </p:nvGrpSpPr>
+      <p:grpSpPr>
+        <a:xfrm>
+          <a:off x="0" y="0"/>
+          <a:ext cx="0" cy="0"/>
+          <a:chOff x="0" y="0"/>
+          <a:chExt cx="0" cy="0"/>
+        </a:xfrm>
+      </p:grpSpPr>
+      <p:pic>
+        <p:nvPicPr>
+          <p:cNvPr id="2" name="Picture 1"/>
+          <p:cNvPicPr>
+            <a:picLocks noChangeAspect="1"/>
+          </p:cNvPicPr>
+          <p:nvPr/>
+        </p:nvPicPr>
+        <p:blipFill>
+          <a:blip r:embed="rId2"/>
+          <a:stretch>
+            <a:fillRect/>
+          </a:stretch>
+        </p:blipFill>
+        <p:spPr>
+          <a:xfrm>
             <a:off x="95412" y="339725"/>
             <a:ext cx="3505200" cy="3638550"/>
           </a:xfrm>
@@ -10020,7 +10355,7 @@
 </p:sld>
 </file>
 
-<file path=ppt/slides/slide24.xml><?xml version="1.0" encoding="utf-8"?>
+<file path=ppt/slides/slide25.xml><?xml version="1.0" encoding="utf-8"?>
 <p:sld xmlns:a="http://schemas.openxmlformats.org/drawingml/2006/main" xmlns:r="http://schemas.openxmlformats.org/officeDocument/2006/relationships" xmlns:p="http://schemas.openxmlformats.org/presentationml/2006/main">
   <p:cSld>
     <p:spTree>

</xml_diff>